<commit_message>
Add raw clout and vuln plot to backup
</commit_message>
<xml_diff>
--- a/Instant Coffee V4.pptx
+++ b/Instant Coffee V4.pptx
@@ -5,10 +5,10 @@
     <p:sldMasterId id="2147483692" r:id="rId4"/>
   </p:sldMasterIdLst>
   <p:notesMasterIdLst>
-    <p:notesMasterId r:id="rId22"/>
+    <p:notesMasterId r:id="rId23"/>
   </p:notesMasterIdLst>
   <p:handoutMasterIdLst>
-    <p:handoutMasterId r:id="rId23"/>
+    <p:handoutMasterId r:id="rId24"/>
   </p:handoutMasterIdLst>
   <p:sldIdLst>
     <p:sldId id="491" r:id="rId5"/>
@@ -28,6 +28,7 @@
     <p:sldId id="498" r:id="rId19"/>
     <p:sldId id="499" r:id="rId20"/>
     <p:sldId id="501" r:id="rId21"/>
+    <p:sldId id="503" r:id="rId22"/>
   </p:sldIdLst>
   <p:sldSz cx="12192000" cy="6858000"/>
   <p:notesSz cx="6742113" cy="9872663"/>
@@ -1676,6 +1677,90 @@
     <p:extLst>
       <p:ext uri="{BB962C8B-B14F-4D97-AF65-F5344CB8AC3E}">
         <p14:creationId xmlns:p14="http://schemas.microsoft.com/office/powerpoint/2010/main" val="2955035583"/>
+      </p:ext>
+    </p:extLst>
+  </p:cSld>
+  <p:clrMapOvr>
+    <a:masterClrMapping/>
+  </p:clrMapOvr>
+</p:notes>
+</file>
+
+<file path=ppt/notesSlides/notesSlide18.xml><?xml version="1.0" encoding="utf-8"?>
+<p:notes xmlns:a="http://schemas.openxmlformats.org/drawingml/2006/main" xmlns:r="http://schemas.openxmlformats.org/officeDocument/2006/relationships" xmlns:p="http://schemas.openxmlformats.org/presentationml/2006/main">
+  <p:cSld>
+    <p:spTree>
+      <p:nvGrpSpPr>
+        <p:cNvPr id="1" name=""/>
+        <p:cNvGrpSpPr/>
+        <p:nvPr/>
+      </p:nvGrpSpPr>
+      <p:grpSpPr>
+        <a:xfrm>
+          <a:off x="0" y="0"/>
+          <a:ext cx="0" cy="0"/>
+          <a:chOff x="0" y="0"/>
+          <a:chExt cx="0" cy="0"/>
+        </a:xfrm>
+      </p:grpSpPr>
+      <p:sp>
+        <p:nvSpPr>
+          <p:cNvPr id="2" name="Slide Image Placeholder 1"/>
+          <p:cNvSpPr>
+            <a:spLocks noGrp="1" noRot="1" noChangeAspect="1"/>
+          </p:cNvSpPr>
+          <p:nvPr>
+            <p:ph type="sldImg"/>
+          </p:nvPr>
+        </p:nvSpPr>
+        <p:spPr/>
+      </p:sp>
+      <p:sp>
+        <p:nvSpPr>
+          <p:cNvPr id="3" name="Notes Placeholder 2"/>
+          <p:cNvSpPr>
+            <a:spLocks noGrp="1"/>
+          </p:cNvSpPr>
+          <p:nvPr>
+            <p:ph type="body" idx="1"/>
+          </p:nvPr>
+        </p:nvSpPr>
+        <p:spPr/>
+        <p:txBody>
+          <a:bodyPr/>
+          <a:lstStyle/>
+          <a:p>
+            <a:endParaRPr lang="en-GB"/>
+          </a:p>
+        </p:txBody>
+      </p:sp>
+      <p:sp>
+        <p:nvSpPr>
+          <p:cNvPr id="4" name="Slide Number Placeholder 3"/>
+          <p:cNvSpPr>
+            <a:spLocks noGrp="1"/>
+          </p:cNvSpPr>
+          <p:nvPr>
+            <p:ph type="sldNum" sz="quarter" idx="10"/>
+          </p:nvPr>
+        </p:nvSpPr>
+        <p:spPr/>
+        <p:txBody>
+          <a:bodyPr/>
+          <a:lstStyle/>
+          <a:p>
+            <a:fld id="{3C26ED65-54EF-4DE1-A434-72CD553BB447}" type="slidenum">
+              <a:rPr lang="de-DE" smtClean="0"/>
+              <a:t>18</a:t>
+            </a:fld>
+            <a:endParaRPr lang="de-DE"/>
+          </a:p>
+        </p:txBody>
+      </p:sp>
+    </p:spTree>
+    <p:extLst>
+      <p:ext uri="{BB962C8B-B14F-4D97-AF65-F5344CB8AC3E}">
+        <p14:creationId xmlns:p14="http://schemas.microsoft.com/office/powerpoint/2010/main" val="3077009223"/>
       </p:ext>
     </p:extLst>
   </p:cSld>
@@ -4466,7 +4551,7 @@
           <a:noFill/>
           <a:extLst>
             <a:ext uri="{909E8E84-426E-40dd-AFC4-6F175D3DCCD1}">
-              <a14:hiddenFill xmlns:a14="http://schemas.microsoft.com/office/drawing/2010/main" xmlns="">
+              <a14:hiddenFill xmlns="" xmlns:a14="http://schemas.microsoft.com/office/drawing/2010/main">
                 <a:solidFill>
                   <a:srgbClr val="FFFFFF"/>
                 </a:solidFill>
@@ -6583,7 +6668,7 @@
             <a:effectLst/>
             <a:extLst>
               <a:ext uri="{91240B29-F687-4f45-9708-019B960494DF}">
-                <a14:hiddenLine xmlns="" xmlns:a14="http://schemas.microsoft.com/office/drawing/2010/main" w="9525" cap="flat">
+                <a14:hiddenLine xmlns:a14="http://schemas.microsoft.com/office/drawing/2010/main" xmlns="" w="9525" cap="flat">
                   <a:solidFill>
                     <a:srgbClr val="808080"/>
                   </a:solidFill>
@@ -6593,7 +6678,7 @@
                 </a14:hiddenLine>
               </a:ext>
               <a:ext uri="{AF507438-7753-43e0-B8FC-AC1667EBCBE1}">
-                <a14:hiddenEffects xmlns="" xmlns:a14="http://schemas.microsoft.com/office/drawing/2010/main">
+                <a14:hiddenEffects xmlns:a14="http://schemas.microsoft.com/office/drawing/2010/main" xmlns="">
                   <a:effectLst>
                     <a:outerShdw blurRad="63500" dist="38099" dir="2700000" algn="ctr" rotWithShape="0">
                       <a:srgbClr val="000000">
@@ -6699,7 +6784,7 @@
             <a:effectLst/>
             <a:extLst>
               <a:ext uri="{91240B29-F687-4f45-9708-019B960494DF}">
-                <a14:hiddenLine xmlns="" xmlns:a14="http://schemas.microsoft.com/office/drawing/2010/main" w="9525" cap="flat">
+                <a14:hiddenLine xmlns:a14="http://schemas.microsoft.com/office/drawing/2010/main" xmlns="" w="9525" cap="flat">
                   <a:solidFill>
                     <a:srgbClr val="808080"/>
                   </a:solidFill>
@@ -6709,7 +6794,7 @@
                 </a14:hiddenLine>
               </a:ext>
               <a:ext uri="{AF507438-7753-43e0-B8FC-AC1667EBCBE1}">
-                <a14:hiddenEffects xmlns="" xmlns:a14="http://schemas.microsoft.com/office/drawing/2010/main">
+                <a14:hiddenEffects xmlns:a14="http://schemas.microsoft.com/office/drawing/2010/main" xmlns="">
                   <a:effectLst>
                     <a:outerShdw blurRad="63500" dist="38099" dir="2700000" algn="ctr" rotWithShape="0">
                       <a:srgbClr val="000000">
@@ -6809,7 +6894,7 @@
             <a:effectLst/>
             <a:extLst>
               <a:ext uri="{91240B29-F687-4f45-9708-019B960494DF}">
-                <a14:hiddenLine xmlns="" xmlns:a14="http://schemas.microsoft.com/office/drawing/2010/main" w="9525" cap="flat">
+                <a14:hiddenLine xmlns:a14="http://schemas.microsoft.com/office/drawing/2010/main" xmlns="" w="9525" cap="flat">
                   <a:solidFill>
                     <a:srgbClr val="808080"/>
                   </a:solidFill>
@@ -6819,7 +6904,7 @@
                 </a14:hiddenLine>
               </a:ext>
               <a:ext uri="{AF507438-7753-43e0-B8FC-AC1667EBCBE1}">
-                <a14:hiddenEffects xmlns="" xmlns:a14="http://schemas.microsoft.com/office/drawing/2010/main">
+                <a14:hiddenEffects xmlns:a14="http://schemas.microsoft.com/office/drawing/2010/main" xmlns="">
                   <a:effectLst>
                     <a:outerShdw blurRad="63500" dist="38099" dir="2700000" algn="ctr" rotWithShape="0">
                       <a:srgbClr val="000000">
@@ -6980,7 +7065,7 @@
             <a:effectLst/>
             <a:extLst>
               <a:ext uri="{91240B29-F687-4f45-9708-019B960494DF}">
-                <a14:hiddenLine xmlns="" xmlns:a14="http://schemas.microsoft.com/office/drawing/2010/main" w="9525" cap="flat">
+                <a14:hiddenLine xmlns:a14="http://schemas.microsoft.com/office/drawing/2010/main" xmlns="" w="9525" cap="flat">
                   <a:solidFill>
                     <a:srgbClr val="808080"/>
                   </a:solidFill>
@@ -6990,7 +7075,7 @@
                 </a14:hiddenLine>
               </a:ext>
               <a:ext uri="{AF507438-7753-43e0-B8FC-AC1667EBCBE1}">
-                <a14:hiddenEffects xmlns="" xmlns:a14="http://schemas.microsoft.com/office/drawing/2010/main">
+                <a14:hiddenEffects xmlns:a14="http://schemas.microsoft.com/office/drawing/2010/main" xmlns="">
                   <a:effectLst>
                     <a:outerShdw blurRad="63500" dist="38099" dir="2700000" algn="ctr" rotWithShape="0">
                       <a:srgbClr val="000000">
@@ -7151,7 +7236,7 @@
             <a:effectLst/>
             <a:extLst>
               <a:ext uri="{91240B29-F687-4f45-9708-019B960494DF}">
-                <a14:hiddenLine xmlns="" xmlns:a14="http://schemas.microsoft.com/office/drawing/2010/main" w="9525" cap="flat">
+                <a14:hiddenLine xmlns:a14="http://schemas.microsoft.com/office/drawing/2010/main" xmlns="" w="9525" cap="flat">
                   <a:solidFill>
                     <a:srgbClr val="808080"/>
                   </a:solidFill>
@@ -7161,7 +7246,7 @@
                 </a14:hiddenLine>
               </a:ext>
               <a:ext uri="{AF507438-7753-43e0-B8FC-AC1667EBCBE1}">
-                <a14:hiddenEffects xmlns="" xmlns:a14="http://schemas.microsoft.com/office/drawing/2010/main">
+                <a14:hiddenEffects xmlns:a14="http://schemas.microsoft.com/office/drawing/2010/main" xmlns="">
                   <a:effectLst>
                     <a:outerShdw blurRad="63500" dist="38099" dir="2700000" algn="ctr" rotWithShape="0">
                       <a:srgbClr val="000000">
@@ -7278,7 +7363,7 @@
             <a:effectLst/>
             <a:extLst>
               <a:ext uri="{91240B29-F687-4f45-9708-019B960494DF}">
-                <a14:hiddenLine xmlns="" xmlns:a14="http://schemas.microsoft.com/office/drawing/2010/main" w="9525" cap="flat">
+                <a14:hiddenLine xmlns:a14="http://schemas.microsoft.com/office/drawing/2010/main" xmlns="" w="9525" cap="flat">
                   <a:solidFill>
                     <a:srgbClr val="808080"/>
                   </a:solidFill>
@@ -7288,7 +7373,7 @@
                 </a14:hiddenLine>
               </a:ext>
               <a:ext uri="{AF507438-7753-43e0-B8FC-AC1667EBCBE1}">
-                <a14:hiddenEffects xmlns="" xmlns:a14="http://schemas.microsoft.com/office/drawing/2010/main">
+                <a14:hiddenEffects xmlns:a14="http://schemas.microsoft.com/office/drawing/2010/main" xmlns="">
                   <a:effectLst>
                     <a:outerShdw blurRad="63500" dist="38099" dir="2700000" algn="ctr" rotWithShape="0">
                       <a:srgbClr val="000000">
@@ -7405,7 +7490,7 @@
             <a:effectLst/>
             <a:extLst>
               <a:ext uri="{91240B29-F687-4f45-9708-019B960494DF}">
-                <a14:hiddenLine xmlns="" xmlns:a14="http://schemas.microsoft.com/office/drawing/2010/main" w="9525" cap="flat">
+                <a14:hiddenLine xmlns:a14="http://schemas.microsoft.com/office/drawing/2010/main" xmlns="" w="9525" cap="flat">
                   <a:solidFill>
                     <a:srgbClr val="808080"/>
                   </a:solidFill>
@@ -7415,7 +7500,7 @@
                 </a14:hiddenLine>
               </a:ext>
               <a:ext uri="{AF507438-7753-43e0-B8FC-AC1667EBCBE1}">
-                <a14:hiddenEffects xmlns="" xmlns:a14="http://schemas.microsoft.com/office/drawing/2010/main">
+                <a14:hiddenEffects xmlns:a14="http://schemas.microsoft.com/office/drawing/2010/main" xmlns="">
                   <a:effectLst>
                     <a:outerShdw blurRad="63500" dist="38099" dir="2700000" algn="ctr" rotWithShape="0">
                       <a:srgbClr val="000000">
@@ -7532,7 +7617,7 @@
             <a:effectLst/>
             <a:extLst>
               <a:ext uri="{91240B29-F687-4f45-9708-019B960494DF}">
-                <a14:hiddenLine xmlns="" xmlns:a14="http://schemas.microsoft.com/office/drawing/2010/main" w="9525" cap="flat">
+                <a14:hiddenLine xmlns:a14="http://schemas.microsoft.com/office/drawing/2010/main" xmlns="" w="9525" cap="flat">
                   <a:solidFill>
                     <a:srgbClr val="808080"/>
                   </a:solidFill>
@@ -7542,7 +7627,7 @@
                 </a14:hiddenLine>
               </a:ext>
               <a:ext uri="{AF507438-7753-43e0-B8FC-AC1667EBCBE1}">
-                <a14:hiddenEffects xmlns="" xmlns:a14="http://schemas.microsoft.com/office/drawing/2010/main">
+                <a14:hiddenEffects xmlns:a14="http://schemas.microsoft.com/office/drawing/2010/main" xmlns="">
                   <a:effectLst>
                     <a:outerShdw blurRad="63500" dist="38099" dir="2700000" algn="ctr" rotWithShape="0">
                       <a:srgbClr val="000000">
@@ -7659,7 +7744,7 @@
             <a:effectLst/>
             <a:extLst>
               <a:ext uri="{91240B29-F687-4f45-9708-019B960494DF}">
-                <a14:hiddenLine xmlns="" xmlns:a14="http://schemas.microsoft.com/office/drawing/2010/main" w="9525" cap="flat">
+                <a14:hiddenLine xmlns:a14="http://schemas.microsoft.com/office/drawing/2010/main" xmlns="" w="9525" cap="flat">
                   <a:solidFill>
                     <a:srgbClr val="808080"/>
                   </a:solidFill>
@@ -7669,7 +7754,7 @@
                 </a14:hiddenLine>
               </a:ext>
               <a:ext uri="{AF507438-7753-43e0-B8FC-AC1667EBCBE1}">
-                <a14:hiddenEffects xmlns="" xmlns:a14="http://schemas.microsoft.com/office/drawing/2010/main">
+                <a14:hiddenEffects xmlns:a14="http://schemas.microsoft.com/office/drawing/2010/main" xmlns="">
                   <a:effectLst>
                     <a:outerShdw blurRad="63500" dist="38099" dir="2700000" algn="ctr" rotWithShape="0">
                       <a:srgbClr val="000000">
@@ -7775,7 +7860,7 @@
             <a:effectLst/>
             <a:extLst>
               <a:ext uri="{91240B29-F687-4f45-9708-019B960494DF}">
-                <a14:hiddenLine xmlns="" xmlns:a14="http://schemas.microsoft.com/office/drawing/2010/main" w="9525" cap="flat">
+                <a14:hiddenLine xmlns:a14="http://schemas.microsoft.com/office/drawing/2010/main" xmlns="" w="9525" cap="flat">
                   <a:solidFill>
                     <a:srgbClr val="808080"/>
                   </a:solidFill>
@@ -7785,7 +7870,7 @@
                 </a14:hiddenLine>
               </a:ext>
               <a:ext uri="{AF507438-7753-43e0-B8FC-AC1667EBCBE1}">
-                <a14:hiddenEffects xmlns="" xmlns:a14="http://schemas.microsoft.com/office/drawing/2010/main">
+                <a14:hiddenEffects xmlns:a14="http://schemas.microsoft.com/office/drawing/2010/main" xmlns="">
                   <a:effectLst>
                     <a:outerShdw blurRad="63500" dist="38099" dir="2700000" algn="ctr" rotWithShape="0">
                       <a:srgbClr val="000000">
@@ -8054,7 +8139,7 @@
             <a:effectLst/>
             <a:extLst>
               <a:ext uri="{91240B29-F687-4f45-9708-019B960494DF}">
-                <a14:hiddenLine xmlns="" xmlns:a14="http://schemas.microsoft.com/office/drawing/2010/main" w="9525" cap="flat">
+                <a14:hiddenLine xmlns:a14="http://schemas.microsoft.com/office/drawing/2010/main" xmlns="" w="9525" cap="flat">
                   <a:solidFill>
                     <a:srgbClr val="808080"/>
                   </a:solidFill>
@@ -8064,7 +8149,7 @@
                 </a14:hiddenLine>
               </a:ext>
               <a:ext uri="{AF507438-7753-43e0-B8FC-AC1667EBCBE1}">
-                <a14:hiddenEffects xmlns="" xmlns:a14="http://schemas.microsoft.com/office/drawing/2010/main">
+                <a14:hiddenEffects xmlns:a14="http://schemas.microsoft.com/office/drawing/2010/main" xmlns="">
                   <a:effectLst>
                     <a:outerShdw blurRad="63500" dist="38099" dir="2700000" algn="ctr" rotWithShape="0">
                       <a:srgbClr val="000000">
@@ -8203,7 +8288,7 @@
             <a:effectLst/>
             <a:extLst>
               <a:ext uri="{91240B29-F687-4f45-9708-019B960494DF}">
-                <a14:hiddenLine xmlns="" xmlns:a14="http://schemas.microsoft.com/office/drawing/2010/main" w="9525" cap="flat">
+                <a14:hiddenLine xmlns:a14="http://schemas.microsoft.com/office/drawing/2010/main" xmlns="" w="9525" cap="flat">
                   <a:solidFill>
                     <a:srgbClr val="808080"/>
                   </a:solidFill>
@@ -8213,7 +8298,7 @@
                 </a14:hiddenLine>
               </a:ext>
               <a:ext uri="{AF507438-7753-43e0-B8FC-AC1667EBCBE1}">
-                <a14:hiddenEffects xmlns="" xmlns:a14="http://schemas.microsoft.com/office/drawing/2010/main">
+                <a14:hiddenEffects xmlns:a14="http://schemas.microsoft.com/office/drawing/2010/main" xmlns="">
                   <a:effectLst>
                     <a:outerShdw blurRad="63500" dist="38099" dir="2700000" algn="ctr" rotWithShape="0">
                       <a:srgbClr val="000000">
@@ -8347,7 +8432,7 @@
             <a:effectLst/>
             <a:extLst>
               <a:ext uri="{91240B29-F687-4f45-9708-019B960494DF}">
-                <a14:hiddenLine xmlns="" xmlns:a14="http://schemas.microsoft.com/office/drawing/2010/main" w="9525" cap="flat">
+                <a14:hiddenLine xmlns:a14="http://schemas.microsoft.com/office/drawing/2010/main" xmlns="" w="9525" cap="flat">
                   <a:solidFill>
                     <a:srgbClr val="808080"/>
                   </a:solidFill>
@@ -8357,7 +8442,7 @@
                 </a14:hiddenLine>
               </a:ext>
               <a:ext uri="{AF507438-7753-43e0-B8FC-AC1667EBCBE1}">
-                <a14:hiddenEffects xmlns="" xmlns:a14="http://schemas.microsoft.com/office/drawing/2010/main">
+                <a14:hiddenEffects xmlns:a14="http://schemas.microsoft.com/office/drawing/2010/main" xmlns="">
                   <a:effectLst>
                     <a:outerShdw blurRad="63500" dist="38099" dir="2700000" algn="ctr" rotWithShape="0">
                       <a:srgbClr val="000000">
@@ -8463,7 +8548,7 @@
             <a:effectLst/>
             <a:extLst>
               <a:ext uri="{91240B29-F687-4f45-9708-019B960494DF}">
-                <a14:hiddenLine xmlns="" xmlns:a14="http://schemas.microsoft.com/office/drawing/2010/main" w="9525" cap="flat">
+                <a14:hiddenLine xmlns:a14="http://schemas.microsoft.com/office/drawing/2010/main" xmlns="" w="9525" cap="flat">
                   <a:solidFill>
                     <a:srgbClr val="808080"/>
                   </a:solidFill>
@@ -8473,7 +8558,7 @@
                 </a14:hiddenLine>
               </a:ext>
               <a:ext uri="{AF507438-7753-43e0-B8FC-AC1667EBCBE1}">
-                <a14:hiddenEffects xmlns="" xmlns:a14="http://schemas.microsoft.com/office/drawing/2010/main">
+                <a14:hiddenEffects xmlns:a14="http://schemas.microsoft.com/office/drawing/2010/main" xmlns="">
                   <a:effectLst>
                     <a:outerShdw blurRad="63500" dist="38099" dir="2700000" algn="ctr" rotWithShape="0">
                       <a:srgbClr val="000000">
@@ -8599,7 +8684,7 @@
             <a:effectLst/>
             <a:extLst>
               <a:ext uri="{91240B29-F687-4f45-9708-019B960494DF}">
-                <a14:hiddenLine xmlns="" xmlns:a14="http://schemas.microsoft.com/office/drawing/2010/main" w="9525" cap="flat">
+                <a14:hiddenLine xmlns:a14="http://schemas.microsoft.com/office/drawing/2010/main" xmlns="" w="9525" cap="flat">
                   <a:solidFill>
                     <a:srgbClr val="808080"/>
                   </a:solidFill>
@@ -8609,7 +8694,7 @@
                 </a14:hiddenLine>
               </a:ext>
               <a:ext uri="{AF507438-7753-43e0-B8FC-AC1667EBCBE1}">
-                <a14:hiddenEffects xmlns="" xmlns:a14="http://schemas.microsoft.com/office/drawing/2010/main">
+                <a14:hiddenEffects xmlns:a14="http://schemas.microsoft.com/office/drawing/2010/main" xmlns="">
                   <a:effectLst>
                     <a:outerShdw blurRad="63500" dist="38099" dir="2700000" algn="ctr" rotWithShape="0">
                       <a:srgbClr val="000000">
@@ -8735,7 +8820,7 @@
             <a:effectLst/>
             <a:extLst>
               <a:ext uri="{91240B29-F687-4f45-9708-019B960494DF}">
-                <a14:hiddenLine xmlns="" xmlns:a14="http://schemas.microsoft.com/office/drawing/2010/main" w="9525" cap="flat">
+                <a14:hiddenLine xmlns:a14="http://schemas.microsoft.com/office/drawing/2010/main" xmlns="" w="9525" cap="flat">
                   <a:solidFill>
                     <a:srgbClr val="808080"/>
                   </a:solidFill>
@@ -8745,7 +8830,7 @@
                 </a14:hiddenLine>
               </a:ext>
               <a:ext uri="{AF507438-7753-43e0-B8FC-AC1667EBCBE1}">
-                <a14:hiddenEffects xmlns="" xmlns:a14="http://schemas.microsoft.com/office/drawing/2010/main">
+                <a14:hiddenEffects xmlns:a14="http://schemas.microsoft.com/office/drawing/2010/main" xmlns="">
                   <a:effectLst>
                     <a:outerShdw blurRad="63500" dist="38099" dir="2700000" algn="ctr" rotWithShape="0">
                       <a:srgbClr val="000000">
@@ -8862,7 +8947,7 @@
             <a:effectLst/>
             <a:extLst>
               <a:ext uri="{91240B29-F687-4f45-9708-019B960494DF}">
-                <a14:hiddenLine xmlns="" xmlns:a14="http://schemas.microsoft.com/office/drawing/2010/main" w="9525" cap="flat">
+                <a14:hiddenLine xmlns:a14="http://schemas.microsoft.com/office/drawing/2010/main" xmlns="" w="9525" cap="flat">
                   <a:solidFill>
                     <a:srgbClr val="808080"/>
                   </a:solidFill>
@@ -8872,7 +8957,7 @@
                 </a14:hiddenLine>
               </a:ext>
               <a:ext uri="{AF507438-7753-43e0-B8FC-AC1667EBCBE1}">
-                <a14:hiddenEffects xmlns="" xmlns:a14="http://schemas.microsoft.com/office/drawing/2010/main">
+                <a14:hiddenEffects xmlns:a14="http://schemas.microsoft.com/office/drawing/2010/main" xmlns="">
                   <a:effectLst>
                     <a:outerShdw blurRad="63500" dist="38099" dir="2700000" algn="ctr" rotWithShape="0">
                       <a:srgbClr val="000000">
@@ -8981,7 +9066,7 @@
             <a:effectLst/>
             <a:extLst>
               <a:ext uri="{91240B29-F687-4f45-9708-019B960494DF}">
-                <a14:hiddenLine xmlns="" xmlns:a14="http://schemas.microsoft.com/office/drawing/2010/main" w="9525" cap="flat">
+                <a14:hiddenLine xmlns:a14="http://schemas.microsoft.com/office/drawing/2010/main" xmlns="" w="9525" cap="flat">
                   <a:solidFill>
                     <a:srgbClr val="808080"/>
                   </a:solidFill>
@@ -8991,7 +9076,7 @@
                 </a14:hiddenLine>
               </a:ext>
               <a:ext uri="{AF507438-7753-43e0-B8FC-AC1667EBCBE1}">
-                <a14:hiddenEffects xmlns="" xmlns:a14="http://schemas.microsoft.com/office/drawing/2010/main">
+                <a14:hiddenEffects xmlns:a14="http://schemas.microsoft.com/office/drawing/2010/main" xmlns="">
                   <a:effectLst>
                     <a:outerShdw blurRad="63500" dist="38099" dir="2700000" algn="ctr" rotWithShape="0">
                       <a:srgbClr val="000000">
@@ -9108,7 +9193,7 @@
             <a:effectLst/>
             <a:extLst>
               <a:ext uri="{91240B29-F687-4f45-9708-019B960494DF}">
-                <a14:hiddenLine xmlns="" xmlns:a14="http://schemas.microsoft.com/office/drawing/2010/main" w="9525" cap="flat">
+                <a14:hiddenLine xmlns:a14="http://schemas.microsoft.com/office/drawing/2010/main" xmlns="" w="9525" cap="flat">
                   <a:solidFill>
                     <a:srgbClr val="808080"/>
                   </a:solidFill>
@@ -9118,7 +9203,7 @@
                 </a14:hiddenLine>
               </a:ext>
               <a:ext uri="{AF507438-7753-43e0-B8FC-AC1667EBCBE1}">
-                <a14:hiddenEffects xmlns="" xmlns:a14="http://schemas.microsoft.com/office/drawing/2010/main">
+                <a14:hiddenEffects xmlns:a14="http://schemas.microsoft.com/office/drawing/2010/main" xmlns="">
                   <a:effectLst>
                     <a:outerShdw blurRad="63500" dist="38099" dir="2700000" algn="ctr" rotWithShape="0">
                       <a:srgbClr val="000000">
@@ -9235,7 +9320,7 @@
             <a:effectLst/>
             <a:extLst>
               <a:ext uri="{91240B29-F687-4f45-9708-019B960494DF}">
-                <a14:hiddenLine xmlns="" xmlns:a14="http://schemas.microsoft.com/office/drawing/2010/main" w="9525" cap="flat">
+                <a14:hiddenLine xmlns:a14="http://schemas.microsoft.com/office/drawing/2010/main" xmlns="" w="9525" cap="flat">
                   <a:solidFill>
                     <a:srgbClr val="808080"/>
                   </a:solidFill>
@@ -9245,7 +9330,7 @@
                 </a14:hiddenLine>
               </a:ext>
               <a:ext uri="{AF507438-7753-43e0-B8FC-AC1667EBCBE1}">
-                <a14:hiddenEffects xmlns="" xmlns:a14="http://schemas.microsoft.com/office/drawing/2010/main">
+                <a14:hiddenEffects xmlns:a14="http://schemas.microsoft.com/office/drawing/2010/main" xmlns="">
                   <a:effectLst>
                     <a:outerShdw blurRad="63500" dist="38099" dir="2700000" algn="ctr" rotWithShape="0">
                       <a:srgbClr val="000000">
@@ -9362,7 +9447,7 @@
             <a:effectLst/>
             <a:extLst>
               <a:ext uri="{91240B29-F687-4f45-9708-019B960494DF}">
-                <a14:hiddenLine xmlns="" xmlns:a14="http://schemas.microsoft.com/office/drawing/2010/main" w="9525" cap="flat">
+                <a14:hiddenLine xmlns:a14="http://schemas.microsoft.com/office/drawing/2010/main" xmlns="" w="9525" cap="flat">
                   <a:solidFill>
                     <a:srgbClr val="808080"/>
                   </a:solidFill>
@@ -9372,7 +9457,7 @@
                 </a14:hiddenLine>
               </a:ext>
               <a:ext uri="{AF507438-7753-43e0-B8FC-AC1667EBCBE1}">
-                <a14:hiddenEffects xmlns="" xmlns:a14="http://schemas.microsoft.com/office/drawing/2010/main">
+                <a14:hiddenEffects xmlns:a14="http://schemas.microsoft.com/office/drawing/2010/main" xmlns="">
                   <a:effectLst>
                     <a:outerShdw blurRad="63500" dist="38099" dir="2700000" algn="ctr" rotWithShape="0">
                       <a:srgbClr val="000000">
@@ -9489,7 +9574,7 @@
             <a:effectLst/>
             <a:extLst>
               <a:ext uri="{91240B29-F687-4f45-9708-019B960494DF}">
-                <a14:hiddenLine xmlns="" xmlns:a14="http://schemas.microsoft.com/office/drawing/2010/main" w="9525" cap="flat">
+                <a14:hiddenLine xmlns:a14="http://schemas.microsoft.com/office/drawing/2010/main" xmlns="" w="9525" cap="flat">
                   <a:solidFill>
                     <a:srgbClr val="808080"/>
                   </a:solidFill>
@@ -9499,7 +9584,7 @@
                 </a14:hiddenLine>
               </a:ext>
               <a:ext uri="{AF507438-7753-43e0-B8FC-AC1667EBCBE1}">
-                <a14:hiddenEffects xmlns="" xmlns:a14="http://schemas.microsoft.com/office/drawing/2010/main">
+                <a14:hiddenEffects xmlns:a14="http://schemas.microsoft.com/office/drawing/2010/main" xmlns="">
                   <a:effectLst>
                     <a:outerShdw blurRad="63500" dist="38099" dir="2700000" algn="ctr" rotWithShape="0">
                       <a:srgbClr val="000000">
@@ -9649,7 +9734,7 @@
             <a:effectLst/>
             <a:extLst>
               <a:ext uri="{91240B29-F687-4f45-9708-019B960494DF}">
-                <a14:hiddenLine xmlns="" xmlns:a14="http://schemas.microsoft.com/office/drawing/2010/main" w="9525" cap="flat">
+                <a14:hiddenLine xmlns:a14="http://schemas.microsoft.com/office/drawing/2010/main" xmlns="" w="9525" cap="flat">
                   <a:solidFill>
                     <a:srgbClr val="808080"/>
                   </a:solidFill>
@@ -9659,7 +9744,7 @@
                 </a14:hiddenLine>
               </a:ext>
               <a:ext uri="{AF507438-7753-43e0-B8FC-AC1667EBCBE1}">
-                <a14:hiddenEffects xmlns="" xmlns:a14="http://schemas.microsoft.com/office/drawing/2010/main">
+                <a14:hiddenEffects xmlns:a14="http://schemas.microsoft.com/office/drawing/2010/main" xmlns="">
                   <a:effectLst>
                     <a:outerShdw blurRad="63500" dist="38099" dir="2700000" algn="ctr" rotWithShape="0">
                       <a:srgbClr val="000000">
@@ -9754,7 +9839,7 @@
             <a:effectLst/>
             <a:extLst>
               <a:ext uri="{91240B29-F687-4f45-9708-019B960494DF}">
-                <a14:hiddenLine xmlns="" xmlns:a14="http://schemas.microsoft.com/office/drawing/2010/main" w="9525" cap="flat">
+                <a14:hiddenLine xmlns:a14="http://schemas.microsoft.com/office/drawing/2010/main" xmlns="" w="9525" cap="flat">
                   <a:solidFill>
                     <a:srgbClr val="808080"/>
                   </a:solidFill>
@@ -9764,7 +9849,7 @@
                 </a14:hiddenLine>
               </a:ext>
               <a:ext uri="{AF507438-7753-43e0-B8FC-AC1667EBCBE1}">
-                <a14:hiddenEffects xmlns="" xmlns:a14="http://schemas.microsoft.com/office/drawing/2010/main">
+                <a14:hiddenEffects xmlns:a14="http://schemas.microsoft.com/office/drawing/2010/main" xmlns="">
                   <a:effectLst>
                     <a:outerShdw blurRad="63500" dist="38099" dir="2700000" algn="ctr" rotWithShape="0">
                       <a:srgbClr val="000000">
@@ -9864,7 +9949,7 @@
             <a:effectLst/>
             <a:extLst>
               <a:ext uri="{91240B29-F687-4f45-9708-019B960494DF}">
-                <a14:hiddenLine xmlns="" xmlns:a14="http://schemas.microsoft.com/office/drawing/2010/main" w="9525" cap="flat">
+                <a14:hiddenLine xmlns:a14="http://schemas.microsoft.com/office/drawing/2010/main" xmlns="" w="9525" cap="flat">
                   <a:solidFill>
                     <a:srgbClr val="808080"/>
                   </a:solidFill>
@@ -9874,7 +9959,7 @@
                 </a14:hiddenLine>
               </a:ext>
               <a:ext uri="{AF507438-7753-43e0-B8FC-AC1667EBCBE1}">
-                <a14:hiddenEffects xmlns="" xmlns:a14="http://schemas.microsoft.com/office/drawing/2010/main">
+                <a14:hiddenEffects xmlns:a14="http://schemas.microsoft.com/office/drawing/2010/main" xmlns="">
                   <a:effectLst>
                     <a:outerShdw blurRad="63500" dist="38099" dir="2700000" algn="ctr" rotWithShape="0">
                       <a:srgbClr val="000000">
@@ -9974,7 +10059,7 @@
             <a:effectLst/>
             <a:extLst>
               <a:ext uri="{91240B29-F687-4f45-9708-019B960494DF}">
-                <a14:hiddenLine xmlns="" xmlns:a14="http://schemas.microsoft.com/office/drawing/2010/main" w="9525" cap="flat">
+                <a14:hiddenLine xmlns:a14="http://schemas.microsoft.com/office/drawing/2010/main" xmlns="" w="9525" cap="flat">
                   <a:solidFill>
                     <a:srgbClr val="808080"/>
                   </a:solidFill>
@@ -9984,7 +10069,7 @@
                 </a14:hiddenLine>
               </a:ext>
               <a:ext uri="{AF507438-7753-43e0-B8FC-AC1667EBCBE1}">
-                <a14:hiddenEffects xmlns="" xmlns:a14="http://schemas.microsoft.com/office/drawing/2010/main">
+                <a14:hiddenEffects xmlns:a14="http://schemas.microsoft.com/office/drawing/2010/main" xmlns="">
                   <a:effectLst>
                     <a:outerShdw blurRad="63500" dist="38099" dir="2700000" algn="ctr" rotWithShape="0">
                       <a:srgbClr val="000000">
@@ -10121,7 +10206,7 @@
             <a:effectLst/>
             <a:extLst>
               <a:ext uri="{91240B29-F687-4f45-9708-019B960494DF}">
-                <a14:hiddenLine xmlns="" xmlns:a14="http://schemas.microsoft.com/office/drawing/2010/main" w="9525" cap="flat">
+                <a14:hiddenLine xmlns:a14="http://schemas.microsoft.com/office/drawing/2010/main" xmlns="" w="9525" cap="flat">
                   <a:solidFill>
                     <a:srgbClr val="808080"/>
                   </a:solidFill>
@@ -10131,7 +10216,7 @@
                 </a14:hiddenLine>
               </a:ext>
               <a:ext uri="{AF507438-7753-43e0-B8FC-AC1667EBCBE1}">
-                <a14:hiddenEffects xmlns="" xmlns:a14="http://schemas.microsoft.com/office/drawing/2010/main">
+                <a14:hiddenEffects xmlns:a14="http://schemas.microsoft.com/office/drawing/2010/main" xmlns="">
                   <a:effectLst>
                     <a:outerShdw blurRad="63500" dist="38099" dir="2700000" algn="ctr" rotWithShape="0">
                       <a:srgbClr val="000000">
@@ -10268,7 +10353,7 @@
             <a:effectLst/>
             <a:extLst>
               <a:ext uri="{91240B29-F687-4f45-9708-019B960494DF}">
-                <a14:hiddenLine xmlns="" xmlns:a14="http://schemas.microsoft.com/office/drawing/2010/main" w="9525" cap="flat">
+                <a14:hiddenLine xmlns:a14="http://schemas.microsoft.com/office/drawing/2010/main" xmlns="" w="9525" cap="flat">
                   <a:solidFill>
                     <a:srgbClr val="808080"/>
                   </a:solidFill>
@@ -10278,7 +10363,7 @@
                 </a14:hiddenLine>
               </a:ext>
               <a:ext uri="{AF507438-7753-43e0-B8FC-AC1667EBCBE1}">
-                <a14:hiddenEffects xmlns="" xmlns:a14="http://schemas.microsoft.com/office/drawing/2010/main">
+                <a14:hiddenEffects xmlns:a14="http://schemas.microsoft.com/office/drawing/2010/main" xmlns="">
                   <a:effectLst>
                     <a:outerShdw blurRad="63500" dist="38099" dir="2700000" algn="ctr" rotWithShape="0">
                       <a:srgbClr val="000000">
@@ -10384,7 +10469,7 @@
             <a:effectLst/>
             <a:extLst>
               <a:ext uri="{91240B29-F687-4f45-9708-019B960494DF}">
-                <a14:hiddenLine xmlns="" xmlns:a14="http://schemas.microsoft.com/office/drawing/2010/main" w="9525" cap="flat">
+                <a14:hiddenLine xmlns:a14="http://schemas.microsoft.com/office/drawing/2010/main" xmlns="" w="9525" cap="flat">
                   <a:solidFill>
                     <a:srgbClr val="808080"/>
                   </a:solidFill>
@@ -10394,7 +10479,7 @@
                 </a14:hiddenLine>
               </a:ext>
               <a:ext uri="{AF507438-7753-43e0-B8FC-AC1667EBCBE1}">
-                <a14:hiddenEffects xmlns="" xmlns:a14="http://schemas.microsoft.com/office/drawing/2010/main">
+                <a14:hiddenEffects xmlns:a14="http://schemas.microsoft.com/office/drawing/2010/main" xmlns="">
                   <a:effectLst>
                     <a:outerShdw blurRad="63500" dist="38099" dir="2700000" algn="ctr" rotWithShape="0">
                       <a:srgbClr val="000000">
@@ -10470,31 +10555,7 @@
                   <a:schemeClr val="tx1"/>
                 </a:solidFill>
               </a:rPr>
-              <a:t>~ </a:t>
-            </a:r>
-            <a:r>
-              <a:rPr lang="en-US" sz="2400" dirty="0" smtClean="0">
-                <a:solidFill>
-                  <a:schemeClr val="tx1"/>
-                </a:solidFill>
-              </a:rPr>
-              <a:t>10</a:t>
-            </a:r>
-            <a:r>
-              <a:rPr lang="en-US" sz="2400" dirty="0" smtClean="0">
-                <a:solidFill>
-                  <a:schemeClr val="tx1"/>
-                </a:solidFill>
-              </a:rPr>
-              <a:t>0</a:t>
-            </a:r>
-            <a:r>
-              <a:rPr lang="en-US" sz="2400" dirty="0" smtClean="0">
-                <a:solidFill>
-                  <a:schemeClr val="tx1"/>
-                </a:solidFill>
-              </a:rPr>
-              <a:t>% more price sensitive</a:t>
+              <a:t>~ 100% more price sensitive</a:t>
             </a:r>
             <a:endParaRPr lang="en-US" sz="2400" dirty="0">
               <a:solidFill>
@@ -10611,23 +10672,7 @@
                   <a:schemeClr val="tx1"/>
                 </a:solidFill>
               </a:rPr>
-              <a:t>~ </a:t>
-            </a:r>
-            <a:r>
-              <a:rPr lang="en-US" sz="2400" dirty="0" smtClean="0">
-                <a:solidFill>
-                  <a:schemeClr val="tx1"/>
-                </a:solidFill>
-              </a:rPr>
-              <a:t>50% </a:t>
-            </a:r>
-            <a:r>
-              <a:rPr lang="en-US" sz="2400" dirty="0" smtClean="0">
-                <a:solidFill>
-                  <a:schemeClr val="tx1"/>
-                </a:solidFill>
-              </a:rPr>
-              <a:t>less total spend</a:t>
+              <a:t>~ 50% less total spend</a:t>
             </a:r>
           </a:p>
           <a:p>
@@ -12913,7 +12958,7 @@
           <a:noFill/>
           <a:extLst>
             <a:ext uri="{909E8E84-426E-40dd-AFC4-6F175D3DCCD1}">
-              <a14:hiddenFill xmlns:a14="http://schemas.microsoft.com/office/drawing/2010/main" xmlns="">
+              <a14:hiddenFill xmlns="" xmlns:a14="http://schemas.microsoft.com/office/drawing/2010/main">
                 <a:solidFill>
                   <a:srgbClr val="FFFFFF"/>
                 </a:solidFill>
@@ -12978,6 +13023,103 @@
     <p:extLst>
       <p:ext uri="{BB962C8B-B14F-4D97-AF65-F5344CB8AC3E}">
         <p14:creationId xmlns:p14="http://schemas.microsoft.com/office/powerpoint/2010/main" val="62706091"/>
+      </p:ext>
+    </p:extLst>
+  </p:cSld>
+  <p:clrMapOvr>
+    <a:masterClrMapping/>
+  </p:clrMapOvr>
+  <p:timing>
+    <p:tnLst>
+      <p:par>
+        <p:cTn id="1" dur="indefinite" restart="never" nodeType="tmRoot"/>
+      </p:par>
+    </p:tnLst>
+  </p:timing>
+</p:sld>
+</file>
+
+<file path=ppt/slides/slide18.xml><?xml version="1.0" encoding="utf-8"?>
+<p:sld xmlns:a="http://schemas.openxmlformats.org/drawingml/2006/main" xmlns:r="http://schemas.openxmlformats.org/officeDocument/2006/relationships" xmlns:p="http://schemas.openxmlformats.org/presentationml/2006/main">
+  <p:cSld>
+    <p:spTree>
+      <p:nvGrpSpPr>
+        <p:cNvPr id="1" name=""/>
+        <p:cNvGrpSpPr/>
+        <p:nvPr/>
+      </p:nvGrpSpPr>
+      <p:grpSpPr>
+        <a:xfrm>
+          <a:off x="0" y="0"/>
+          <a:ext cx="0" cy="0"/>
+          <a:chOff x="0" y="0"/>
+          <a:chExt cx="0" cy="0"/>
+        </a:xfrm>
+      </p:grpSpPr>
+      <p:sp>
+        <p:nvSpPr>
+          <p:cNvPr id="3" name="Title 2"/>
+          <p:cNvSpPr>
+            <a:spLocks noGrp="1"/>
+          </p:cNvSpPr>
+          <p:nvPr>
+            <p:ph type="title"/>
+          </p:nvPr>
+        </p:nvSpPr>
+        <p:spPr/>
+        <p:txBody>
+          <a:bodyPr/>
+          <a:lstStyle/>
+          <a:p>
+            <a:r>
+              <a:rPr lang="de-DE" sz="4400" b="1" dirty="0" smtClean="0">
+                <a:solidFill>
+                  <a:schemeClr val="bg2"/>
+                </a:solidFill>
+                <a:latin typeface="+mn-lt"/>
+              </a:rPr>
+              <a:t>Clout </a:t>
+            </a:r>
+            <a:r>
+              <a:rPr lang="de-DE" sz="4400" b="1" dirty="0">
+                <a:solidFill>
+                  <a:schemeClr val="bg2"/>
+                </a:solidFill>
+                <a:latin typeface="+mn-lt"/>
+              </a:rPr>
+              <a:t>and Vulnerability</a:t>
+            </a:r>
+          </a:p>
+        </p:txBody>
+      </p:sp>
+      <p:pic>
+        <p:nvPicPr>
+          <p:cNvPr id="4" name="Picture 3"/>
+          <p:cNvPicPr>
+            <a:picLocks noChangeAspect="1"/>
+          </p:cNvPicPr>
+          <p:nvPr/>
+        </p:nvPicPr>
+        <p:blipFill>
+          <a:blip r:embed="rId3"/>
+          <a:stretch>
+            <a:fillRect/>
+          </a:stretch>
+        </p:blipFill>
+        <p:spPr>
+          <a:xfrm>
+            <a:off x="2414587" y="1083031"/>
+            <a:ext cx="6450013" cy="5465406"/>
+          </a:xfrm>
+          <a:prstGeom prst="rect">
+            <a:avLst/>
+          </a:prstGeom>
+        </p:spPr>
+      </p:pic>
+    </p:spTree>
+    <p:extLst>
+      <p:ext uri="{BB962C8B-B14F-4D97-AF65-F5344CB8AC3E}">
+        <p14:creationId xmlns:p14="http://schemas.microsoft.com/office/powerpoint/2010/main" val="3870556409"/>
       </p:ext>
     </p:extLst>
   </p:cSld>
@@ -14901,7 +15043,7 @@
               <a:effectLst/>
               <a:extLst>
                 <a:ext uri="{91240B29-F687-4f45-9708-019B960494DF}">
-                  <a14:hiddenLine xmlns:a14="http://schemas.microsoft.com/office/drawing/2010/main" xmlns="" w="9525" cap="flat">
+                  <a14:hiddenLine xmlns="" xmlns:a14="http://schemas.microsoft.com/office/drawing/2010/main" w="9525" cap="flat">
                     <a:solidFill>
                       <a:srgbClr val="808080"/>
                     </a:solidFill>
@@ -14911,7 +15053,7 @@
                   </a14:hiddenLine>
                 </a:ext>
                 <a:ext uri="{AF507438-7753-43e0-B8FC-AC1667EBCBE1}">
-                  <a14:hiddenEffects xmlns:a14="http://schemas.microsoft.com/office/drawing/2010/main" xmlns="">
+                  <a14:hiddenEffects xmlns="" xmlns:a14="http://schemas.microsoft.com/office/drawing/2010/main">
                     <a:effectLst>
                       <a:outerShdw blurRad="63500" dist="38099" dir="2700000" algn="ctr" rotWithShape="0">
                         <a:srgbClr val="000000">
@@ -15017,7 +15159,7 @@
               <a:effectLst/>
               <a:extLst>
                 <a:ext uri="{91240B29-F687-4f45-9708-019B960494DF}">
-                  <a14:hiddenLine xmlns:a14="http://schemas.microsoft.com/office/drawing/2010/main" xmlns="" w="9525" cap="flat">
+                  <a14:hiddenLine xmlns="" xmlns:a14="http://schemas.microsoft.com/office/drawing/2010/main" w="9525" cap="flat">
                     <a:solidFill>
                       <a:srgbClr val="808080"/>
                     </a:solidFill>
@@ -15027,7 +15169,7 @@
                   </a14:hiddenLine>
                 </a:ext>
                 <a:ext uri="{AF507438-7753-43e0-B8FC-AC1667EBCBE1}">
-                  <a14:hiddenEffects xmlns:a14="http://schemas.microsoft.com/office/drawing/2010/main" xmlns="">
+                  <a14:hiddenEffects xmlns="" xmlns:a14="http://schemas.microsoft.com/office/drawing/2010/main">
                     <a:effectLst>
                       <a:outerShdw blurRad="63500" dist="38099" dir="2700000" algn="ctr" rotWithShape="0">
                         <a:srgbClr val="000000">
@@ -15127,7 +15269,7 @@
               <a:effectLst/>
               <a:extLst>
                 <a:ext uri="{91240B29-F687-4f45-9708-019B960494DF}">
-                  <a14:hiddenLine xmlns:a14="http://schemas.microsoft.com/office/drawing/2010/main" xmlns="" w="9525" cap="flat">
+                  <a14:hiddenLine xmlns="" xmlns:a14="http://schemas.microsoft.com/office/drawing/2010/main" w="9525" cap="flat">
                     <a:solidFill>
                       <a:srgbClr val="808080"/>
                     </a:solidFill>
@@ -15137,7 +15279,7 @@
                   </a14:hiddenLine>
                 </a:ext>
                 <a:ext uri="{AF507438-7753-43e0-B8FC-AC1667EBCBE1}">
-                  <a14:hiddenEffects xmlns:a14="http://schemas.microsoft.com/office/drawing/2010/main" xmlns="">
+                  <a14:hiddenEffects xmlns="" xmlns:a14="http://schemas.microsoft.com/office/drawing/2010/main">
                     <a:effectLst>
                       <a:outerShdw blurRad="63500" dist="38099" dir="2700000" algn="ctr" rotWithShape="0">
                         <a:srgbClr val="000000">
@@ -15298,7 +15440,7 @@
               <a:effectLst/>
               <a:extLst>
                 <a:ext uri="{91240B29-F687-4f45-9708-019B960494DF}">
-                  <a14:hiddenLine xmlns:a14="http://schemas.microsoft.com/office/drawing/2010/main" xmlns="" w="9525" cap="flat">
+                  <a14:hiddenLine xmlns="" xmlns:a14="http://schemas.microsoft.com/office/drawing/2010/main" w="9525" cap="flat">
                     <a:solidFill>
                       <a:srgbClr val="808080"/>
                     </a:solidFill>
@@ -15308,7 +15450,7 @@
                   </a14:hiddenLine>
                 </a:ext>
                 <a:ext uri="{AF507438-7753-43e0-B8FC-AC1667EBCBE1}">
-                  <a14:hiddenEffects xmlns:a14="http://schemas.microsoft.com/office/drawing/2010/main" xmlns="">
+                  <a14:hiddenEffects xmlns="" xmlns:a14="http://schemas.microsoft.com/office/drawing/2010/main">
                     <a:effectLst>
                       <a:outerShdw blurRad="63500" dist="38099" dir="2700000" algn="ctr" rotWithShape="0">
                         <a:srgbClr val="000000">
@@ -15469,7 +15611,7 @@
               <a:effectLst/>
               <a:extLst>
                 <a:ext uri="{91240B29-F687-4f45-9708-019B960494DF}">
-                  <a14:hiddenLine xmlns:a14="http://schemas.microsoft.com/office/drawing/2010/main" xmlns="" w="9525" cap="flat">
+                  <a14:hiddenLine xmlns="" xmlns:a14="http://schemas.microsoft.com/office/drawing/2010/main" w="9525" cap="flat">
                     <a:solidFill>
                       <a:srgbClr val="808080"/>
                     </a:solidFill>
@@ -15479,7 +15621,7 @@
                   </a14:hiddenLine>
                 </a:ext>
                 <a:ext uri="{AF507438-7753-43e0-B8FC-AC1667EBCBE1}">
-                  <a14:hiddenEffects xmlns:a14="http://schemas.microsoft.com/office/drawing/2010/main" xmlns="">
+                  <a14:hiddenEffects xmlns="" xmlns:a14="http://schemas.microsoft.com/office/drawing/2010/main">
                     <a:effectLst>
                       <a:outerShdw blurRad="63500" dist="38099" dir="2700000" algn="ctr" rotWithShape="0">
                         <a:srgbClr val="000000">
@@ -15596,7 +15738,7 @@
               <a:effectLst/>
               <a:extLst>
                 <a:ext uri="{91240B29-F687-4f45-9708-019B960494DF}">
-                  <a14:hiddenLine xmlns:a14="http://schemas.microsoft.com/office/drawing/2010/main" xmlns="" w="9525" cap="flat">
+                  <a14:hiddenLine xmlns="" xmlns:a14="http://schemas.microsoft.com/office/drawing/2010/main" w="9525" cap="flat">
                     <a:solidFill>
                       <a:srgbClr val="808080"/>
                     </a:solidFill>
@@ -15606,7 +15748,7 @@
                   </a14:hiddenLine>
                 </a:ext>
                 <a:ext uri="{AF507438-7753-43e0-B8FC-AC1667EBCBE1}">
-                  <a14:hiddenEffects xmlns:a14="http://schemas.microsoft.com/office/drawing/2010/main" xmlns="">
+                  <a14:hiddenEffects xmlns="" xmlns:a14="http://schemas.microsoft.com/office/drawing/2010/main">
                     <a:effectLst>
                       <a:outerShdw blurRad="63500" dist="38099" dir="2700000" algn="ctr" rotWithShape="0">
                         <a:srgbClr val="000000">
@@ -15723,7 +15865,7 @@
               <a:effectLst/>
               <a:extLst>
                 <a:ext uri="{91240B29-F687-4f45-9708-019B960494DF}">
-                  <a14:hiddenLine xmlns:a14="http://schemas.microsoft.com/office/drawing/2010/main" xmlns="" w="9525" cap="flat">
+                  <a14:hiddenLine xmlns="" xmlns:a14="http://schemas.microsoft.com/office/drawing/2010/main" w="9525" cap="flat">
                     <a:solidFill>
                       <a:srgbClr val="808080"/>
                     </a:solidFill>
@@ -15733,7 +15875,7 @@
                   </a14:hiddenLine>
                 </a:ext>
                 <a:ext uri="{AF507438-7753-43e0-B8FC-AC1667EBCBE1}">
-                  <a14:hiddenEffects xmlns:a14="http://schemas.microsoft.com/office/drawing/2010/main" xmlns="">
+                  <a14:hiddenEffects xmlns="" xmlns:a14="http://schemas.microsoft.com/office/drawing/2010/main">
                     <a:effectLst>
                       <a:outerShdw blurRad="63500" dist="38099" dir="2700000" algn="ctr" rotWithShape="0">
                         <a:srgbClr val="000000">
@@ -15850,7 +15992,7 @@
               <a:effectLst/>
               <a:extLst>
                 <a:ext uri="{91240B29-F687-4f45-9708-019B960494DF}">
-                  <a14:hiddenLine xmlns:a14="http://schemas.microsoft.com/office/drawing/2010/main" xmlns="" w="9525" cap="flat">
+                  <a14:hiddenLine xmlns="" xmlns:a14="http://schemas.microsoft.com/office/drawing/2010/main" w="9525" cap="flat">
                     <a:solidFill>
                       <a:srgbClr val="808080"/>
                     </a:solidFill>
@@ -15860,7 +16002,7 @@
                   </a14:hiddenLine>
                 </a:ext>
                 <a:ext uri="{AF507438-7753-43e0-B8FC-AC1667EBCBE1}">
-                  <a14:hiddenEffects xmlns:a14="http://schemas.microsoft.com/office/drawing/2010/main" xmlns="">
+                  <a14:hiddenEffects xmlns="" xmlns:a14="http://schemas.microsoft.com/office/drawing/2010/main">
                     <a:effectLst>
                       <a:outerShdw blurRad="63500" dist="38099" dir="2700000" algn="ctr" rotWithShape="0">
                         <a:srgbClr val="000000">
@@ -15977,7 +16119,7 @@
               <a:effectLst/>
               <a:extLst>
                 <a:ext uri="{91240B29-F687-4f45-9708-019B960494DF}">
-                  <a14:hiddenLine xmlns:a14="http://schemas.microsoft.com/office/drawing/2010/main" xmlns="" w="9525" cap="flat">
+                  <a14:hiddenLine xmlns="" xmlns:a14="http://schemas.microsoft.com/office/drawing/2010/main" w="9525" cap="flat">
                     <a:solidFill>
                       <a:srgbClr val="808080"/>
                     </a:solidFill>
@@ -15987,7 +16129,7 @@
                   </a14:hiddenLine>
                 </a:ext>
                 <a:ext uri="{AF507438-7753-43e0-B8FC-AC1667EBCBE1}">
-                  <a14:hiddenEffects xmlns:a14="http://schemas.microsoft.com/office/drawing/2010/main" xmlns="">
+                  <a14:hiddenEffects xmlns="" xmlns:a14="http://schemas.microsoft.com/office/drawing/2010/main">
                     <a:effectLst>
                       <a:outerShdw blurRad="63500" dist="38099" dir="2700000" algn="ctr" rotWithShape="0">
                         <a:srgbClr val="000000">
@@ -16093,7 +16235,7 @@
               <a:effectLst/>
               <a:extLst>
                 <a:ext uri="{91240B29-F687-4f45-9708-019B960494DF}">
-                  <a14:hiddenLine xmlns:a14="http://schemas.microsoft.com/office/drawing/2010/main" xmlns="" w="9525" cap="flat">
+                  <a14:hiddenLine xmlns="" xmlns:a14="http://schemas.microsoft.com/office/drawing/2010/main" w="9525" cap="flat">
                     <a:solidFill>
                       <a:srgbClr val="808080"/>
                     </a:solidFill>
@@ -16103,7 +16245,7 @@
                   </a14:hiddenLine>
                 </a:ext>
                 <a:ext uri="{AF507438-7753-43e0-B8FC-AC1667EBCBE1}">
-                  <a14:hiddenEffects xmlns:a14="http://schemas.microsoft.com/office/drawing/2010/main" xmlns="">
+                  <a14:hiddenEffects xmlns="" xmlns:a14="http://schemas.microsoft.com/office/drawing/2010/main">
                     <a:effectLst>
                       <a:outerShdw blurRad="63500" dist="38099" dir="2700000" algn="ctr" rotWithShape="0">
                         <a:srgbClr val="000000">
@@ -16372,7 +16514,7 @@
               <a:effectLst/>
               <a:extLst>
                 <a:ext uri="{91240B29-F687-4f45-9708-019B960494DF}">
-                  <a14:hiddenLine xmlns:a14="http://schemas.microsoft.com/office/drawing/2010/main" xmlns="" w="9525" cap="flat">
+                  <a14:hiddenLine xmlns="" xmlns:a14="http://schemas.microsoft.com/office/drawing/2010/main" w="9525" cap="flat">
                     <a:solidFill>
                       <a:srgbClr val="808080"/>
                     </a:solidFill>
@@ -16382,7 +16524,7 @@
                   </a14:hiddenLine>
                 </a:ext>
                 <a:ext uri="{AF507438-7753-43e0-B8FC-AC1667EBCBE1}">
-                  <a14:hiddenEffects xmlns:a14="http://schemas.microsoft.com/office/drawing/2010/main" xmlns="">
+                  <a14:hiddenEffects xmlns="" xmlns:a14="http://schemas.microsoft.com/office/drawing/2010/main">
                     <a:effectLst>
                       <a:outerShdw blurRad="63500" dist="38099" dir="2700000" algn="ctr" rotWithShape="0">
                         <a:srgbClr val="000000">
@@ -16521,7 +16663,7 @@
               <a:effectLst/>
               <a:extLst>
                 <a:ext uri="{91240B29-F687-4f45-9708-019B960494DF}">
-                  <a14:hiddenLine xmlns:a14="http://schemas.microsoft.com/office/drawing/2010/main" xmlns="" w="9525" cap="flat">
+                  <a14:hiddenLine xmlns="" xmlns:a14="http://schemas.microsoft.com/office/drawing/2010/main" w="9525" cap="flat">
                     <a:solidFill>
                       <a:srgbClr val="808080"/>
                     </a:solidFill>
@@ -16531,7 +16673,7 @@
                   </a14:hiddenLine>
                 </a:ext>
                 <a:ext uri="{AF507438-7753-43e0-B8FC-AC1667EBCBE1}">
-                  <a14:hiddenEffects xmlns:a14="http://schemas.microsoft.com/office/drawing/2010/main" xmlns="">
+                  <a14:hiddenEffects xmlns="" xmlns:a14="http://schemas.microsoft.com/office/drawing/2010/main">
                     <a:effectLst>
                       <a:outerShdw blurRad="63500" dist="38099" dir="2700000" algn="ctr" rotWithShape="0">
                         <a:srgbClr val="000000">
@@ -16665,7 +16807,7 @@
               <a:effectLst/>
               <a:extLst>
                 <a:ext uri="{91240B29-F687-4f45-9708-019B960494DF}">
-                  <a14:hiddenLine xmlns:a14="http://schemas.microsoft.com/office/drawing/2010/main" xmlns="" w="9525" cap="flat">
+                  <a14:hiddenLine xmlns="" xmlns:a14="http://schemas.microsoft.com/office/drawing/2010/main" w="9525" cap="flat">
                     <a:solidFill>
                       <a:srgbClr val="808080"/>
                     </a:solidFill>
@@ -16675,7 +16817,7 @@
                   </a14:hiddenLine>
                 </a:ext>
                 <a:ext uri="{AF507438-7753-43e0-B8FC-AC1667EBCBE1}">
-                  <a14:hiddenEffects xmlns:a14="http://schemas.microsoft.com/office/drawing/2010/main" xmlns="">
+                  <a14:hiddenEffects xmlns="" xmlns:a14="http://schemas.microsoft.com/office/drawing/2010/main">
                     <a:effectLst>
                       <a:outerShdw blurRad="63500" dist="38099" dir="2700000" algn="ctr" rotWithShape="0">
                         <a:srgbClr val="000000">
@@ -16781,7 +16923,7 @@
               <a:effectLst/>
               <a:extLst>
                 <a:ext uri="{91240B29-F687-4f45-9708-019B960494DF}">
-                  <a14:hiddenLine xmlns:a14="http://schemas.microsoft.com/office/drawing/2010/main" xmlns="" w="9525" cap="flat">
+                  <a14:hiddenLine xmlns="" xmlns:a14="http://schemas.microsoft.com/office/drawing/2010/main" w="9525" cap="flat">
                     <a:solidFill>
                       <a:srgbClr val="808080"/>
                     </a:solidFill>
@@ -16791,7 +16933,7 @@
                   </a14:hiddenLine>
                 </a:ext>
                 <a:ext uri="{AF507438-7753-43e0-B8FC-AC1667EBCBE1}">
-                  <a14:hiddenEffects xmlns:a14="http://schemas.microsoft.com/office/drawing/2010/main" xmlns="">
+                  <a14:hiddenEffects xmlns="" xmlns:a14="http://schemas.microsoft.com/office/drawing/2010/main">
                     <a:effectLst>
                       <a:outerShdw blurRad="63500" dist="38099" dir="2700000" algn="ctr" rotWithShape="0">
                         <a:srgbClr val="000000">
@@ -16917,7 +17059,7 @@
               <a:effectLst/>
               <a:extLst>
                 <a:ext uri="{91240B29-F687-4f45-9708-019B960494DF}">
-                  <a14:hiddenLine xmlns:a14="http://schemas.microsoft.com/office/drawing/2010/main" xmlns="" w="9525" cap="flat">
+                  <a14:hiddenLine xmlns="" xmlns:a14="http://schemas.microsoft.com/office/drawing/2010/main" w="9525" cap="flat">
                     <a:solidFill>
                       <a:srgbClr val="808080"/>
                     </a:solidFill>
@@ -16927,7 +17069,7 @@
                   </a14:hiddenLine>
                 </a:ext>
                 <a:ext uri="{AF507438-7753-43e0-B8FC-AC1667EBCBE1}">
-                  <a14:hiddenEffects xmlns:a14="http://schemas.microsoft.com/office/drawing/2010/main" xmlns="">
+                  <a14:hiddenEffects xmlns="" xmlns:a14="http://schemas.microsoft.com/office/drawing/2010/main">
                     <a:effectLst>
                       <a:outerShdw blurRad="63500" dist="38099" dir="2700000" algn="ctr" rotWithShape="0">
                         <a:srgbClr val="000000">
@@ -17053,7 +17195,7 @@
               <a:effectLst/>
               <a:extLst>
                 <a:ext uri="{91240B29-F687-4f45-9708-019B960494DF}">
-                  <a14:hiddenLine xmlns:a14="http://schemas.microsoft.com/office/drawing/2010/main" xmlns="" w="9525" cap="flat">
+                  <a14:hiddenLine xmlns="" xmlns:a14="http://schemas.microsoft.com/office/drawing/2010/main" w="9525" cap="flat">
                     <a:solidFill>
                       <a:srgbClr val="808080"/>
                     </a:solidFill>
@@ -17063,7 +17205,7 @@
                   </a14:hiddenLine>
                 </a:ext>
                 <a:ext uri="{AF507438-7753-43e0-B8FC-AC1667EBCBE1}">
-                  <a14:hiddenEffects xmlns:a14="http://schemas.microsoft.com/office/drawing/2010/main" xmlns="">
+                  <a14:hiddenEffects xmlns="" xmlns:a14="http://schemas.microsoft.com/office/drawing/2010/main">
                     <a:effectLst>
                       <a:outerShdw blurRad="63500" dist="38099" dir="2700000" algn="ctr" rotWithShape="0">
                         <a:srgbClr val="000000">
@@ -17180,7 +17322,7 @@
               <a:effectLst/>
               <a:extLst>
                 <a:ext uri="{91240B29-F687-4f45-9708-019B960494DF}">
-                  <a14:hiddenLine xmlns:a14="http://schemas.microsoft.com/office/drawing/2010/main" xmlns="" w="9525" cap="flat">
+                  <a14:hiddenLine xmlns="" xmlns:a14="http://schemas.microsoft.com/office/drawing/2010/main" w="9525" cap="flat">
                     <a:solidFill>
                       <a:srgbClr val="808080"/>
                     </a:solidFill>
@@ -17190,7 +17332,7 @@
                   </a14:hiddenLine>
                 </a:ext>
                 <a:ext uri="{AF507438-7753-43e0-B8FC-AC1667EBCBE1}">
-                  <a14:hiddenEffects xmlns:a14="http://schemas.microsoft.com/office/drawing/2010/main" xmlns="">
+                  <a14:hiddenEffects xmlns="" xmlns:a14="http://schemas.microsoft.com/office/drawing/2010/main">
                     <a:effectLst>
                       <a:outerShdw blurRad="63500" dist="38099" dir="2700000" algn="ctr" rotWithShape="0">
                         <a:srgbClr val="000000">
@@ -17299,7 +17441,7 @@
               <a:effectLst/>
               <a:extLst>
                 <a:ext uri="{91240B29-F687-4f45-9708-019B960494DF}">
-                  <a14:hiddenLine xmlns:a14="http://schemas.microsoft.com/office/drawing/2010/main" xmlns="" w="9525" cap="flat">
+                  <a14:hiddenLine xmlns="" xmlns:a14="http://schemas.microsoft.com/office/drawing/2010/main" w="9525" cap="flat">
                     <a:solidFill>
                       <a:srgbClr val="808080"/>
                     </a:solidFill>
@@ -17309,7 +17451,7 @@
                   </a14:hiddenLine>
                 </a:ext>
                 <a:ext uri="{AF507438-7753-43e0-B8FC-AC1667EBCBE1}">
-                  <a14:hiddenEffects xmlns:a14="http://schemas.microsoft.com/office/drawing/2010/main" xmlns="">
+                  <a14:hiddenEffects xmlns="" xmlns:a14="http://schemas.microsoft.com/office/drawing/2010/main">
                     <a:effectLst>
                       <a:outerShdw blurRad="63500" dist="38099" dir="2700000" algn="ctr" rotWithShape="0">
                         <a:srgbClr val="000000">
@@ -17426,7 +17568,7 @@
               <a:effectLst/>
               <a:extLst>
                 <a:ext uri="{91240B29-F687-4f45-9708-019B960494DF}">
-                  <a14:hiddenLine xmlns:a14="http://schemas.microsoft.com/office/drawing/2010/main" xmlns="" w="9525" cap="flat">
+                  <a14:hiddenLine xmlns="" xmlns:a14="http://schemas.microsoft.com/office/drawing/2010/main" w="9525" cap="flat">
                     <a:solidFill>
                       <a:srgbClr val="808080"/>
                     </a:solidFill>
@@ -17436,7 +17578,7 @@
                   </a14:hiddenLine>
                 </a:ext>
                 <a:ext uri="{AF507438-7753-43e0-B8FC-AC1667EBCBE1}">
-                  <a14:hiddenEffects xmlns:a14="http://schemas.microsoft.com/office/drawing/2010/main" xmlns="">
+                  <a14:hiddenEffects xmlns="" xmlns:a14="http://schemas.microsoft.com/office/drawing/2010/main">
                     <a:effectLst>
                       <a:outerShdw blurRad="63500" dist="38099" dir="2700000" algn="ctr" rotWithShape="0">
                         <a:srgbClr val="000000">
@@ -17553,7 +17695,7 @@
               <a:effectLst/>
               <a:extLst>
                 <a:ext uri="{91240B29-F687-4f45-9708-019B960494DF}">
-                  <a14:hiddenLine xmlns:a14="http://schemas.microsoft.com/office/drawing/2010/main" xmlns="" w="9525" cap="flat">
+                  <a14:hiddenLine xmlns="" xmlns:a14="http://schemas.microsoft.com/office/drawing/2010/main" w="9525" cap="flat">
                     <a:solidFill>
                       <a:srgbClr val="808080"/>
                     </a:solidFill>
@@ -17563,7 +17705,7 @@
                   </a14:hiddenLine>
                 </a:ext>
                 <a:ext uri="{AF507438-7753-43e0-B8FC-AC1667EBCBE1}">
-                  <a14:hiddenEffects xmlns:a14="http://schemas.microsoft.com/office/drawing/2010/main" xmlns="">
+                  <a14:hiddenEffects xmlns="" xmlns:a14="http://schemas.microsoft.com/office/drawing/2010/main">
                     <a:effectLst>
                       <a:outerShdw blurRad="63500" dist="38099" dir="2700000" algn="ctr" rotWithShape="0">
                         <a:srgbClr val="000000">
@@ -17680,7 +17822,7 @@
               <a:effectLst/>
               <a:extLst>
                 <a:ext uri="{91240B29-F687-4f45-9708-019B960494DF}">
-                  <a14:hiddenLine xmlns:a14="http://schemas.microsoft.com/office/drawing/2010/main" xmlns="" w="9525" cap="flat">
+                  <a14:hiddenLine xmlns="" xmlns:a14="http://schemas.microsoft.com/office/drawing/2010/main" w="9525" cap="flat">
                     <a:solidFill>
                       <a:srgbClr val="808080"/>
                     </a:solidFill>
@@ -17690,7 +17832,7 @@
                   </a14:hiddenLine>
                 </a:ext>
                 <a:ext uri="{AF507438-7753-43e0-B8FC-AC1667EBCBE1}">
-                  <a14:hiddenEffects xmlns:a14="http://schemas.microsoft.com/office/drawing/2010/main" xmlns="">
+                  <a14:hiddenEffects xmlns="" xmlns:a14="http://schemas.microsoft.com/office/drawing/2010/main">
                     <a:effectLst>
                       <a:outerShdw blurRad="63500" dist="38099" dir="2700000" algn="ctr" rotWithShape="0">
                         <a:srgbClr val="000000">
@@ -17807,7 +17949,7 @@
               <a:effectLst/>
               <a:extLst>
                 <a:ext uri="{91240B29-F687-4f45-9708-019B960494DF}">
-                  <a14:hiddenLine xmlns:a14="http://schemas.microsoft.com/office/drawing/2010/main" xmlns="" w="9525" cap="flat">
+                  <a14:hiddenLine xmlns="" xmlns:a14="http://schemas.microsoft.com/office/drawing/2010/main" w="9525" cap="flat">
                     <a:solidFill>
                       <a:srgbClr val="808080"/>
                     </a:solidFill>
@@ -17817,7 +17959,7 @@
                   </a14:hiddenLine>
                 </a:ext>
                 <a:ext uri="{AF507438-7753-43e0-B8FC-AC1667EBCBE1}">
-                  <a14:hiddenEffects xmlns:a14="http://schemas.microsoft.com/office/drawing/2010/main" xmlns="">
+                  <a14:hiddenEffects xmlns="" xmlns:a14="http://schemas.microsoft.com/office/drawing/2010/main">
                     <a:effectLst>
                       <a:outerShdw blurRad="63500" dist="38099" dir="2700000" algn="ctr" rotWithShape="0">
                         <a:srgbClr val="000000">
@@ -17967,7 +18109,7 @@
               <a:effectLst/>
               <a:extLst>
                 <a:ext uri="{91240B29-F687-4f45-9708-019B960494DF}">
-                  <a14:hiddenLine xmlns:a14="http://schemas.microsoft.com/office/drawing/2010/main" xmlns="" w="9525" cap="flat">
+                  <a14:hiddenLine xmlns="" xmlns:a14="http://schemas.microsoft.com/office/drawing/2010/main" w="9525" cap="flat">
                     <a:solidFill>
                       <a:srgbClr val="808080"/>
                     </a:solidFill>
@@ -17977,7 +18119,7 @@
                   </a14:hiddenLine>
                 </a:ext>
                 <a:ext uri="{AF507438-7753-43e0-B8FC-AC1667EBCBE1}">
-                  <a14:hiddenEffects xmlns:a14="http://schemas.microsoft.com/office/drawing/2010/main" xmlns="">
+                  <a14:hiddenEffects xmlns="" xmlns:a14="http://schemas.microsoft.com/office/drawing/2010/main">
                     <a:effectLst>
                       <a:outerShdw blurRad="63500" dist="38099" dir="2700000" algn="ctr" rotWithShape="0">
                         <a:srgbClr val="000000">
@@ -18072,7 +18214,7 @@
               <a:effectLst/>
               <a:extLst>
                 <a:ext uri="{91240B29-F687-4f45-9708-019B960494DF}">
-                  <a14:hiddenLine xmlns:a14="http://schemas.microsoft.com/office/drawing/2010/main" xmlns="" w="9525" cap="flat">
+                  <a14:hiddenLine xmlns="" xmlns:a14="http://schemas.microsoft.com/office/drawing/2010/main" w="9525" cap="flat">
                     <a:solidFill>
                       <a:srgbClr val="808080"/>
                     </a:solidFill>
@@ -18082,7 +18224,7 @@
                   </a14:hiddenLine>
                 </a:ext>
                 <a:ext uri="{AF507438-7753-43e0-B8FC-AC1667EBCBE1}">
-                  <a14:hiddenEffects xmlns:a14="http://schemas.microsoft.com/office/drawing/2010/main" xmlns="">
+                  <a14:hiddenEffects xmlns="" xmlns:a14="http://schemas.microsoft.com/office/drawing/2010/main">
                     <a:effectLst>
                       <a:outerShdw blurRad="63500" dist="38099" dir="2700000" algn="ctr" rotWithShape="0">
                         <a:srgbClr val="000000">
@@ -18182,7 +18324,7 @@
               <a:effectLst/>
               <a:extLst>
                 <a:ext uri="{91240B29-F687-4f45-9708-019B960494DF}">
-                  <a14:hiddenLine xmlns:a14="http://schemas.microsoft.com/office/drawing/2010/main" xmlns="" w="9525" cap="flat">
+                  <a14:hiddenLine xmlns="" xmlns:a14="http://schemas.microsoft.com/office/drawing/2010/main" w="9525" cap="flat">
                     <a:solidFill>
                       <a:srgbClr val="808080"/>
                     </a:solidFill>
@@ -18192,7 +18334,7 @@
                   </a14:hiddenLine>
                 </a:ext>
                 <a:ext uri="{AF507438-7753-43e0-B8FC-AC1667EBCBE1}">
-                  <a14:hiddenEffects xmlns:a14="http://schemas.microsoft.com/office/drawing/2010/main" xmlns="">
+                  <a14:hiddenEffects xmlns="" xmlns:a14="http://schemas.microsoft.com/office/drawing/2010/main">
                     <a:effectLst>
                       <a:outerShdw blurRad="63500" dist="38099" dir="2700000" algn="ctr" rotWithShape="0">
                         <a:srgbClr val="000000">
@@ -18292,7 +18434,7 @@
               <a:effectLst/>
               <a:extLst>
                 <a:ext uri="{91240B29-F687-4f45-9708-019B960494DF}">
-                  <a14:hiddenLine xmlns:a14="http://schemas.microsoft.com/office/drawing/2010/main" xmlns="" w="9525" cap="flat">
+                  <a14:hiddenLine xmlns="" xmlns:a14="http://schemas.microsoft.com/office/drawing/2010/main" w="9525" cap="flat">
                     <a:solidFill>
                       <a:srgbClr val="808080"/>
                     </a:solidFill>
@@ -18302,7 +18444,7 @@
                   </a14:hiddenLine>
                 </a:ext>
                 <a:ext uri="{AF507438-7753-43e0-B8FC-AC1667EBCBE1}">
-                  <a14:hiddenEffects xmlns:a14="http://schemas.microsoft.com/office/drawing/2010/main" xmlns="">
+                  <a14:hiddenEffects xmlns="" xmlns:a14="http://schemas.microsoft.com/office/drawing/2010/main">
                     <a:effectLst>
                       <a:outerShdw blurRad="63500" dist="38099" dir="2700000" algn="ctr" rotWithShape="0">
                         <a:srgbClr val="000000">
@@ -18439,7 +18581,7 @@
               <a:effectLst/>
               <a:extLst>
                 <a:ext uri="{91240B29-F687-4f45-9708-019B960494DF}">
-                  <a14:hiddenLine xmlns:a14="http://schemas.microsoft.com/office/drawing/2010/main" xmlns="" w="9525" cap="flat">
+                  <a14:hiddenLine xmlns="" xmlns:a14="http://schemas.microsoft.com/office/drawing/2010/main" w="9525" cap="flat">
                     <a:solidFill>
                       <a:srgbClr val="808080"/>
                     </a:solidFill>
@@ -18449,7 +18591,7 @@
                   </a14:hiddenLine>
                 </a:ext>
                 <a:ext uri="{AF507438-7753-43e0-B8FC-AC1667EBCBE1}">
-                  <a14:hiddenEffects xmlns:a14="http://schemas.microsoft.com/office/drawing/2010/main" xmlns="">
+                  <a14:hiddenEffects xmlns="" xmlns:a14="http://schemas.microsoft.com/office/drawing/2010/main">
                     <a:effectLst>
                       <a:outerShdw blurRad="63500" dist="38099" dir="2700000" algn="ctr" rotWithShape="0">
                         <a:srgbClr val="000000">
@@ -18586,7 +18728,7 @@
               <a:effectLst/>
               <a:extLst>
                 <a:ext uri="{91240B29-F687-4f45-9708-019B960494DF}">
-                  <a14:hiddenLine xmlns:a14="http://schemas.microsoft.com/office/drawing/2010/main" xmlns="" w="9525" cap="flat">
+                  <a14:hiddenLine xmlns="" xmlns:a14="http://schemas.microsoft.com/office/drawing/2010/main" w="9525" cap="flat">
                     <a:solidFill>
                       <a:srgbClr val="808080"/>
                     </a:solidFill>
@@ -18596,7 +18738,7 @@
                   </a14:hiddenLine>
                 </a:ext>
                 <a:ext uri="{AF507438-7753-43e0-B8FC-AC1667EBCBE1}">
-                  <a14:hiddenEffects xmlns:a14="http://schemas.microsoft.com/office/drawing/2010/main" xmlns="">
+                  <a14:hiddenEffects xmlns="" xmlns:a14="http://schemas.microsoft.com/office/drawing/2010/main">
                     <a:effectLst>
                       <a:outerShdw blurRad="63500" dist="38099" dir="2700000" algn="ctr" rotWithShape="0">
                         <a:srgbClr val="000000">
@@ -18702,7 +18844,7 @@
               <a:effectLst/>
               <a:extLst>
                 <a:ext uri="{91240B29-F687-4f45-9708-019B960494DF}">
-                  <a14:hiddenLine xmlns:a14="http://schemas.microsoft.com/office/drawing/2010/main" xmlns="" w="9525" cap="flat">
+                  <a14:hiddenLine xmlns="" xmlns:a14="http://schemas.microsoft.com/office/drawing/2010/main" w="9525" cap="flat">
                     <a:solidFill>
                       <a:srgbClr val="808080"/>
                     </a:solidFill>
@@ -18712,7 +18854,7 @@
                   </a14:hiddenLine>
                 </a:ext>
                 <a:ext uri="{AF507438-7753-43e0-B8FC-AC1667EBCBE1}">
-                  <a14:hiddenEffects xmlns:a14="http://schemas.microsoft.com/office/drawing/2010/main" xmlns="">
+                  <a14:hiddenEffects xmlns="" xmlns:a14="http://schemas.microsoft.com/office/drawing/2010/main">
                     <a:effectLst>
                       <a:outerShdw blurRad="63500" dist="38099" dir="2700000" algn="ctr" rotWithShape="0">
                         <a:srgbClr val="000000">
@@ -19179,7 +19321,7 @@
               <a:effectLst/>
               <a:extLst>
                 <a:ext uri="{91240B29-F687-4f45-9708-019B960494DF}">
-                  <a14:hiddenLine xmlns:a14="http://schemas.microsoft.com/office/drawing/2010/main" xmlns="" w="9525" cap="flat">
+                  <a14:hiddenLine xmlns="" xmlns:a14="http://schemas.microsoft.com/office/drawing/2010/main" w="9525" cap="flat">
                     <a:solidFill>
                       <a:srgbClr val="808080"/>
                     </a:solidFill>
@@ -19189,7 +19331,7 @@
                   </a14:hiddenLine>
                 </a:ext>
                 <a:ext uri="{AF507438-7753-43e0-B8FC-AC1667EBCBE1}">
-                  <a14:hiddenEffects xmlns:a14="http://schemas.microsoft.com/office/drawing/2010/main" xmlns="">
+                  <a14:hiddenEffects xmlns="" xmlns:a14="http://schemas.microsoft.com/office/drawing/2010/main">
                     <a:effectLst>
                       <a:outerShdw blurRad="63500" dist="38099" dir="2700000" algn="ctr" rotWithShape="0">
                         <a:srgbClr val="000000">
@@ -19295,7 +19437,7 @@
               <a:effectLst/>
               <a:extLst>
                 <a:ext uri="{91240B29-F687-4f45-9708-019B960494DF}">
-                  <a14:hiddenLine xmlns:a14="http://schemas.microsoft.com/office/drawing/2010/main" xmlns="" w="9525" cap="flat">
+                  <a14:hiddenLine xmlns="" xmlns:a14="http://schemas.microsoft.com/office/drawing/2010/main" w="9525" cap="flat">
                     <a:solidFill>
                       <a:srgbClr val="808080"/>
                     </a:solidFill>
@@ -19305,7 +19447,7 @@
                   </a14:hiddenLine>
                 </a:ext>
                 <a:ext uri="{AF507438-7753-43e0-B8FC-AC1667EBCBE1}">
-                  <a14:hiddenEffects xmlns:a14="http://schemas.microsoft.com/office/drawing/2010/main" xmlns="">
+                  <a14:hiddenEffects xmlns="" xmlns:a14="http://schemas.microsoft.com/office/drawing/2010/main">
                     <a:effectLst>
                       <a:outerShdw blurRad="63500" dist="38099" dir="2700000" algn="ctr" rotWithShape="0">
                         <a:srgbClr val="000000">
@@ -19405,7 +19547,7 @@
               <a:effectLst/>
               <a:extLst>
                 <a:ext uri="{91240B29-F687-4f45-9708-019B960494DF}">
-                  <a14:hiddenLine xmlns:a14="http://schemas.microsoft.com/office/drawing/2010/main" xmlns="" w="9525" cap="flat">
+                  <a14:hiddenLine xmlns="" xmlns:a14="http://schemas.microsoft.com/office/drawing/2010/main" w="9525" cap="flat">
                     <a:solidFill>
                       <a:srgbClr val="808080"/>
                     </a:solidFill>
@@ -19415,7 +19557,7 @@
                   </a14:hiddenLine>
                 </a:ext>
                 <a:ext uri="{AF507438-7753-43e0-B8FC-AC1667EBCBE1}">
-                  <a14:hiddenEffects xmlns:a14="http://schemas.microsoft.com/office/drawing/2010/main" xmlns="">
+                  <a14:hiddenEffects xmlns="" xmlns:a14="http://schemas.microsoft.com/office/drawing/2010/main">
                     <a:effectLst>
                       <a:outerShdw blurRad="63500" dist="38099" dir="2700000" algn="ctr" rotWithShape="0">
                         <a:srgbClr val="000000">
@@ -19576,7 +19718,7 @@
               <a:effectLst/>
               <a:extLst>
                 <a:ext uri="{91240B29-F687-4f45-9708-019B960494DF}">
-                  <a14:hiddenLine xmlns:a14="http://schemas.microsoft.com/office/drawing/2010/main" xmlns="" w="9525" cap="flat">
+                  <a14:hiddenLine xmlns="" xmlns:a14="http://schemas.microsoft.com/office/drawing/2010/main" w="9525" cap="flat">
                     <a:solidFill>
                       <a:srgbClr val="808080"/>
                     </a:solidFill>
@@ -19586,7 +19728,7 @@
                   </a14:hiddenLine>
                 </a:ext>
                 <a:ext uri="{AF507438-7753-43e0-B8FC-AC1667EBCBE1}">
-                  <a14:hiddenEffects xmlns:a14="http://schemas.microsoft.com/office/drawing/2010/main" xmlns="">
+                  <a14:hiddenEffects xmlns="" xmlns:a14="http://schemas.microsoft.com/office/drawing/2010/main">
                     <a:effectLst>
                       <a:outerShdw blurRad="63500" dist="38099" dir="2700000" algn="ctr" rotWithShape="0">
                         <a:srgbClr val="000000">
@@ -19747,7 +19889,7 @@
               <a:effectLst/>
               <a:extLst>
                 <a:ext uri="{91240B29-F687-4f45-9708-019B960494DF}">
-                  <a14:hiddenLine xmlns:a14="http://schemas.microsoft.com/office/drawing/2010/main" xmlns="" w="9525" cap="flat">
+                  <a14:hiddenLine xmlns="" xmlns:a14="http://schemas.microsoft.com/office/drawing/2010/main" w="9525" cap="flat">
                     <a:solidFill>
                       <a:srgbClr val="808080"/>
                     </a:solidFill>
@@ -19757,7 +19899,7 @@
                   </a14:hiddenLine>
                 </a:ext>
                 <a:ext uri="{AF507438-7753-43e0-B8FC-AC1667EBCBE1}">
-                  <a14:hiddenEffects xmlns:a14="http://schemas.microsoft.com/office/drawing/2010/main" xmlns="">
+                  <a14:hiddenEffects xmlns="" xmlns:a14="http://schemas.microsoft.com/office/drawing/2010/main">
                     <a:effectLst>
                       <a:outerShdw blurRad="63500" dist="38099" dir="2700000" algn="ctr" rotWithShape="0">
                         <a:srgbClr val="000000">
@@ -19874,7 +20016,7 @@
               <a:effectLst/>
               <a:extLst>
                 <a:ext uri="{91240B29-F687-4f45-9708-019B960494DF}">
-                  <a14:hiddenLine xmlns:a14="http://schemas.microsoft.com/office/drawing/2010/main" xmlns="" w="9525" cap="flat">
+                  <a14:hiddenLine xmlns="" xmlns:a14="http://schemas.microsoft.com/office/drawing/2010/main" w="9525" cap="flat">
                     <a:solidFill>
                       <a:srgbClr val="808080"/>
                     </a:solidFill>
@@ -19884,7 +20026,7 @@
                   </a14:hiddenLine>
                 </a:ext>
                 <a:ext uri="{AF507438-7753-43e0-B8FC-AC1667EBCBE1}">
-                  <a14:hiddenEffects xmlns:a14="http://schemas.microsoft.com/office/drawing/2010/main" xmlns="">
+                  <a14:hiddenEffects xmlns="" xmlns:a14="http://schemas.microsoft.com/office/drawing/2010/main">
                     <a:effectLst>
                       <a:outerShdw blurRad="63500" dist="38099" dir="2700000" algn="ctr" rotWithShape="0">
                         <a:srgbClr val="000000">
@@ -20001,7 +20143,7 @@
               <a:effectLst/>
               <a:extLst>
                 <a:ext uri="{91240B29-F687-4f45-9708-019B960494DF}">
-                  <a14:hiddenLine xmlns:a14="http://schemas.microsoft.com/office/drawing/2010/main" xmlns="" w="9525" cap="flat">
+                  <a14:hiddenLine xmlns="" xmlns:a14="http://schemas.microsoft.com/office/drawing/2010/main" w="9525" cap="flat">
                     <a:solidFill>
                       <a:srgbClr val="808080"/>
                     </a:solidFill>
@@ -20011,7 +20153,7 @@
                   </a14:hiddenLine>
                 </a:ext>
                 <a:ext uri="{AF507438-7753-43e0-B8FC-AC1667EBCBE1}">
-                  <a14:hiddenEffects xmlns:a14="http://schemas.microsoft.com/office/drawing/2010/main" xmlns="">
+                  <a14:hiddenEffects xmlns="" xmlns:a14="http://schemas.microsoft.com/office/drawing/2010/main">
                     <a:effectLst>
                       <a:outerShdw blurRad="63500" dist="38099" dir="2700000" algn="ctr" rotWithShape="0">
                         <a:srgbClr val="000000">
@@ -20128,7 +20270,7 @@
               <a:effectLst/>
               <a:extLst>
                 <a:ext uri="{91240B29-F687-4f45-9708-019B960494DF}">
-                  <a14:hiddenLine xmlns:a14="http://schemas.microsoft.com/office/drawing/2010/main" xmlns="" w="9525" cap="flat">
+                  <a14:hiddenLine xmlns="" xmlns:a14="http://schemas.microsoft.com/office/drawing/2010/main" w="9525" cap="flat">
                     <a:solidFill>
                       <a:srgbClr val="808080"/>
                     </a:solidFill>
@@ -20138,7 +20280,7 @@
                   </a14:hiddenLine>
                 </a:ext>
                 <a:ext uri="{AF507438-7753-43e0-B8FC-AC1667EBCBE1}">
-                  <a14:hiddenEffects xmlns:a14="http://schemas.microsoft.com/office/drawing/2010/main" xmlns="">
+                  <a14:hiddenEffects xmlns="" xmlns:a14="http://schemas.microsoft.com/office/drawing/2010/main">
                     <a:effectLst>
                       <a:outerShdw blurRad="63500" dist="38099" dir="2700000" algn="ctr" rotWithShape="0">
                         <a:srgbClr val="000000">
@@ -20255,7 +20397,7 @@
               <a:effectLst/>
               <a:extLst>
                 <a:ext uri="{91240B29-F687-4f45-9708-019B960494DF}">
-                  <a14:hiddenLine xmlns:a14="http://schemas.microsoft.com/office/drawing/2010/main" xmlns="" w="9525" cap="flat">
+                  <a14:hiddenLine xmlns="" xmlns:a14="http://schemas.microsoft.com/office/drawing/2010/main" w="9525" cap="flat">
                     <a:solidFill>
                       <a:srgbClr val="808080"/>
                     </a:solidFill>
@@ -20265,7 +20407,7 @@
                   </a14:hiddenLine>
                 </a:ext>
                 <a:ext uri="{AF507438-7753-43e0-B8FC-AC1667EBCBE1}">
-                  <a14:hiddenEffects xmlns:a14="http://schemas.microsoft.com/office/drawing/2010/main" xmlns="">
+                  <a14:hiddenEffects xmlns="" xmlns:a14="http://schemas.microsoft.com/office/drawing/2010/main">
                     <a:effectLst>
                       <a:outerShdw blurRad="63500" dist="38099" dir="2700000" algn="ctr" rotWithShape="0">
                         <a:srgbClr val="000000">
@@ -20371,7 +20513,7 @@
               <a:effectLst/>
               <a:extLst>
                 <a:ext uri="{91240B29-F687-4f45-9708-019B960494DF}">
-                  <a14:hiddenLine xmlns:a14="http://schemas.microsoft.com/office/drawing/2010/main" xmlns="" w="9525" cap="flat">
+                  <a14:hiddenLine xmlns="" xmlns:a14="http://schemas.microsoft.com/office/drawing/2010/main" w="9525" cap="flat">
                     <a:solidFill>
                       <a:srgbClr val="808080"/>
                     </a:solidFill>
@@ -20381,7 +20523,7 @@
                   </a14:hiddenLine>
                 </a:ext>
                 <a:ext uri="{AF507438-7753-43e0-B8FC-AC1667EBCBE1}">
-                  <a14:hiddenEffects xmlns:a14="http://schemas.microsoft.com/office/drawing/2010/main" xmlns="">
+                  <a14:hiddenEffects xmlns="" xmlns:a14="http://schemas.microsoft.com/office/drawing/2010/main">
                     <a:effectLst>
                       <a:outerShdw blurRad="63500" dist="38099" dir="2700000" algn="ctr" rotWithShape="0">
                         <a:srgbClr val="000000">
@@ -20650,7 +20792,7 @@
               <a:effectLst/>
               <a:extLst>
                 <a:ext uri="{91240B29-F687-4f45-9708-019B960494DF}">
-                  <a14:hiddenLine xmlns:a14="http://schemas.microsoft.com/office/drawing/2010/main" xmlns="" w="9525" cap="flat">
+                  <a14:hiddenLine xmlns="" xmlns:a14="http://schemas.microsoft.com/office/drawing/2010/main" w="9525" cap="flat">
                     <a:solidFill>
                       <a:srgbClr val="808080"/>
                     </a:solidFill>
@@ -20660,7 +20802,7 @@
                   </a14:hiddenLine>
                 </a:ext>
                 <a:ext uri="{AF507438-7753-43e0-B8FC-AC1667EBCBE1}">
-                  <a14:hiddenEffects xmlns:a14="http://schemas.microsoft.com/office/drawing/2010/main" xmlns="">
+                  <a14:hiddenEffects xmlns="" xmlns:a14="http://schemas.microsoft.com/office/drawing/2010/main">
                     <a:effectLst>
                       <a:outerShdw blurRad="63500" dist="38099" dir="2700000" algn="ctr" rotWithShape="0">
                         <a:srgbClr val="000000">
@@ -20799,7 +20941,7 @@
               <a:effectLst/>
               <a:extLst>
                 <a:ext uri="{91240B29-F687-4f45-9708-019B960494DF}">
-                  <a14:hiddenLine xmlns:a14="http://schemas.microsoft.com/office/drawing/2010/main" xmlns="" w="9525" cap="flat">
+                  <a14:hiddenLine xmlns="" xmlns:a14="http://schemas.microsoft.com/office/drawing/2010/main" w="9525" cap="flat">
                     <a:solidFill>
                       <a:srgbClr val="808080"/>
                     </a:solidFill>
@@ -20809,7 +20951,7 @@
                   </a14:hiddenLine>
                 </a:ext>
                 <a:ext uri="{AF507438-7753-43e0-B8FC-AC1667EBCBE1}">
-                  <a14:hiddenEffects xmlns:a14="http://schemas.microsoft.com/office/drawing/2010/main" xmlns="">
+                  <a14:hiddenEffects xmlns="" xmlns:a14="http://schemas.microsoft.com/office/drawing/2010/main">
                     <a:effectLst>
                       <a:outerShdw blurRad="63500" dist="38099" dir="2700000" algn="ctr" rotWithShape="0">
                         <a:srgbClr val="000000">
@@ -20943,7 +21085,7 @@
               <a:effectLst/>
               <a:extLst>
                 <a:ext uri="{91240B29-F687-4f45-9708-019B960494DF}">
-                  <a14:hiddenLine xmlns:a14="http://schemas.microsoft.com/office/drawing/2010/main" xmlns="" w="9525" cap="flat">
+                  <a14:hiddenLine xmlns="" xmlns:a14="http://schemas.microsoft.com/office/drawing/2010/main" w="9525" cap="flat">
                     <a:solidFill>
                       <a:srgbClr val="808080"/>
                     </a:solidFill>
@@ -20953,7 +21095,7 @@
                   </a14:hiddenLine>
                 </a:ext>
                 <a:ext uri="{AF507438-7753-43e0-B8FC-AC1667EBCBE1}">
-                  <a14:hiddenEffects xmlns:a14="http://schemas.microsoft.com/office/drawing/2010/main" xmlns="">
+                  <a14:hiddenEffects xmlns="" xmlns:a14="http://schemas.microsoft.com/office/drawing/2010/main">
                     <a:effectLst>
                       <a:outerShdw blurRad="63500" dist="38099" dir="2700000" algn="ctr" rotWithShape="0">
                         <a:srgbClr val="000000">
@@ -21059,7 +21201,7 @@
               <a:effectLst/>
               <a:extLst>
                 <a:ext uri="{91240B29-F687-4f45-9708-019B960494DF}">
-                  <a14:hiddenLine xmlns:a14="http://schemas.microsoft.com/office/drawing/2010/main" xmlns="" w="9525" cap="flat">
+                  <a14:hiddenLine xmlns="" xmlns:a14="http://schemas.microsoft.com/office/drawing/2010/main" w="9525" cap="flat">
                     <a:solidFill>
                       <a:srgbClr val="808080"/>
                     </a:solidFill>
@@ -21069,7 +21211,7 @@
                   </a14:hiddenLine>
                 </a:ext>
                 <a:ext uri="{AF507438-7753-43e0-B8FC-AC1667EBCBE1}">
-                  <a14:hiddenEffects xmlns:a14="http://schemas.microsoft.com/office/drawing/2010/main" xmlns="">
+                  <a14:hiddenEffects xmlns="" xmlns:a14="http://schemas.microsoft.com/office/drawing/2010/main">
                     <a:effectLst>
                       <a:outerShdw blurRad="63500" dist="38099" dir="2700000" algn="ctr" rotWithShape="0">
                         <a:srgbClr val="000000">
@@ -21195,7 +21337,7 @@
               <a:effectLst/>
               <a:extLst>
                 <a:ext uri="{91240B29-F687-4f45-9708-019B960494DF}">
-                  <a14:hiddenLine xmlns:a14="http://schemas.microsoft.com/office/drawing/2010/main" xmlns="" w="9525" cap="flat">
+                  <a14:hiddenLine xmlns="" xmlns:a14="http://schemas.microsoft.com/office/drawing/2010/main" w="9525" cap="flat">
                     <a:solidFill>
                       <a:srgbClr val="808080"/>
                     </a:solidFill>
@@ -21205,7 +21347,7 @@
                   </a14:hiddenLine>
                 </a:ext>
                 <a:ext uri="{AF507438-7753-43e0-B8FC-AC1667EBCBE1}">
-                  <a14:hiddenEffects xmlns:a14="http://schemas.microsoft.com/office/drawing/2010/main" xmlns="">
+                  <a14:hiddenEffects xmlns="" xmlns:a14="http://schemas.microsoft.com/office/drawing/2010/main">
                     <a:effectLst>
                       <a:outerShdw blurRad="63500" dist="38099" dir="2700000" algn="ctr" rotWithShape="0">
                         <a:srgbClr val="000000">
@@ -21331,7 +21473,7 @@
               <a:effectLst/>
               <a:extLst>
                 <a:ext uri="{91240B29-F687-4f45-9708-019B960494DF}">
-                  <a14:hiddenLine xmlns:a14="http://schemas.microsoft.com/office/drawing/2010/main" xmlns="" w="9525" cap="flat">
+                  <a14:hiddenLine xmlns="" xmlns:a14="http://schemas.microsoft.com/office/drawing/2010/main" w="9525" cap="flat">
                     <a:solidFill>
                       <a:srgbClr val="808080"/>
                     </a:solidFill>
@@ -21341,7 +21483,7 @@
                   </a14:hiddenLine>
                 </a:ext>
                 <a:ext uri="{AF507438-7753-43e0-B8FC-AC1667EBCBE1}">
-                  <a14:hiddenEffects xmlns:a14="http://schemas.microsoft.com/office/drawing/2010/main" xmlns="">
+                  <a14:hiddenEffects xmlns="" xmlns:a14="http://schemas.microsoft.com/office/drawing/2010/main">
                     <a:effectLst>
                       <a:outerShdw blurRad="63500" dist="38099" dir="2700000" algn="ctr" rotWithShape="0">
                         <a:srgbClr val="000000">
@@ -21458,7 +21600,7 @@
               <a:effectLst/>
               <a:extLst>
                 <a:ext uri="{91240B29-F687-4f45-9708-019B960494DF}">
-                  <a14:hiddenLine xmlns:a14="http://schemas.microsoft.com/office/drawing/2010/main" xmlns="" w="9525" cap="flat">
+                  <a14:hiddenLine xmlns="" xmlns:a14="http://schemas.microsoft.com/office/drawing/2010/main" w="9525" cap="flat">
                     <a:solidFill>
                       <a:srgbClr val="808080"/>
                     </a:solidFill>
@@ -21468,7 +21610,7 @@
                   </a14:hiddenLine>
                 </a:ext>
                 <a:ext uri="{AF507438-7753-43e0-B8FC-AC1667EBCBE1}">
-                  <a14:hiddenEffects xmlns:a14="http://schemas.microsoft.com/office/drawing/2010/main" xmlns="">
+                  <a14:hiddenEffects xmlns="" xmlns:a14="http://schemas.microsoft.com/office/drawing/2010/main">
                     <a:effectLst>
                       <a:outerShdw blurRad="63500" dist="38099" dir="2700000" algn="ctr" rotWithShape="0">
                         <a:srgbClr val="000000">
@@ -21577,7 +21719,7 @@
               <a:effectLst/>
               <a:extLst>
                 <a:ext uri="{91240B29-F687-4f45-9708-019B960494DF}">
-                  <a14:hiddenLine xmlns:a14="http://schemas.microsoft.com/office/drawing/2010/main" xmlns="" w="9525" cap="flat">
+                  <a14:hiddenLine xmlns="" xmlns:a14="http://schemas.microsoft.com/office/drawing/2010/main" w="9525" cap="flat">
                     <a:solidFill>
                       <a:srgbClr val="808080"/>
                     </a:solidFill>
@@ -21587,7 +21729,7 @@
                   </a14:hiddenLine>
                 </a:ext>
                 <a:ext uri="{AF507438-7753-43e0-B8FC-AC1667EBCBE1}">
-                  <a14:hiddenEffects xmlns:a14="http://schemas.microsoft.com/office/drawing/2010/main" xmlns="">
+                  <a14:hiddenEffects xmlns="" xmlns:a14="http://schemas.microsoft.com/office/drawing/2010/main">
                     <a:effectLst>
                       <a:outerShdw blurRad="63500" dist="38099" dir="2700000" algn="ctr" rotWithShape="0">
                         <a:srgbClr val="000000">
@@ -21704,7 +21846,7 @@
               <a:effectLst/>
               <a:extLst>
                 <a:ext uri="{91240B29-F687-4f45-9708-019B960494DF}">
-                  <a14:hiddenLine xmlns:a14="http://schemas.microsoft.com/office/drawing/2010/main" xmlns="" w="9525" cap="flat">
+                  <a14:hiddenLine xmlns="" xmlns:a14="http://schemas.microsoft.com/office/drawing/2010/main" w="9525" cap="flat">
                     <a:solidFill>
                       <a:srgbClr val="808080"/>
                     </a:solidFill>
@@ -21714,7 +21856,7 @@
                   </a14:hiddenLine>
                 </a:ext>
                 <a:ext uri="{AF507438-7753-43e0-B8FC-AC1667EBCBE1}">
-                  <a14:hiddenEffects xmlns:a14="http://schemas.microsoft.com/office/drawing/2010/main" xmlns="">
+                  <a14:hiddenEffects xmlns="" xmlns:a14="http://schemas.microsoft.com/office/drawing/2010/main">
                     <a:effectLst>
                       <a:outerShdw blurRad="63500" dist="38099" dir="2700000" algn="ctr" rotWithShape="0">
                         <a:srgbClr val="000000">
@@ -21831,7 +21973,7 @@
               <a:effectLst/>
               <a:extLst>
                 <a:ext uri="{91240B29-F687-4f45-9708-019B960494DF}">
-                  <a14:hiddenLine xmlns:a14="http://schemas.microsoft.com/office/drawing/2010/main" xmlns="" w="9525" cap="flat">
+                  <a14:hiddenLine xmlns="" xmlns:a14="http://schemas.microsoft.com/office/drawing/2010/main" w="9525" cap="flat">
                     <a:solidFill>
                       <a:srgbClr val="808080"/>
                     </a:solidFill>
@@ -21841,7 +21983,7 @@
                   </a14:hiddenLine>
                 </a:ext>
                 <a:ext uri="{AF507438-7753-43e0-B8FC-AC1667EBCBE1}">
-                  <a14:hiddenEffects xmlns:a14="http://schemas.microsoft.com/office/drawing/2010/main" xmlns="">
+                  <a14:hiddenEffects xmlns="" xmlns:a14="http://schemas.microsoft.com/office/drawing/2010/main">
                     <a:effectLst>
                       <a:outerShdw blurRad="63500" dist="38099" dir="2700000" algn="ctr" rotWithShape="0">
                         <a:srgbClr val="000000">
@@ -21958,7 +22100,7 @@
               <a:effectLst/>
               <a:extLst>
                 <a:ext uri="{91240B29-F687-4f45-9708-019B960494DF}">
-                  <a14:hiddenLine xmlns:a14="http://schemas.microsoft.com/office/drawing/2010/main" xmlns="" w="9525" cap="flat">
+                  <a14:hiddenLine xmlns="" xmlns:a14="http://schemas.microsoft.com/office/drawing/2010/main" w="9525" cap="flat">
                     <a:solidFill>
                       <a:srgbClr val="808080"/>
                     </a:solidFill>
@@ -21968,7 +22110,7 @@
                   </a14:hiddenLine>
                 </a:ext>
                 <a:ext uri="{AF507438-7753-43e0-B8FC-AC1667EBCBE1}">
-                  <a14:hiddenEffects xmlns:a14="http://schemas.microsoft.com/office/drawing/2010/main" xmlns="">
+                  <a14:hiddenEffects xmlns="" xmlns:a14="http://schemas.microsoft.com/office/drawing/2010/main">
                     <a:effectLst>
                       <a:outerShdw blurRad="63500" dist="38099" dir="2700000" algn="ctr" rotWithShape="0">
                         <a:srgbClr val="000000">
@@ -22085,7 +22227,7 @@
               <a:effectLst/>
               <a:extLst>
                 <a:ext uri="{91240B29-F687-4f45-9708-019B960494DF}">
-                  <a14:hiddenLine xmlns:a14="http://schemas.microsoft.com/office/drawing/2010/main" xmlns="" w="9525" cap="flat">
+                  <a14:hiddenLine xmlns="" xmlns:a14="http://schemas.microsoft.com/office/drawing/2010/main" w="9525" cap="flat">
                     <a:solidFill>
                       <a:srgbClr val="808080"/>
                     </a:solidFill>
@@ -22095,7 +22237,7 @@
                   </a14:hiddenLine>
                 </a:ext>
                 <a:ext uri="{AF507438-7753-43e0-B8FC-AC1667EBCBE1}">
-                  <a14:hiddenEffects xmlns:a14="http://schemas.microsoft.com/office/drawing/2010/main" xmlns="">
+                  <a14:hiddenEffects xmlns="" xmlns:a14="http://schemas.microsoft.com/office/drawing/2010/main">
                     <a:effectLst>
                       <a:outerShdw blurRad="63500" dist="38099" dir="2700000" algn="ctr" rotWithShape="0">
                         <a:srgbClr val="000000">
@@ -22245,7 +22387,7 @@
               <a:effectLst/>
               <a:extLst>
                 <a:ext uri="{91240B29-F687-4f45-9708-019B960494DF}">
-                  <a14:hiddenLine xmlns:a14="http://schemas.microsoft.com/office/drawing/2010/main" xmlns="" w="9525" cap="flat">
+                  <a14:hiddenLine xmlns="" xmlns:a14="http://schemas.microsoft.com/office/drawing/2010/main" w="9525" cap="flat">
                     <a:solidFill>
                       <a:srgbClr val="808080"/>
                     </a:solidFill>
@@ -22255,7 +22397,7 @@
                   </a14:hiddenLine>
                 </a:ext>
                 <a:ext uri="{AF507438-7753-43e0-B8FC-AC1667EBCBE1}">
-                  <a14:hiddenEffects xmlns:a14="http://schemas.microsoft.com/office/drawing/2010/main" xmlns="">
+                  <a14:hiddenEffects xmlns="" xmlns:a14="http://schemas.microsoft.com/office/drawing/2010/main">
                     <a:effectLst>
                       <a:outerShdw blurRad="63500" dist="38099" dir="2700000" algn="ctr" rotWithShape="0">
                         <a:srgbClr val="000000">
@@ -22350,7 +22492,7 @@
               <a:effectLst/>
               <a:extLst>
                 <a:ext uri="{91240B29-F687-4f45-9708-019B960494DF}">
-                  <a14:hiddenLine xmlns:a14="http://schemas.microsoft.com/office/drawing/2010/main" xmlns="" w="9525" cap="flat">
+                  <a14:hiddenLine xmlns="" xmlns:a14="http://schemas.microsoft.com/office/drawing/2010/main" w="9525" cap="flat">
                     <a:solidFill>
                       <a:srgbClr val="808080"/>
                     </a:solidFill>
@@ -22360,7 +22502,7 @@
                   </a14:hiddenLine>
                 </a:ext>
                 <a:ext uri="{AF507438-7753-43e0-B8FC-AC1667EBCBE1}">
-                  <a14:hiddenEffects xmlns:a14="http://schemas.microsoft.com/office/drawing/2010/main" xmlns="">
+                  <a14:hiddenEffects xmlns="" xmlns:a14="http://schemas.microsoft.com/office/drawing/2010/main">
                     <a:effectLst>
                       <a:outerShdw blurRad="63500" dist="38099" dir="2700000" algn="ctr" rotWithShape="0">
                         <a:srgbClr val="000000">
@@ -22460,7 +22602,7 @@
               <a:effectLst/>
               <a:extLst>
                 <a:ext uri="{91240B29-F687-4f45-9708-019B960494DF}">
-                  <a14:hiddenLine xmlns:a14="http://schemas.microsoft.com/office/drawing/2010/main" xmlns="" w="9525" cap="flat">
+                  <a14:hiddenLine xmlns="" xmlns:a14="http://schemas.microsoft.com/office/drawing/2010/main" w="9525" cap="flat">
                     <a:solidFill>
                       <a:srgbClr val="808080"/>
                     </a:solidFill>
@@ -22470,7 +22612,7 @@
                   </a14:hiddenLine>
                 </a:ext>
                 <a:ext uri="{AF507438-7753-43e0-B8FC-AC1667EBCBE1}">
-                  <a14:hiddenEffects xmlns:a14="http://schemas.microsoft.com/office/drawing/2010/main" xmlns="">
+                  <a14:hiddenEffects xmlns="" xmlns:a14="http://schemas.microsoft.com/office/drawing/2010/main">
                     <a:effectLst>
                       <a:outerShdw blurRad="63500" dist="38099" dir="2700000" algn="ctr" rotWithShape="0">
                         <a:srgbClr val="000000">
@@ -22570,7 +22712,7 @@
               <a:effectLst/>
               <a:extLst>
                 <a:ext uri="{91240B29-F687-4f45-9708-019B960494DF}">
-                  <a14:hiddenLine xmlns:a14="http://schemas.microsoft.com/office/drawing/2010/main" xmlns="" w="9525" cap="flat">
+                  <a14:hiddenLine xmlns="" xmlns:a14="http://schemas.microsoft.com/office/drawing/2010/main" w="9525" cap="flat">
                     <a:solidFill>
                       <a:srgbClr val="808080"/>
                     </a:solidFill>
@@ -22580,7 +22722,7 @@
                   </a14:hiddenLine>
                 </a:ext>
                 <a:ext uri="{AF507438-7753-43e0-B8FC-AC1667EBCBE1}">
-                  <a14:hiddenEffects xmlns:a14="http://schemas.microsoft.com/office/drawing/2010/main" xmlns="">
+                  <a14:hiddenEffects xmlns="" xmlns:a14="http://schemas.microsoft.com/office/drawing/2010/main">
                     <a:effectLst>
                       <a:outerShdw blurRad="63500" dist="38099" dir="2700000" algn="ctr" rotWithShape="0">
                         <a:srgbClr val="000000">
@@ -22717,7 +22859,7 @@
               <a:effectLst/>
               <a:extLst>
                 <a:ext uri="{91240B29-F687-4f45-9708-019B960494DF}">
-                  <a14:hiddenLine xmlns:a14="http://schemas.microsoft.com/office/drawing/2010/main" xmlns="" w="9525" cap="flat">
+                  <a14:hiddenLine xmlns="" xmlns:a14="http://schemas.microsoft.com/office/drawing/2010/main" w="9525" cap="flat">
                     <a:solidFill>
                       <a:srgbClr val="808080"/>
                     </a:solidFill>
@@ -22727,7 +22869,7 @@
                   </a14:hiddenLine>
                 </a:ext>
                 <a:ext uri="{AF507438-7753-43e0-B8FC-AC1667EBCBE1}">
-                  <a14:hiddenEffects xmlns:a14="http://schemas.microsoft.com/office/drawing/2010/main" xmlns="">
+                  <a14:hiddenEffects xmlns="" xmlns:a14="http://schemas.microsoft.com/office/drawing/2010/main">
                     <a:effectLst>
                       <a:outerShdw blurRad="63500" dist="38099" dir="2700000" algn="ctr" rotWithShape="0">
                         <a:srgbClr val="000000">
@@ -22864,7 +23006,7 @@
               <a:effectLst/>
               <a:extLst>
                 <a:ext uri="{91240B29-F687-4f45-9708-019B960494DF}">
-                  <a14:hiddenLine xmlns:a14="http://schemas.microsoft.com/office/drawing/2010/main" xmlns="" w="9525" cap="flat">
+                  <a14:hiddenLine xmlns="" xmlns:a14="http://schemas.microsoft.com/office/drawing/2010/main" w="9525" cap="flat">
                     <a:solidFill>
                       <a:srgbClr val="808080"/>
                     </a:solidFill>
@@ -22874,7 +23016,7 @@
                   </a14:hiddenLine>
                 </a:ext>
                 <a:ext uri="{AF507438-7753-43e0-B8FC-AC1667EBCBE1}">
-                  <a14:hiddenEffects xmlns:a14="http://schemas.microsoft.com/office/drawing/2010/main" xmlns="">
+                  <a14:hiddenEffects xmlns="" xmlns:a14="http://schemas.microsoft.com/office/drawing/2010/main">
                     <a:effectLst>
                       <a:outerShdw blurRad="63500" dist="38099" dir="2700000" algn="ctr" rotWithShape="0">
                         <a:srgbClr val="000000">
@@ -22980,7 +23122,7 @@
               <a:effectLst/>
               <a:extLst>
                 <a:ext uri="{91240B29-F687-4f45-9708-019B960494DF}">
-                  <a14:hiddenLine xmlns:a14="http://schemas.microsoft.com/office/drawing/2010/main" xmlns="" w="9525" cap="flat">
+                  <a14:hiddenLine xmlns="" xmlns:a14="http://schemas.microsoft.com/office/drawing/2010/main" w="9525" cap="flat">
                     <a:solidFill>
                       <a:srgbClr val="808080"/>
                     </a:solidFill>
@@ -22990,7 +23132,7 @@
                   </a14:hiddenLine>
                 </a:ext>
                 <a:ext uri="{AF507438-7753-43e0-B8FC-AC1667EBCBE1}">
-                  <a14:hiddenEffects xmlns:a14="http://schemas.microsoft.com/office/drawing/2010/main" xmlns="">
+                  <a14:hiddenEffects xmlns="" xmlns:a14="http://schemas.microsoft.com/office/drawing/2010/main">
                     <a:effectLst>
                       <a:outerShdw blurRad="63500" dist="38099" dir="2700000" algn="ctr" rotWithShape="0">
                         <a:srgbClr val="000000">
@@ -27901,6 +28043,15 @@
 </file>
 
 <file path=customXml/item1.xml><?xml version="1.0" encoding="utf-8"?>
+<?mso-contentType ?>
+<FormTemplates xmlns="http://schemas.microsoft.com/sharepoint/v3/contenttype/forms">
+  <Display>DocumentLibraryForm</Display>
+  <Edit>DocumentLibraryForm</Edit>
+  <New>DocumentLibraryForm</New>
+</FormTemplates>
+</file>
+
+<file path=customXml/item2.xml><?xml version="1.0" encoding="utf-8"?>
 <p:properties xmlns:p="http://schemas.microsoft.com/office/2006/metadata/properties" xmlns:xsi="http://www.w3.org/2001/XMLSchema-instance" xmlns:pc="http://schemas.microsoft.com/office/infopath/2007/PartnerControls">
   <documentManagement>
     <SpringIM_LegacyID xmlns="http://schemas.microsoft.com/sharepoint/v3/fields" xsi:nil="true"/>
@@ -27954,15 +28105,6 @@
     <SpringIM_SourceFolder xmlns="http://schemas.microsoft.com/sharepoint/v3/fields" xsi:nil="true"/>
   </documentManagement>
 </p:properties>
-</file>
-
-<file path=customXml/item2.xml><?xml version="1.0" encoding="utf-8"?>
-<?mso-contentType ?>
-<FormTemplates xmlns="http://schemas.microsoft.com/sharepoint/v3/contenttype/forms">
-  <Display>DocumentLibraryForm</Display>
-  <Edit>DocumentLibraryForm</Edit>
-  <New>DocumentLibraryForm</New>
-</FormTemplates>
 </file>
 
 <file path=customXml/item3.xml><?xml version="1.0" encoding="utf-8"?>
@@ -28697,6 +28839,14 @@
 </file>
 
 <file path=customXml/itemProps1.xml><?xml version="1.0" encoding="utf-8"?>
+<ds:datastoreItem xmlns:ds="http://schemas.openxmlformats.org/officeDocument/2006/customXml" ds:itemID="{3D06BFAA-B61F-4F4A-81B4-62F8F67D3E09}">
+  <ds:schemaRefs>
+    <ds:schemaRef ds:uri="http://schemas.microsoft.com/sharepoint/v3/contenttype/forms"/>
+  </ds:schemaRefs>
+</ds:datastoreItem>
+</file>
+
+<file path=customXml/itemProps2.xml><?xml version="1.0" encoding="utf-8"?>
 <ds:datastoreItem xmlns:ds="http://schemas.openxmlformats.org/officeDocument/2006/customXml" ds:itemID="{C3176E39-8037-48B0-B74B-447BD7D131F4}">
   <ds:schemaRefs>
     <ds:schemaRef ds:uri="http://www.w3.org/XML/1998/namespace"/>
@@ -28709,14 +28859,6 @@
     <ds:schemaRef ds:uri="http://schemas.microsoft.com/sharepoint/v3/fields"/>
     <ds:schemaRef ds:uri="http://schemas.microsoft.com/office/infopath/2007/PartnerControls"/>
     <ds:schemaRef ds:uri="http://purl.org/dc/terms/"/>
-  </ds:schemaRefs>
-</ds:datastoreItem>
-</file>
-
-<file path=customXml/itemProps2.xml><?xml version="1.0" encoding="utf-8"?>
-<ds:datastoreItem xmlns:ds="http://schemas.openxmlformats.org/officeDocument/2006/customXml" ds:itemID="{3D06BFAA-B61F-4F4A-81B4-62F8F67D3E09}">
-  <ds:schemaRefs>
-    <ds:schemaRef ds:uri="http://schemas.microsoft.com/sharepoint/v3/contenttype/forms"/>
   </ds:schemaRefs>
 </ds:datastoreItem>
 </file>

</xml_diff>

<commit_message>
Tidy up recs tables
</commit_message>
<xml_diff>
--- a/Instant Coffee V4.pptx
+++ b/Instant Coffee V4.pptx
@@ -4551,7 +4551,7 @@
           <a:noFill/>
           <a:extLst>
             <a:ext uri="{909E8E84-426E-40dd-AFC4-6F175D3DCCD1}">
-              <a14:hiddenFill xmlns:a14="http://schemas.microsoft.com/office/drawing/2010/main" xmlns="">
+              <a14:hiddenFill xmlns="" xmlns:a14="http://schemas.microsoft.com/office/drawing/2010/main">
                 <a:solidFill>
                   <a:srgbClr val="FFFFFF"/>
                 </a:solidFill>
@@ -6668,7 +6668,7 @@
             <a:effectLst/>
             <a:extLst>
               <a:ext uri="{91240B29-F687-4f45-9708-019B960494DF}">
-                <a14:hiddenLine xmlns="" xmlns:a14="http://schemas.microsoft.com/office/drawing/2010/main" w="9525" cap="flat">
+                <a14:hiddenLine xmlns:a14="http://schemas.microsoft.com/office/drawing/2010/main" xmlns="" w="9525" cap="flat">
                   <a:solidFill>
                     <a:srgbClr val="808080"/>
                   </a:solidFill>
@@ -6678,7 +6678,7 @@
                 </a14:hiddenLine>
               </a:ext>
               <a:ext uri="{AF507438-7753-43e0-B8FC-AC1667EBCBE1}">
-                <a14:hiddenEffects xmlns="" xmlns:a14="http://schemas.microsoft.com/office/drawing/2010/main">
+                <a14:hiddenEffects xmlns:a14="http://schemas.microsoft.com/office/drawing/2010/main" xmlns="">
                   <a:effectLst>
                     <a:outerShdw blurRad="63500" dist="38099" dir="2700000" algn="ctr" rotWithShape="0">
                       <a:srgbClr val="000000">
@@ -6784,7 +6784,7 @@
             <a:effectLst/>
             <a:extLst>
               <a:ext uri="{91240B29-F687-4f45-9708-019B960494DF}">
-                <a14:hiddenLine xmlns="" xmlns:a14="http://schemas.microsoft.com/office/drawing/2010/main" w="9525" cap="flat">
+                <a14:hiddenLine xmlns:a14="http://schemas.microsoft.com/office/drawing/2010/main" xmlns="" w="9525" cap="flat">
                   <a:solidFill>
                     <a:srgbClr val="808080"/>
                   </a:solidFill>
@@ -6794,7 +6794,7 @@
                 </a14:hiddenLine>
               </a:ext>
               <a:ext uri="{AF507438-7753-43e0-B8FC-AC1667EBCBE1}">
-                <a14:hiddenEffects xmlns="" xmlns:a14="http://schemas.microsoft.com/office/drawing/2010/main">
+                <a14:hiddenEffects xmlns:a14="http://schemas.microsoft.com/office/drawing/2010/main" xmlns="">
                   <a:effectLst>
                     <a:outerShdw blurRad="63500" dist="38099" dir="2700000" algn="ctr" rotWithShape="0">
                       <a:srgbClr val="000000">
@@ -6894,7 +6894,7 @@
             <a:effectLst/>
             <a:extLst>
               <a:ext uri="{91240B29-F687-4f45-9708-019B960494DF}">
-                <a14:hiddenLine xmlns="" xmlns:a14="http://schemas.microsoft.com/office/drawing/2010/main" w="9525" cap="flat">
+                <a14:hiddenLine xmlns:a14="http://schemas.microsoft.com/office/drawing/2010/main" xmlns="" w="9525" cap="flat">
                   <a:solidFill>
                     <a:srgbClr val="808080"/>
                   </a:solidFill>
@@ -6904,7 +6904,7 @@
                 </a14:hiddenLine>
               </a:ext>
               <a:ext uri="{AF507438-7753-43e0-B8FC-AC1667EBCBE1}">
-                <a14:hiddenEffects xmlns="" xmlns:a14="http://schemas.microsoft.com/office/drawing/2010/main">
+                <a14:hiddenEffects xmlns:a14="http://schemas.microsoft.com/office/drawing/2010/main" xmlns="">
                   <a:effectLst>
                     <a:outerShdw blurRad="63500" dist="38099" dir="2700000" algn="ctr" rotWithShape="0">
                       <a:srgbClr val="000000">
@@ -7065,7 +7065,7 @@
             <a:effectLst/>
             <a:extLst>
               <a:ext uri="{91240B29-F687-4f45-9708-019B960494DF}">
-                <a14:hiddenLine xmlns="" xmlns:a14="http://schemas.microsoft.com/office/drawing/2010/main" w="9525" cap="flat">
+                <a14:hiddenLine xmlns:a14="http://schemas.microsoft.com/office/drawing/2010/main" xmlns="" w="9525" cap="flat">
                   <a:solidFill>
                     <a:srgbClr val="808080"/>
                   </a:solidFill>
@@ -7075,7 +7075,7 @@
                 </a14:hiddenLine>
               </a:ext>
               <a:ext uri="{AF507438-7753-43e0-B8FC-AC1667EBCBE1}">
-                <a14:hiddenEffects xmlns="" xmlns:a14="http://schemas.microsoft.com/office/drawing/2010/main">
+                <a14:hiddenEffects xmlns:a14="http://schemas.microsoft.com/office/drawing/2010/main" xmlns="">
                   <a:effectLst>
                     <a:outerShdw blurRad="63500" dist="38099" dir="2700000" algn="ctr" rotWithShape="0">
                       <a:srgbClr val="000000">
@@ -7236,7 +7236,7 @@
             <a:effectLst/>
             <a:extLst>
               <a:ext uri="{91240B29-F687-4f45-9708-019B960494DF}">
-                <a14:hiddenLine xmlns="" xmlns:a14="http://schemas.microsoft.com/office/drawing/2010/main" w="9525" cap="flat">
+                <a14:hiddenLine xmlns:a14="http://schemas.microsoft.com/office/drawing/2010/main" xmlns="" w="9525" cap="flat">
                   <a:solidFill>
                     <a:srgbClr val="808080"/>
                   </a:solidFill>
@@ -7246,7 +7246,7 @@
                 </a14:hiddenLine>
               </a:ext>
               <a:ext uri="{AF507438-7753-43e0-B8FC-AC1667EBCBE1}">
-                <a14:hiddenEffects xmlns="" xmlns:a14="http://schemas.microsoft.com/office/drawing/2010/main">
+                <a14:hiddenEffects xmlns:a14="http://schemas.microsoft.com/office/drawing/2010/main" xmlns="">
                   <a:effectLst>
                     <a:outerShdw blurRad="63500" dist="38099" dir="2700000" algn="ctr" rotWithShape="0">
                       <a:srgbClr val="000000">
@@ -7363,7 +7363,7 @@
             <a:effectLst/>
             <a:extLst>
               <a:ext uri="{91240B29-F687-4f45-9708-019B960494DF}">
-                <a14:hiddenLine xmlns="" xmlns:a14="http://schemas.microsoft.com/office/drawing/2010/main" w="9525" cap="flat">
+                <a14:hiddenLine xmlns:a14="http://schemas.microsoft.com/office/drawing/2010/main" xmlns="" w="9525" cap="flat">
                   <a:solidFill>
                     <a:srgbClr val="808080"/>
                   </a:solidFill>
@@ -7373,7 +7373,7 @@
                 </a14:hiddenLine>
               </a:ext>
               <a:ext uri="{AF507438-7753-43e0-B8FC-AC1667EBCBE1}">
-                <a14:hiddenEffects xmlns="" xmlns:a14="http://schemas.microsoft.com/office/drawing/2010/main">
+                <a14:hiddenEffects xmlns:a14="http://schemas.microsoft.com/office/drawing/2010/main" xmlns="">
                   <a:effectLst>
                     <a:outerShdw blurRad="63500" dist="38099" dir="2700000" algn="ctr" rotWithShape="0">
                       <a:srgbClr val="000000">
@@ -7490,7 +7490,7 @@
             <a:effectLst/>
             <a:extLst>
               <a:ext uri="{91240B29-F687-4f45-9708-019B960494DF}">
-                <a14:hiddenLine xmlns="" xmlns:a14="http://schemas.microsoft.com/office/drawing/2010/main" w="9525" cap="flat">
+                <a14:hiddenLine xmlns:a14="http://schemas.microsoft.com/office/drawing/2010/main" xmlns="" w="9525" cap="flat">
                   <a:solidFill>
                     <a:srgbClr val="808080"/>
                   </a:solidFill>
@@ -7500,7 +7500,7 @@
                 </a14:hiddenLine>
               </a:ext>
               <a:ext uri="{AF507438-7753-43e0-B8FC-AC1667EBCBE1}">
-                <a14:hiddenEffects xmlns="" xmlns:a14="http://schemas.microsoft.com/office/drawing/2010/main">
+                <a14:hiddenEffects xmlns:a14="http://schemas.microsoft.com/office/drawing/2010/main" xmlns="">
                   <a:effectLst>
                     <a:outerShdw blurRad="63500" dist="38099" dir="2700000" algn="ctr" rotWithShape="0">
                       <a:srgbClr val="000000">
@@ -7617,7 +7617,7 @@
             <a:effectLst/>
             <a:extLst>
               <a:ext uri="{91240B29-F687-4f45-9708-019B960494DF}">
-                <a14:hiddenLine xmlns="" xmlns:a14="http://schemas.microsoft.com/office/drawing/2010/main" w="9525" cap="flat">
+                <a14:hiddenLine xmlns:a14="http://schemas.microsoft.com/office/drawing/2010/main" xmlns="" w="9525" cap="flat">
                   <a:solidFill>
                     <a:srgbClr val="808080"/>
                   </a:solidFill>
@@ -7627,7 +7627,7 @@
                 </a14:hiddenLine>
               </a:ext>
               <a:ext uri="{AF507438-7753-43e0-B8FC-AC1667EBCBE1}">
-                <a14:hiddenEffects xmlns="" xmlns:a14="http://schemas.microsoft.com/office/drawing/2010/main">
+                <a14:hiddenEffects xmlns:a14="http://schemas.microsoft.com/office/drawing/2010/main" xmlns="">
                   <a:effectLst>
                     <a:outerShdw blurRad="63500" dist="38099" dir="2700000" algn="ctr" rotWithShape="0">
                       <a:srgbClr val="000000">
@@ -7744,7 +7744,7 @@
             <a:effectLst/>
             <a:extLst>
               <a:ext uri="{91240B29-F687-4f45-9708-019B960494DF}">
-                <a14:hiddenLine xmlns="" xmlns:a14="http://schemas.microsoft.com/office/drawing/2010/main" w="9525" cap="flat">
+                <a14:hiddenLine xmlns:a14="http://schemas.microsoft.com/office/drawing/2010/main" xmlns="" w="9525" cap="flat">
                   <a:solidFill>
                     <a:srgbClr val="808080"/>
                   </a:solidFill>
@@ -7754,7 +7754,7 @@
                 </a14:hiddenLine>
               </a:ext>
               <a:ext uri="{AF507438-7753-43e0-B8FC-AC1667EBCBE1}">
-                <a14:hiddenEffects xmlns="" xmlns:a14="http://schemas.microsoft.com/office/drawing/2010/main">
+                <a14:hiddenEffects xmlns:a14="http://schemas.microsoft.com/office/drawing/2010/main" xmlns="">
                   <a:effectLst>
                     <a:outerShdw blurRad="63500" dist="38099" dir="2700000" algn="ctr" rotWithShape="0">
                       <a:srgbClr val="000000">
@@ -7860,7 +7860,7 @@
             <a:effectLst/>
             <a:extLst>
               <a:ext uri="{91240B29-F687-4f45-9708-019B960494DF}">
-                <a14:hiddenLine xmlns="" xmlns:a14="http://schemas.microsoft.com/office/drawing/2010/main" w="9525" cap="flat">
+                <a14:hiddenLine xmlns:a14="http://schemas.microsoft.com/office/drawing/2010/main" xmlns="" w="9525" cap="flat">
                   <a:solidFill>
                     <a:srgbClr val="808080"/>
                   </a:solidFill>
@@ -7870,7 +7870,7 @@
                 </a14:hiddenLine>
               </a:ext>
               <a:ext uri="{AF507438-7753-43e0-B8FC-AC1667EBCBE1}">
-                <a14:hiddenEffects xmlns="" xmlns:a14="http://schemas.microsoft.com/office/drawing/2010/main">
+                <a14:hiddenEffects xmlns:a14="http://schemas.microsoft.com/office/drawing/2010/main" xmlns="">
                   <a:effectLst>
                     <a:outerShdw blurRad="63500" dist="38099" dir="2700000" algn="ctr" rotWithShape="0">
                       <a:srgbClr val="000000">
@@ -8139,7 +8139,7 @@
             <a:effectLst/>
             <a:extLst>
               <a:ext uri="{91240B29-F687-4f45-9708-019B960494DF}">
-                <a14:hiddenLine xmlns="" xmlns:a14="http://schemas.microsoft.com/office/drawing/2010/main" w="9525" cap="flat">
+                <a14:hiddenLine xmlns:a14="http://schemas.microsoft.com/office/drawing/2010/main" xmlns="" w="9525" cap="flat">
                   <a:solidFill>
                     <a:srgbClr val="808080"/>
                   </a:solidFill>
@@ -8149,7 +8149,7 @@
                 </a14:hiddenLine>
               </a:ext>
               <a:ext uri="{AF507438-7753-43e0-B8FC-AC1667EBCBE1}">
-                <a14:hiddenEffects xmlns="" xmlns:a14="http://schemas.microsoft.com/office/drawing/2010/main">
+                <a14:hiddenEffects xmlns:a14="http://schemas.microsoft.com/office/drawing/2010/main" xmlns="">
                   <a:effectLst>
                     <a:outerShdw blurRad="63500" dist="38099" dir="2700000" algn="ctr" rotWithShape="0">
                       <a:srgbClr val="000000">
@@ -8288,7 +8288,7 @@
             <a:effectLst/>
             <a:extLst>
               <a:ext uri="{91240B29-F687-4f45-9708-019B960494DF}">
-                <a14:hiddenLine xmlns="" xmlns:a14="http://schemas.microsoft.com/office/drawing/2010/main" w="9525" cap="flat">
+                <a14:hiddenLine xmlns:a14="http://schemas.microsoft.com/office/drawing/2010/main" xmlns="" w="9525" cap="flat">
                   <a:solidFill>
                     <a:srgbClr val="808080"/>
                   </a:solidFill>
@@ -8298,7 +8298,7 @@
                 </a14:hiddenLine>
               </a:ext>
               <a:ext uri="{AF507438-7753-43e0-B8FC-AC1667EBCBE1}">
-                <a14:hiddenEffects xmlns="" xmlns:a14="http://schemas.microsoft.com/office/drawing/2010/main">
+                <a14:hiddenEffects xmlns:a14="http://schemas.microsoft.com/office/drawing/2010/main" xmlns="">
                   <a:effectLst>
                     <a:outerShdw blurRad="63500" dist="38099" dir="2700000" algn="ctr" rotWithShape="0">
                       <a:srgbClr val="000000">
@@ -8432,7 +8432,7 @@
             <a:effectLst/>
             <a:extLst>
               <a:ext uri="{91240B29-F687-4f45-9708-019B960494DF}">
-                <a14:hiddenLine xmlns="" xmlns:a14="http://schemas.microsoft.com/office/drawing/2010/main" w="9525" cap="flat">
+                <a14:hiddenLine xmlns:a14="http://schemas.microsoft.com/office/drawing/2010/main" xmlns="" w="9525" cap="flat">
                   <a:solidFill>
                     <a:srgbClr val="808080"/>
                   </a:solidFill>
@@ -8442,7 +8442,7 @@
                 </a14:hiddenLine>
               </a:ext>
               <a:ext uri="{AF507438-7753-43e0-B8FC-AC1667EBCBE1}">
-                <a14:hiddenEffects xmlns="" xmlns:a14="http://schemas.microsoft.com/office/drawing/2010/main">
+                <a14:hiddenEffects xmlns:a14="http://schemas.microsoft.com/office/drawing/2010/main" xmlns="">
                   <a:effectLst>
                     <a:outerShdw blurRad="63500" dist="38099" dir="2700000" algn="ctr" rotWithShape="0">
                       <a:srgbClr val="000000">
@@ -8548,7 +8548,7 @@
             <a:effectLst/>
             <a:extLst>
               <a:ext uri="{91240B29-F687-4f45-9708-019B960494DF}">
-                <a14:hiddenLine xmlns="" xmlns:a14="http://schemas.microsoft.com/office/drawing/2010/main" w="9525" cap="flat">
+                <a14:hiddenLine xmlns:a14="http://schemas.microsoft.com/office/drawing/2010/main" xmlns="" w="9525" cap="flat">
                   <a:solidFill>
                     <a:srgbClr val="808080"/>
                   </a:solidFill>
@@ -8558,7 +8558,7 @@
                 </a14:hiddenLine>
               </a:ext>
               <a:ext uri="{AF507438-7753-43e0-B8FC-AC1667EBCBE1}">
-                <a14:hiddenEffects xmlns="" xmlns:a14="http://schemas.microsoft.com/office/drawing/2010/main">
+                <a14:hiddenEffects xmlns:a14="http://schemas.microsoft.com/office/drawing/2010/main" xmlns="">
                   <a:effectLst>
                     <a:outerShdw blurRad="63500" dist="38099" dir="2700000" algn="ctr" rotWithShape="0">
                       <a:srgbClr val="000000">
@@ -8684,7 +8684,7 @@
             <a:effectLst/>
             <a:extLst>
               <a:ext uri="{91240B29-F687-4f45-9708-019B960494DF}">
-                <a14:hiddenLine xmlns="" xmlns:a14="http://schemas.microsoft.com/office/drawing/2010/main" w="9525" cap="flat">
+                <a14:hiddenLine xmlns:a14="http://schemas.microsoft.com/office/drawing/2010/main" xmlns="" w="9525" cap="flat">
                   <a:solidFill>
                     <a:srgbClr val="808080"/>
                   </a:solidFill>
@@ -8694,7 +8694,7 @@
                 </a14:hiddenLine>
               </a:ext>
               <a:ext uri="{AF507438-7753-43e0-B8FC-AC1667EBCBE1}">
-                <a14:hiddenEffects xmlns="" xmlns:a14="http://schemas.microsoft.com/office/drawing/2010/main">
+                <a14:hiddenEffects xmlns:a14="http://schemas.microsoft.com/office/drawing/2010/main" xmlns="">
                   <a:effectLst>
                     <a:outerShdw blurRad="63500" dist="38099" dir="2700000" algn="ctr" rotWithShape="0">
                       <a:srgbClr val="000000">
@@ -8820,7 +8820,7 @@
             <a:effectLst/>
             <a:extLst>
               <a:ext uri="{91240B29-F687-4f45-9708-019B960494DF}">
-                <a14:hiddenLine xmlns="" xmlns:a14="http://schemas.microsoft.com/office/drawing/2010/main" w="9525" cap="flat">
+                <a14:hiddenLine xmlns:a14="http://schemas.microsoft.com/office/drawing/2010/main" xmlns="" w="9525" cap="flat">
                   <a:solidFill>
                     <a:srgbClr val="808080"/>
                   </a:solidFill>
@@ -8830,7 +8830,7 @@
                 </a14:hiddenLine>
               </a:ext>
               <a:ext uri="{AF507438-7753-43e0-B8FC-AC1667EBCBE1}">
-                <a14:hiddenEffects xmlns="" xmlns:a14="http://schemas.microsoft.com/office/drawing/2010/main">
+                <a14:hiddenEffects xmlns:a14="http://schemas.microsoft.com/office/drawing/2010/main" xmlns="">
                   <a:effectLst>
                     <a:outerShdw blurRad="63500" dist="38099" dir="2700000" algn="ctr" rotWithShape="0">
                       <a:srgbClr val="000000">
@@ -8947,7 +8947,7 @@
             <a:effectLst/>
             <a:extLst>
               <a:ext uri="{91240B29-F687-4f45-9708-019B960494DF}">
-                <a14:hiddenLine xmlns="" xmlns:a14="http://schemas.microsoft.com/office/drawing/2010/main" w="9525" cap="flat">
+                <a14:hiddenLine xmlns:a14="http://schemas.microsoft.com/office/drawing/2010/main" xmlns="" w="9525" cap="flat">
                   <a:solidFill>
                     <a:srgbClr val="808080"/>
                   </a:solidFill>
@@ -8957,7 +8957,7 @@
                 </a14:hiddenLine>
               </a:ext>
               <a:ext uri="{AF507438-7753-43e0-B8FC-AC1667EBCBE1}">
-                <a14:hiddenEffects xmlns="" xmlns:a14="http://schemas.microsoft.com/office/drawing/2010/main">
+                <a14:hiddenEffects xmlns:a14="http://schemas.microsoft.com/office/drawing/2010/main" xmlns="">
                   <a:effectLst>
                     <a:outerShdw blurRad="63500" dist="38099" dir="2700000" algn="ctr" rotWithShape="0">
                       <a:srgbClr val="000000">
@@ -9066,7 +9066,7 @@
             <a:effectLst/>
             <a:extLst>
               <a:ext uri="{91240B29-F687-4f45-9708-019B960494DF}">
-                <a14:hiddenLine xmlns="" xmlns:a14="http://schemas.microsoft.com/office/drawing/2010/main" w="9525" cap="flat">
+                <a14:hiddenLine xmlns:a14="http://schemas.microsoft.com/office/drawing/2010/main" xmlns="" w="9525" cap="flat">
                   <a:solidFill>
                     <a:srgbClr val="808080"/>
                   </a:solidFill>
@@ -9076,7 +9076,7 @@
                 </a14:hiddenLine>
               </a:ext>
               <a:ext uri="{AF507438-7753-43e0-B8FC-AC1667EBCBE1}">
-                <a14:hiddenEffects xmlns="" xmlns:a14="http://schemas.microsoft.com/office/drawing/2010/main">
+                <a14:hiddenEffects xmlns:a14="http://schemas.microsoft.com/office/drawing/2010/main" xmlns="">
                   <a:effectLst>
                     <a:outerShdw blurRad="63500" dist="38099" dir="2700000" algn="ctr" rotWithShape="0">
                       <a:srgbClr val="000000">
@@ -9193,7 +9193,7 @@
             <a:effectLst/>
             <a:extLst>
               <a:ext uri="{91240B29-F687-4f45-9708-019B960494DF}">
-                <a14:hiddenLine xmlns="" xmlns:a14="http://schemas.microsoft.com/office/drawing/2010/main" w="9525" cap="flat">
+                <a14:hiddenLine xmlns:a14="http://schemas.microsoft.com/office/drawing/2010/main" xmlns="" w="9525" cap="flat">
                   <a:solidFill>
                     <a:srgbClr val="808080"/>
                   </a:solidFill>
@@ -9203,7 +9203,7 @@
                 </a14:hiddenLine>
               </a:ext>
               <a:ext uri="{AF507438-7753-43e0-B8FC-AC1667EBCBE1}">
-                <a14:hiddenEffects xmlns="" xmlns:a14="http://schemas.microsoft.com/office/drawing/2010/main">
+                <a14:hiddenEffects xmlns:a14="http://schemas.microsoft.com/office/drawing/2010/main" xmlns="">
                   <a:effectLst>
                     <a:outerShdw blurRad="63500" dist="38099" dir="2700000" algn="ctr" rotWithShape="0">
                       <a:srgbClr val="000000">
@@ -9320,7 +9320,7 @@
             <a:effectLst/>
             <a:extLst>
               <a:ext uri="{91240B29-F687-4f45-9708-019B960494DF}">
-                <a14:hiddenLine xmlns="" xmlns:a14="http://schemas.microsoft.com/office/drawing/2010/main" w="9525" cap="flat">
+                <a14:hiddenLine xmlns:a14="http://schemas.microsoft.com/office/drawing/2010/main" xmlns="" w="9525" cap="flat">
                   <a:solidFill>
                     <a:srgbClr val="808080"/>
                   </a:solidFill>
@@ -9330,7 +9330,7 @@
                 </a14:hiddenLine>
               </a:ext>
               <a:ext uri="{AF507438-7753-43e0-B8FC-AC1667EBCBE1}">
-                <a14:hiddenEffects xmlns="" xmlns:a14="http://schemas.microsoft.com/office/drawing/2010/main">
+                <a14:hiddenEffects xmlns:a14="http://schemas.microsoft.com/office/drawing/2010/main" xmlns="">
                   <a:effectLst>
                     <a:outerShdw blurRad="63500" dist="38099" dir="2700000" algn="ctr" rotWithShape="0">
                       <a:srgbClr val="000000">
@@ -9447,7 +9447,7 @@
             <a:effectLst/>
             <a:extLst>
               <a:ext uri="{91240B29-F687-4f45-9708-019B960494DF}">
-                <a14:hiddenLine xmlns="" xmlns:a14="http://schemas.microsoft.com/office/drawing/2010/main" w="9525" cap="flat">
+                <a14:hiddenLine xmlns:a14="http://schemas.microsoft.com/office/drawing/2010/main" xmlns="" w="9525" cap="flat">
                   <a:solidFill>
                     <a:srgbClr val="808080"/>
                   </a:solidFill>
@@ -9457,7 +9457,7 @@
                 </a14:hiddenLine>
               </a:ext>
               <a:ext uri="{AF507438-7753-43e0-B8FC-AC1667EBCBE1}">
-                <a14:hiddenEffects xmlns="" xmlns:a14="http://schemas.microsoft.com/office/drawing/2010/main">
+                <a14:hiddenEffects xmlns:a14="http://schemas.microsoft.com/office/drawing/2010/main" xmlns="">
                   <a:effectLst>
                     <a:outerShdw blurRad="63500" dist="38099" dir="2700000" algn="ctr" rotWithShape="0">
                       <a:srgbClr val="000000">
@@ -9574,7 +9574,7 @@
             <a:effectLst/>
             <a:extLst>
               <a:ext uri="{91240B29-F687-4f45-9708-019B960494DF}">
-                <a14:hiddenLine xmlns="" xmlns:a14="http://schemas.microsoft.com/office/drawing/2010/main" w="9525" cap="flat">
+                <a14:hiddenLine xmlns:a14="http://schemas.microsoft.com/office/drawing/2010/main" xmlns="" w="9525" cap="flat">
                   <a:solidFill>
                     <a:srgbClr val="808080"/>
                   </a:solidFill>
@@ -9584,7 +9584,7 @@
                 </a14:hiddenLine>
               </a:ext>
               <a:ext uri="{AF507438-7753-43e0-B8FC-AC1667EBCBE1}">
-                <a14:hiddenEffects xmlns="" xmlns:a14="http://schemas.microsoft.com/office/drawing/2010/main">
+                <a14:hiddenEffects xmlns:a14="http://schemas.microsoft.com/office/drawing/2010/main" xmlns="">
                   <a:effectLst>
                     <a:outerShdw blurRad="63500" dist="38099" dir="2700000" algn="ctr" rotWithShape="0">
                       <a:srgbClr val="000000">
@@ -9734,7 +9734,7 @@
             <a:effectLst/>
             <a:extLst>
               <a:ext uri="{91240B29-F687-4f45-9708-019B960494DF}">
-                <a14:hiddenLine xmlns="" xmlns:a14="http://schemas.microsoft.com/office/drawing/2010/main" w="9525" cap="flat">
+                <a14:hiddenLine xmlns:a14="http://schemas.microsoft.com/office/drawing/2010/main" xmlns="" w="9525" cap="flat">
                   <a:solidFill>
                     <a:srgbClr val="808080"/>
                   </a:solidFill>
@@ -9744,7 +9744,7 @@
                 </a14:hiddenLine>
               </a:ext>
               <a:ext uri="{AF507438-7753-43e0-B8FC-AC1667EBCBE1}">
-                <a14:hiddenEffects xmlns="" xmlns:a14="http://schemas.microsoft.com/office/drawing/2010/main">
+                <a14:hiddenEffects xmlns:a14="http://schemas.microsoft.com/office/drawing/2010/main" xmlns="">
                   <a:effectLst>
                     <a:outerShdw blurRad="63500" dist="38099" dir="2700000" algn="ctr" rotWithShape="0">
                       <a:srgbClr val="000000">
@@ -9839,7 +9839,7 @@
             <a:effectLst/>
             <a:extLst>
               <a:ext uri="{91240B29-F687-4f45-9708-019B960494DF}">
-                <a14:hiddenLine xmlns="" xmlns:a14="http://schemas.microsoft.com/office/drawing/2010/main" w="9525" cap="flat">
+                <a14:hiddenLine xmlns:a14="http://schemas.microsoft.com/office/drawing/2010/main" xmlns="" w="9525" cap="flat">
                   <a:solidFill>
                     <a:srgbClr val="808080"/>
                   </a:solidFill>
@@ -9849,7 +9849,7 @@
                 </a14:hiddenLine>
               </a:ext>
               <a:ext uri="{AF507438-7753-43e0-B8FC-AC1667EBCBE1}">
-                <a14:hiddenEffects xmlns="" xmlns:a14="http://schemas.microsoft.com/office/drawing/2010/main">
+                <a14:hiddenEffects xmlns:a14="http://schemas.microsoft.com/office/drawing/2010/main" xmlns="">
                   <a:effectLst>
                     <a:outerShdw blurRad="63500" dist="38099" dir="2700000" algn="ctr" rotWithShape="0">
                       <a:srgbClr val="000000">
@@ -9949,7 +9949,7 @@
             <a:effectLst/>
             <a:extLst>
               <a:ext uri="{91240B29-F687-4f45-9708-019B960494DF}">
-                <a14:hiddenLine xmlns="" xmlns:a14="http://schemas.microsoft.com/office/drawing/2010/main" w="9525" cap="flat">
+                <a14:hiddenLine xmlns:a14="http://schemas.microsoft.com/office/drawing/2010/main" xmlns="" w="9525" cap="flat">
                   <a:solidFill>
                     <a:srgbClr val="808080"/>
                   </a:solidFill>
@@ -9959,7 +9959,7 @@
                 </a14:hiddenLine>
               </a:ext>
               <a:ext uri="{AF507438-7753-43e0-B8FC-AC1667EBCBE1}">
-                <a14:hiddenEffects xmlns="" xmlns:a14="http://schemas.microsoft.com/office/drawing/2010/main">
+                <a14:hiddenEffects xmlns:a14="http://schemas.microsoft.com/office/drawing/2010/main" xmlns="">
                   <a:effectLst>
                     <a:outerShdw blurRad="63500" dist="38099" dir="2700000" algn="ctr" rotWithShape="0">
                       <a:srgbClr val="000000">
@@ -10059,7 +10059,7 @@
             <a:effectLst/>
             <a:extLst>
               <a:ext uri="{91240B29-F687-4f45-9708-019B960494DF}">
-                <a14:hiddenLine xmlns="" xmlns:a14="http://schemas.microsoft.com/office/drawing/2010/main" w="9525" cap="flat">
+                <a14:hiddenLine xmlns:a14="http://schemas.microsoft.com/office/drawing/2010/main" xmlns="" w="9525" cap="flat">
                   <a:solidFill>
                     <a:srgbClr val="808080"/>
                   </a:solidFill>
@@ -10069,7 +10069,7 @@
                 </a14:hiddenLine>
               </a:ext>
               <a:ext uri="{AF507438-7753-43e0-B8FC-AC1667EBCBE1}">
-                <a14:hiddenEffects xmlns="" xmlns:a14="http://schemas.microsoft.com/office/drawing/2010/main">
+                <a14:hiddenEffects xmlns:a14="http://schemas.microsoft.com/office/drawing/2010/main" xmlns="">
                   <a:effectLst>
                     <a:outerShdw blurRad="63500" dist="38099" dir="2700000" algn="ctr" rotWithShape="0">
                       <a:srgbClr val="000000">
@@ -10206,7 +10206,7 @@
             <a:effectLst/>
             <a:extLst>
               <a:ext uri="{91240B29-F687-4f45-9708-019B960494DF}">
-                <a14:hiddenLine xmlns="" xmlns:a14="http://schemas.microsoft.com/office/drawing/2010/main" w="9525" cap="flat">
+                <a14:hiddenLine xmlns:a14="http://schemas.microsoft.com/office/drawing/2010/main" xmlns="" w="9525" cap="flat">
                   <a:solidFill>
                     <a:srgbClr val="808080"/>
                   </a:solidFill>
@@ -10216,7 +10216,7 @@
                 </a14:hiddenLine>
               </a:ext>
               <a:ext uri="{AF507438-7753-43e0-B8FC-AC1667EBCBE1}">
-                <a14:hiddenEffects xmlns="" xmlns:a14="http://schemas.microsoft.com/office/drawing/2010/main">
+                <a14:hiddenEffects xmlns:a14="http://schemas.microsoft.com/office/drawing/2010/main" xmlns="">
                   <a:effectLst>
                     <a:outerShdw blurRad="63500" dist="38099" dir="2700000" algn="ctr" rotWithShape="0">
                       <a:srgbClr val="000000">
@@ -10353,7 +10353,7 @@
             <a:effectLst/>
             <a:extLst>
               <a:ext uri="{91240B29-F687-4f45-9708-019B960494DF}">
-                <a14:hiddenLine xmlns="" xmlns:a14="http://schemas.microsoft.com/office/drawing/2010/main" w="9525" cap="flat">
+                <a14:hiddenLine xmlns:a14="http://schemas.microsoft.com/office/drawing/2010/main" xmlns="" w="9525" cap="flat">
                   <a:solidFill>
                     <a:srgbClr val="808080"/>
                   </a:solidFill>
@@ -10363,7 +10363,7 @@
                 </a14:hiddenLine>
               </a:ext>
               <a:ext uri="{AF507438-7753-43e0-B8FC-AC1667EBCBE1}">
-                <a14:hiddenEffects xmlns="" xmlns:a14="http://schemas.microsoft.com/office/drawing/2010/main">
+                <a14:hiddenEffects xmlns:a14="http://schemas.microsoft.com/office/drawing/2010/main" xmlns="">
                   <a:effectLst>
                     <a:outerShdw blurRad="63500" dist="38099" dir="2700000" algn="ctr" rotWithShape="0">
                       <a:srgbClr val="000000">
@@ -10469,7 +10469,7 @@
             <a:effectLst/>
             <a:extLst>
               <a:ext uri="{91240B29-F687-4f45-9708-019B960494DF}">
-                <a14:hiddenLine xmlns="" xmlns:a14="http://schemas.microsoft.com/office/drawing/2010/main" w="9525" cap="flat">
+                <a14:hiddenLine xmlns:a14="http://schemas.microsoft.com/office/drawing/2010/main" xmlns="" w="9525" cap="flat">
                   <a:solidFill>
                     <a:srgbClr val="808080"/>
                   </a:solidFill>
@@ -10479,7 +10479,7 @@
                 </a14:hiddenLine>
               </a:ext>
               <a:ext uri="{AF507438-7753-43e0-B8FC-AC1667EBCBE1}">
-                <a14:hiddenEffects xmlns="" xmlns:a14="http://schemas.microsoft.com/office/drawing/2010/main">
+                <a14:hiddenEffects xmlns:a14="http://schemas.microsoft.com/office/drawing/2010/main" xmlns="">
                   <a:effectLst>
                     <a:outerShdw blurRad="63500" dist="38099" dir="2700000" algn="ctr" rotWithShape="0">
                       <a:srgbClr val="000000">
@@ -11775,7 +11775,7 @@
           <p:spPr>
             <a:xfrm>
               <a:off x="1699804" y="2279998"/>
-              <a:ext cx="3129550" cy="1640432"/>
+              <a:ext cx="3129550" cy="1613974"/>
             </a:xfrm>
             <a:prstGeom prst="rect">
               <a:avLst/>
@@ -11806,10 +11806,18 @@
                     <a:srgbClr val="4D4F53"/>
                   </a:solidFill>
                 </a:rPr>
-                <a:t>Product standardisation</a:t>
+                <a:t>Introduce larger pack sizes</a:t>
               </a:r>
             </a:p>
             <a:p>
+              <a:r>
+                <a:rPr lang="en-GB" sz="2400" dirty="0" smtClean="0">
+                  <a:solidFill>
+                    <a:srgbClr val="4D4F53"/>
+                  </a:solidFill>
+                </a:rPr>
+                <a:t>Product standardisation</a:t>
+              </a:r>
               <a:endParaRPr lang="en-GB" sz="2000" dirty="0" smtClean="0">
                 <a:solidFill>
                   <a:srgbClr val="4D4F53"/>
@@ -11817,21 +11825,21 @@
               </a:endParaRPr>
             </a:p>
             <a:p>
-              <a:endParaRPr lang="en-GB" dirty="0" smtClean="0">
+              <a:endParaRPr lang="en-GB" sz="1600" dirty="0" smtClean="0">
                 <a:solidFill>
                   <a:srgbClr val="4D4F53"/>
                 </a:solidFill>
               </a:endParaRPr>
             </a:p>
             <a:p>
-              <a:endParaRPr lang="en-GB" dirty="0" smtClean="0">
+              <a:endParaRPr lang="en-GB" sz="1600" dirty="0" smtClean="0">
                 <a:solidFill>
                   <a:srgbClr val="4D4F53"/>
                 </a:solidFill>
               </a:endParaRPr>
             </a:p>
             <a:p>
-              <a:endParaRPr lang="en-GB" dirty="0">
+              <a:endParaRPr lang="en-GB" sz="1600" dirty="0">
                 <a:solidFill>
                   <a:srgbClr val="4D4F53"/>
                 </a:solidFill>
@@ -12719,11 +12727,6 @@
                 </a:rPr>
                 <a:t>Distribution</a:t>
               </a:r>
-              <a:endParaRPr lang="en-GB" sz="2400" dirty="0" smtClean="0">
-                <a:solidFill>
-                  <a:srgbClr val="4D4F53"/>
-                </a:solidFill>
-              </a:endParaRPr>
             </a:p>
             <a:p>
               <a:r>
@@ -12966,7 +12969,7 @@
           <a:noFill/>
           <a:extLst>
             <a:ext uri="{909E8E84-426E-40dd-AFC4-6F175D3DCCD1}">
-              <a14:hiddenFill xmlns:a14="http://schemas.microsoft.com/office/drawing/2010/main" xmlns="">
+              <a14:hiddenFill xmlns="" xmlns:a14="http://schemas.microsoft.com/office/drawing/2010/main">
                 <a:solidFill>
                   <a:srgbClr val="FFFFFF"/>
                 </a:solidFill>
@@ -15051,7 +15054,7 @@
               <a:effectLst/>
               <a:extLst>
                 <a:ext uri="{91240B29-F687-4f45-9708-019B960494DF}">
-                  <a14:hiddenLine xmlns:a14="http://schemas.microsoft.com/office/drawing/2010/main" xmlns="" w="9525" cap="flat">
+                  <a14:hiddenLine xmlns="" xmlns:a14="http://schemas.microsoft.com/office/drawing/2010/main" w="9525" cap="flat">
                     <a:solidFill>
                       <a:srgbClr val="808080"/>
                     </a:solidFill>
@@ -15061,7 +15064,7 @@
                   </a14:hiddenLine>
                 </a:ext>
                 <a:ext uri="{AF507438-7753-43e0-B8FC-AC1667EBCBE1}">
-                  <a14:hiddenEffects xmlns:a14="http://schemas.microsoft.com/office/drawing/2010/main" xmlns="">
+                  <a14:hiddenEffects xmlns="" xmlns:a14="http://schemas.microsoft.com/office/drawing/2010/main">
                     <a:effectLst>
                       <a:outerShdw blurRad="63500" dist="38099" dir="2700000" algn="ctr" rotWithShape="0">
                         <a:srgbClr val="000000">
@@ -15167,7 +15170,7 @@
               <a:effectLst/>
               <a:extLst>
                 <a:ext uri="{91240B29-F687-4f45-9708-019B960494DF}">
-                  <a14:hiddenLine xmlns:a14="http://schemas.microsoft.com/office/drawing/2010/main" xmlns="" w="9525" cap="flat">
+                  <a14:hiddenLine xmlns="" xmlns:a14="http://schemas.microsoft.com/office/drawing/2010/main" w="9525" cap="flat">
                     <a:solidFill>
                       <a:srgbClr val="808080"/>
                     </a:solidFill>
@@ -15177,7 +15180,7 @@
                   </a14:hiddenLine>
                 </a:ext>
                 <a:ext uri="{AF507438-7753-43e0-B8FC-AC1667EBCBE1}">
-                  <a14:hiddenEffects xmlns:a14="http://schemas.microsoft.com/office/drawing/2010/main" xmlns="">
+                  <a14:hiddenEffects xmlns="" xmlns:a14="http://schemas.microsoft.com/office/drawing/2010/main">
                     <a:effectLst>
                       <a:outerShdw blurRad="63500" dist="38099" dir="2700000" algn="ctr" rotWithShape="0">
                         <a:srgbClr val="000000">
@@ -15277,7 +15280,7 @@
               <a:effectLst/>
               <a:extLst>
                 <a:ext uri="{91240B29-F687-4f45-9708-019B960494DF}">
-                  <a14:hiddenLine xmlns:a14="http://schemas.microsoft.com/office/drawing/2010/main" xmlns="" w="9525" cap="flat">
+                  <a14:hiddenLine xmlns="" xmlns:a14="http://schemas.microsoft.com/office/drawing/2010/main" w="9525" cap="flat">
                     <a:solidFill>
                       <a:srgbClr val="808080"/>
                     </a:solidFill>
@@ -15287,7 +15290,7 @@
                   </a14:hiddenLine>
                 </a:ext>
                 <a:ext uri="{AF507438-7753-43e0-B8FC-AC1667EBCBE1}">
-                  <a14:hiddenEffects xmlns:a14="http://schemas.microsoft.com/office/drawing/2010/main" xmlns="">
+                  <a14:hiddenEffects xmlns="" xmlns:a14="http://schemas.microsoft.com/office/drawing/2010/main">
                     <a:effectLst>
                       <a:outerShdw blurRad="63500" dist="38099" dir="2700000" algn="ctr" rotWithShape="0">
                         <a:srgbClr val="000000">
@@ -15448,7 +15451,7 @@
               <a:effectLst/>
               <a:extLst>
                 <a:ext uri="{91240B29-F687-4f45-9708-019B960494DF}">
-                  <a14:hiddenLine xmlns:a14="http://schemas.microsoft.com/office/drawing/2010/main" xmlns="" w="9525" cap="flat">
+                  <a14:hiddenLine xmlns="" xmlns:a14="http://schemas.microsoft.com/office/drawing/2010/main" w="9525" cap="flat">
                     <a:solidFill>
                       <a:srgbClr val="808080"/>
                     </a:solidFill>
@@ -15458,7 +15461,7 @@
                   </a14:hiddenLine>
                 </a:ext>
                 <a:ext uri="{AF507438-7753-43e0-B8FC-AC1667EBCBE1}">
-                  <a14:hiddenEffects xmlns:a14="http://schemas.microsoft.com/office/drawing/2010/main" xmlns="">
+                  <a14:hiddenEffects xmlns="" xmlns:a14="http://schemas.microsoft.com/office/drawing/2010/main">
                     <a:effectLst>
                       <a:outerShdw blurRad="63500" dist="38099" dir="2700000" algn="ctr" rotWithShape="0">
                         <a:srgbClr val="000000">
@@ -15619,7 +15622,7 @@
               <a:effectLst/>
               <a:extLst>
                 <a:ext uri="{91240B29-F687-4f45-9708-019B960494DF}">
-                  <a14:hiddenLine xmlns:a14="http://schemas.microsoft.com/office/drawing/2010/main" xmlns="" w="9525" cap="flat">
+                  <a14:hiddenLine xmlns="" xmlns:a14="http://schemas.microsoft.com/office/drawing/2010/main" w="9525" cap="flat">
                     <a:solidFill>
                       <a:srgbClr val="808080"/>
                     </a:solidFill>
@@ -15629,7 +15632,7 @@
                   </a14:hiddenLine>
                 </a:ext>
                 <a:ext uri="{AF507438-7753-43e0-B8FC-AC1667EBCBE1}">
-                  <a14:hiddenEffects xmlns:a14="http://schemas.microsoft.com/office/drawing/2010/main" xmlns="">
+                  <a14:hiddenEffects xmlns="" xmlns:a14="http://schemas.microsoft.com/office/drawing/2010/main">
                     <a:effectLst>
                       <a:outerShdw blurRad="63500" dist="38099" dir="2700000" algn="ctr" rotWithShape="0">
                         <a:srgbClr val="000000">
@@ -15746,7 +15749,7 @@
               <a:effectLst/>
               <a:extLst>
                 <a:ext uri="{91240B29-F687-4f45-9708-019B960494DF}">
-                  <a14:hiddenLine xmlns:a14="http://schemas.microsoft.com/office/drawing/2010/main" xmlns="" w="9525" cap="flat">
+                  <a14:hiddenLine xmlns="" xmlns:a14="http://schemas.microsoft.com/office/drawing/2010/main" w="9525" cap="flat">
                     <a:solidFill>
                       <a:srgbClr val="808080"/>
                     </a:solidFill>
@@ -15756,7 +15759,7 @@
                   </a14:hiddenLine>
                 </a:ext>
                 <a:ext uri="{AF507438-7753-43e0-B8FC-AC1667EBCBE1}">
-                  <a14:hiddenEffects xmlns:a14="http://schemas.microsoft.com/office/drawing/2010/main" xmlns="">
+                  <a14:hiddenEffects xmlns="" xmlns:a14="http://schemas.microsoft.com/office/drawing/2010/main">
                     <a:effectLst>
                       <a:outerShdw blurRad="63500" dist="38099" dir="2700000" algn="ctr" rotWithShape="0">
                         <a:srgbClr val="000000">
@@ -15873,7 +15876,7 @@
               <a:effectLst/>
               <a:extLst>
                 <a:ext uri="{91240B29-F687-4f45-9708-019B960494DF}">
-                  <a14:hiddenLine xmlns:a14="http://schemas.microsoft.com/office/drawing/2010/main" xmlns="" w="9525" cap="flat">
+                  <a14:hiddenLine xmlns="" xmlns:a14="http://schemas.microsoft.com/office/drawing/2010/main" w="9525" cap="flat">
                     <a:solidFill>
                       <a:srgbClr val="808080"/>
                     </a:solidFill>
@@ -15883,7 +15886,7 @@
                   </a14:hiddenLine>
                 </a:ext>
                 <a:ext uri="{AF507438-7753-43e0-B8FC-AC1667EBCBE1}">
-                  <a14:hiddenEffects xmlns:a14="http://schemas.microsoft.com/office/drawing/2010/main" xmlns="">
+                  <a14:hiddenEffects xmlns="" xmlns:a14="http://schemas.microsoft.com/office/drawing/2010/main">
                     <a:effectLst>
                       <a:outerShdw blurRad="63500" dist="38099" dir="2700000" algn="ctr" rotWithShape="0">
                         <a:srgbClr val="000000">
@@ -16000,7 +16003,7 @@
               <a:effectLst/>
               <a:extLst>
                 <a:ext uri="{91240B29-F687-4f45-9708-019B960494DF}">
-                  <a14:hiddenLine xmlns:a14="http://schemas.microsoft.com/office/drawing/2010/main" xmlns="" w="9525" cap="flat">
+                  <a14:hiddenLine xmlns="" xmlns:a14="http://schemas.microsoft.com/office/drawing/2010/main" w="9525" cap="flat">
                     <a:solidFill>
                       <a:srgbClr val="808080"/>
                     </a:solidFill>
@@ -16010,7 +16013,7 @@
                   </a14:hiddenLine>
                 </a:ext>
                 <a:ext uri="{AF507438-7753-43e0-B8FC-AC1667EBCBE1}">
-                  <a14:hiddenEffects xmlns:a14="http://schemas.microsoft.com/office/drawing/2010/main" xmlns="">
+                  <a14:hiddenEffects xmlns="" xmlns:a14="http://schemas.microsoft.com/office/drawing/2010/main">
                     <a:effectLst>
                       <a:outerShdw blurRad="63500" dist="38099" dir="2700000" algn="ctr" rotWithShape="0">
                         <a:srgbClr val="000000">
@@ -16127,7 +16130,7 @@
               <a:effectLst/>
               <a:extLst>
                 <a:ext uri="{91240B29-F687-4f45-9708-019B960494DF}">
-                  <a14:hiddenLine xmlns:a14="http://schemas.microsoft.com/office/drawing/2010/main" xmlns="" w="9525" cap="flat">
+                  <a14:hiddenLine xmlns="" xmlns:a14="http://schemas.microsoft.com/office/drawing/2010/main" w="9525" cap="flat">
                     <a:solidFill>
                       <a:srgbClr val="808080"/>
                     </a:solidFill>
@@ -16137,7 +16140,7 @@
                   </a14:hiddenLine>
                 </a:ext>
                 <a:ext uri="{AF507438-7753-43e0-B8FC-AC1667EBCBE1}">
-                  <a14:hiddenEffects xmlns:a14="http://schemas.microsoft.com/office/drawing/2010/main" xmlns="">
+                  <a14:hiddenEffects xmlns="" xmlns:a14="http://schemas.microsoft.com/office/drawing/2010/main">
                     <a:effectLst>
                       <a:outerShdw blurRad="63500" dist="38099" dir="2700000" algn="ctr" rotWithShape="0">
                         <a:srgbClr val="000000">
@@ -16243,7 +16246,7 @@
               <a:effectLst/>
               <a:extLst>
                 <a:ext uri="{91240B29-F687-4f45-9708-019B960494DF}">
-                  <a14:hiddenLine xmlns:a14="http://schemas.microsoft.com/office/drawing/2010/main" xmlns="" w="9525" cap="flat">
+                  <a14:hiddenLine xmlns="" xmlns:a14="http://schemas.microsoft.com/office/drawing/2010/main" w="9525" cap="flat">
                     <a:solidFill>
                       <a:srgbClr val="808080"/>
                     </a:solidFill>
@@ -16253,7 +16256,7 @@
                   </a14:hiddenLine>
                 </a:ext>
                 <a:ext uri="{AF507438-7753-43e0-B8FC-AC1667EBCBE1}">
-                  <a14:hiddenEffects xmlns:a14="http://schemas.microsoft.com/office/drawing/2010/main" xmlns="">
+                  <a14:hiddenEffects xmlns="" xmlns:a14="http://schemas.microsoft.com/office/drawing/2010/main">
                     <a:effectLst>
                       <a:outerShdw blurRad="63500" dist="38099" dir="2700000" algn="ctr" rotWithShape="0">
                         <a:srgbClr val="000000">
@@ -16522,7 +16525,7 @@
               <a:effectLst/>
               <a:extLst>
                 <a:ext uri="{91240B29-F687-4f45-9708-019B960494DF}">
-                  <a14:hiddenLine xmlns:a14="http://schemas.microsoft.com/office/drawing/2010/main" xmlns="" w="9525" cap="flat">
+                  <a14:hiddenLine xmlns="" xmlns:a14="http://schemas.microsoft.com/office/drawing/2010/main" w="9525" cap="flat">
                     <a:solidFill>
                       <a:srgbClr val="808080"/>
                     </a:solidFill>
@@ -16532,7 +16535,7 @@
                   </a14:hiddenLine>
                 </a:ext>
                 <a:ext uri="{AF507438-7753-43e0-B8FC-AC1667EBCBE1}">
-                  <a14:hiddenEffects xmlns:a14="http://schemas.microsoft.com/office/drawing/2010/main" xmlns="">
+                  <a14:hiddenEffects xmlns="" xmlns:a14="http://schemas.microsoft.com/office/drawing/2010/main">
                     <a:effectLst>
                       <a:outerShdw blurRad="63500" dist="38099" dir="2700000" algn="ctr" rotWithShape="0">
                         <a:srgbClr val="000000">
@@ -16671,7 +16674,7 @@
               <a:effectLst/>
               <a:extLst>
                 <a:ext uri="{91240B29-F687-4f45-9708-019B960494DF}">
-                  <a14:hiddenLine xmlns:a14="http://schemas.microsoft.com/office/drawing/2010/main" xmlns="" w="9525" cap="flat">
+                  <a14:hiddenLine xmlns="" xmlns:a14="http://schemas.microsoft.com/office/drawing/2010/main" w="9525" cap="flat">
                     <a:solidFill>
                       <a:srgbClr val="808080"/>
                     </a:solidFill>
@@ -16681,7 +16684,7 @@
                   </a14:hiddenLine>
                 </a:ext>
                 <a:ext uri="{AF507438-7753-43e0-B8FC-AC1667EBCBE1}">
-                  <a14:hiddenEffects xmlns:a14="http://schemas.microsoft.com/office/drawing/2010/main" xmlns="">
+                  <a14:hiddenEffects xmlns="" xmlns:a14="http://schemas.microsoft.com/office/drawing/2010/main">
                     <a:effectLst>
                       <a:outerShdw blurRad="63500" dist="38099" dir="2700000" algn="ctr" rotWithShape="0">
                         <a:srgbClr val="000000">
@@ -16815,7 +16818,7 @@
               <a:effectLst/>
               <a:extLst>
                 <a:ext uri="{91240B29-F687-4f45-9708-019B960494DF}">
-                  <a14:hiddenLine xmlns:a14="http://schemas.microsoft.com/office/drawing/2010/main" xmlns="" w="9525" cap="flat">
+                  <a14:hiddenLine xmlns="" xmlns:a14="http://schemas.microsoft.com/office/drawing/2010/main" w="9525" cap="flat">
                     <a:solidFill>
                       <a:srgbClr val="808080"/>
                     </a:solidFill>
@@ -16825,7 +16828,7 @@
                   </a14:hiddenLine>
                 </a:ext>
                 <a:ext uri="{AF507438-7753-43e0-B8FC-AC1667EBCBE1}">
-                  <a14:hiddenEffects xmlns:a14="http://schemas.microsoft.com/office/drawing/2010/main" xmlns="">
+                  <a14:hiddenEffects xmlns="" xmlns:a14="http://schemas.microsoft.com/office/drawing/2010/main">
                     <a:effectLst>
                       <a:outerShdw blurRad="63500" dist="38099" dir="2700000" algn="ctr" rotWithShape="0">
                         <a:srgbClr val="000000">
@@ -16931,7 +16934,7 @@
               <a:effectLst/>
               <a:extLst>
                 <a:ext uri="{91240B29-F687-4f45-9708-019B960494DF}">
-                  <a14:hiddenLine xmlns:a14="http://schemas.microsoft.com/office/drawing/2010/main" xmlns="" w="9525" cap="flat">
+                  <a14:hiddenLine xmlns="" xmlns:a14="http://schemas.microsoft.com/office/drawing/2010/main" w="9525" cap="flat">
                     <a:solidFill>
                       <a:srgbClr val="808080"/>
                     </a:solidFill>
@@ -16941,7 +16944,7 @@
                   </a14:hiddenLine>
                 </a:ext>
                 <a:ext uri="{AF507438-7753-43e0-B8FC-AC1667EBCBE1}">
-                  <a14:hiddenEffects xmlns:a14="http://schemas.microsoft.com/office/drawing/2010/main" xmlns="">
+                  <a14:hiddenEffects xmlns="" xmlns:a14="http://schemas.microsoft.com/office/drawing/2010/main">
                     <a:effectLst>
                       <a:outerShdw blurRad="63500" dist="38099" dir="2700000" algn="ctr" rotWithShape="0">
                         <a:srgbClr val="000000">
@@ -17067,7 +17070,7 @@
               <a:effectLst/>
               <a:extLst>
                 <a:ext uri="{91240B29-F687-4f45-9708-019B960494DF}">
-                  <a14:hiddenLine xmlns:a14="http://schemas.microsoft.com/office/drawing/2010/main" xmlns="" w="9525" cap="flat">
+                  <a14:hiddenLine xmlns="" xmlns:a14="http://schemas.microsoft.com/office/drawing/2010/main" w="9525" cap="flat">
                     <a:solidFill>
                       <a:srgbClr val="808080"/>
                     </a:solidFill>
@@ -17077,7 +17080,7 @@
                   </a14:hiddenLine>
                 </a:ext>
                 <a:ext uri="{AF507438-7753-43e0-B8FC-AC1667EBCBE1}">
-                  <a14:hiddenEffects xmlns:a14="http://schemas.microsoft.com/office/drawing/2010/main" xmlns="">
+                  <a14:hiddenEffects xmlns="" xmlns:a14="http://schemas.microsoft.com/office/drawing/2010/main">
                     <a:effectLst>
                       <a:outerShdw blurRad="63500" dist="38099" dir="2700000" algn="ctr" rotWithShape="0">
                         <a:srgbClr val="000000">
@@ -17203,7 +17206,7 @@
               <a:effectLst/>
               <a:extLst>
                 <a:ext uri="{91240B29-F687-4f45-9708-019B960494DF}">
-                  <a14:hiddenLine xmlns:a14="http://schemas.microsoft.com/office/drawing/2010/main" xmlns="" w="9525" cap="flat">
+                  <a14:hiddenLine xmlns="" xmlns:a14="http://schemas.microsoft.com/office/drawing/2010/main" w="9525" cap="flat">
                     <a:solidFill>
                       <a:srgbClr val="808080"/>
                     </a:solidFill>
@@ -17213,7 +17216,7 @@
                   </a14:hiddenLine>
                 </a:ext>
                 <a:ext uri="{AF507438-7753-43e0-B8FC-AC1667EBCBE1}">
-                  <a14:hiddenEffects xmlns:a14="http://schemas.microsoft.com/office/drawing/2010/main" xmlns="">
+                  <a14:hiddenEffects xmlns="" xmlns:a14="http://schemas.microsoft.com/office/drawing/2010/main">
                     <a:effectLst>
                       <a:outerShdw blurRad="63500" dist="38099" dir="2700000" algn="ctr" rotWithShape="0">
                         <a:srgbClr val="000000">
@@ -17330,7 +17333,7 @@
               <a:effectLst/>
               <a:extLst>
                 <a:ext uri="{91240B29-F687-4f45-9708-019B960494DF}">
-                  <a14:hiddenLine xmlns:a14="http://schemas.microsoft.com/office/drawing/2010/main" xmlns="" w="9525" cap="flat">
+                  <a14:hiddenLine xmlns="" xmlns:a14="http://schemas.microsoft.com/office/drawing/2010/main" w="9525" cap="flat">
                     <a:solidFill>
                       <a:srgbClr val="808080"/>
                     </a:solidFill>
@@ -17340,7 +17343,7 @@
                   </a14:hiddenLine>
                 </a:ext>
                 <a:ext uri="{AF507438-7753-43e0-B8FC-AC1667EBCBE1}">
-                  <a14:hiddenEffects xmlns:a14="http://schemas.microsoft.com/office/drawing/2010/main" xmlns="">
+                  <a14:hiddenEffects xmlns="" xmlns:a14="http://schemas.microsoft.com/office/drawing/2010/main">
                     <a:effectLst>
                       <a:outerShdw blurRad="63500" dist="38099" dir="2700000" algn="ctr" rotWithShape="0">
                         <a:srgbClr val="000000">
@@ -17449,7 +17452,7 @@
               <a:effectLst/>
               <a:extLst>
                 <a:ext uri="{91240B29-F687-4f45-9708-019B960494DF}">
-                  <a14:hiddenLine xmlns:a14="http://schemas.microsoft.com/office/drawing/2010/main" xmlns="" w="9525" cap="flat">
+                  <a14:hiddenLine xmlns="" xmlns:a14="http://schemas.microsoft.com/office/drawing/2010/main" w="9525" cap="flat">
                     <a:solidFill>
                       <a:srgbClr val="808080"/>
                     </a:solidFill>
@@ -17459,7 +17462,7 @@
                   </a14:hiddenLine>
                 </a:ext>
                 <a:ext uri="{AF507438-7753-43e0-B8FC-AC1667EBCBE1}">
-                  <a14:hiddenEffects xmlns:a14="http://schemas.microsoft.com/office/drawing/2010/main" xmlns="">
+                  <a14:hiddenEffects xmlns="" xmlns:a14="http://schemas.microsoft.com/office/drawing/2010/main">
                     <a:effectLst>
                       <a:outerShdw blurRad="63500" dist="38099" dir="2700000" algn="ctr" rotWithShape="0">
                         <a:srgbClr val="000000">
@@ -17576,7 +17579,7 @@
               <a:effectLst/>
               <a:extLst>
                 <a:ext uri="{91240B29-F687-4f45-9708-019B960494DF}">
-                  <a14:hiddenLine xmlns:a14="http://schemas.microsoft.com/office/drawing/2010/main" xmlns="" w="9525" cap="flat">
+                  <a14:hiddenLine xmlns="" xmlns:a14="http://schemas.microsoft.com/office/drawing/2010/main" w="9525" cap="flat">
                     <a:solidFill>
                       <a:srgbClr val="808080"/>
                     </a:solidFill>
@@ -17586,7 +17589,7 @@
                   </a14:hiddenLine>
                 </a:ext>
                 <a:ext uri="{AF507438-7753-43e0-B8FC-AC1667EBCBE1}">
-                  <a14:hiddenEffects xmlns:a14="http://schemas.microsoft.com/office/drawing/2010/main" xmlns="">
+                  <a14:hiddenEffects xmlns="" xmlns:a14="http://schemas.microsoft.com/office/drawing/2010/main">
                     <a:effectLst>
                       <a:outerShdw blurRad="63500" dist="38099" dir="2700000" algn="ctr" rotWithShape="0">
                         <a:srgbClr val="000000">
@@ -17703,7 +17706,7 @@
               <a:effectLst/>
               <a:extLst>
                 <a:ext uri="{91240B29-F687-4f45-9708-019B960494DF}">
-                  <a14:hiddenLine xmlns:a14="http://schemas.microsoft.com/office/drawing/2010/main" xmlns="" w="9525" cap="flat">
+                  <a14:hiddenLine xmlns="" xmlns:a14="http://schemas.microsoft.com/office/drawing/2010/main" w="9525" cap="flat">
                     <a:solidFill>
                       <a:srgbClr val="808080"/>
                     </a:solidFill>
@@ -17713,7 +17716,7 @@
                   </a14:hiddenLine>
                 </a:ext>
                 <a:ext uri="{AF507438-7753-43e0-B8FC-AC1667EBCBE1}">
-                  <a14:hiddenEffects xmlns:a14="http://schemas.microsoft.com/office/drawing/2010/main" xmlns="">
+                  <a14:hiddenEffects xmlns="" xmlns:a14="http://schemas.microsoft.com/office/drawing/2010/main">
                     <a:effectLst>
                       <a:outerShdw blurRad="63500" dist="38099" dir="2700000" algn="ctr" rotWithShape="0">
                         <a:srgbClr val="000000">
@@ -17830,7 +17833,7 @@
               <a:effectLst/>
               <a:extLst>
                 <a:ext uri="{91240B29-F687-4f45-9708-019B960494DF}">
-                  <a14:hiddenLine xmlns:a14="http://schemas.microsoft.com/office/drawing/2010/main" xmlns="" w="9525" cap="flat">
+                  <a14:hiddenLine xmlns="" xmlns:a14="http://schemas.microsoft.com/office/drawing/2010/main" w="9525" cap="flat">
                     <a:solidFill>
                       <a:srgbClr val="808080"/>
                     </a:solidFill>
@@ -17840,7 +17843,7 @@
                   </a14:hiddenLine>
                 </a:ext>
                 <a:ext uri="{AF507438-7753-43e0-B8FC-AC1667EBCBE1}">
-                  <a14:hiddenEffects xmlns:a14="http://schemas.microsoft.com/office/drawing/2010/main" xmlns="">
+                  <a14:hiddenEffects xmlns="" xmlns:a14="http://schemas.microsoft.com/office/drawing/2010/main">
                     <a:effectLst>
                       <a:outerShdw blurRad="63500" dist="38099" dir="2700000" algn="ctr" rotWithShape="0">
                         <a:srgbClr val="000000">
@@ -17957,7 +17960,7 @@
               <a:effectLst/>
               <a:extLst>
                 <a:ext uri="{91240B29-F687-4f45-9708-019B960494DF}">
-                  <a14:hiddenLine xmlns:a14="http://schemas.microsoft.com/office/drawing/2010/main" xmlns="" w="9525" cap="flat">
+                  <a14:hiddenLine xmlns="" xmlns:a14="http://schemas.microsoft.com/office/drawing/2010/main" w="9525" cap="flat">
                     <a:solidFill>
                       <a:srgbClr val="808080"/>
                     </a:solidFill>
@@ -17967,7 +17970,7 @@
                   </a14:hiddenLine>
                 </a:ext>
                 <a:ext uri="{AF507438-7753-43e0-B8FC-AC1667EBCBE1}">
-                  <a14:hiddenEffects xmlns:a14="http://schemas.microsoft.com/office/drawing/2010/main" xmlns="">
+                  <a14:hiddenEffects xmlns="" xmlns:a14="http://schemas.microsoft.com/office/drawing/2010/main">
                     <a:effectLst>
                       <a:outerShdw blurRad="63500" dist="38099" dir="2700000" algn="ctr" rotWithShape="0">
                         <a:srgbClr val="000000">
@@ -18117,7 +18120,7 @@
               <a:effectLst/>
               <a:extLst>
                 <a:ext uri="{91240B29-F687-4f45-9708-019B960494DF}">
-                  <a14:hiddenLine xmlns:a14="http://schemas.microsoft.com/office/drawing/2010/main" xmlns="" w="9525" cap="flat">
+                  <a14:hiddenLine xmlns="" xmlns:a14="http://schemas.microsoft.com/office/drawing/2010/main" w="9525" cap="flat">
                     <a:solidFill>
                       <a:srgbClr val="808080"/>
                     </a:solidFill>
@@ -18127,7 +18130,7 @@
                   </a14:hiddenLine>
                 </a:ext>
                 <a:ext uri="{AF507438-7753-43e0-B8FC-AC1667EBCBE1}">
-                  <a14:hiddenEffects xmlns:a14="http://schemas.microsoft.com/office/drawing/2010/main" xmlns="">
+                  <a14:hiddenEffects xmlns="" xmlns:a14="http://schemas.microsoft.com/office/drawing/2010/main">
                     <a:effectLst>
                       <a:outerShdw blurRad="63500" dist="38099" dir="2700000" algn="ctr" rotWithShape="0">
                         <a:srgbClr val="000000">
@@ -18222,7 +18225,7 @@
               <a:effectLst/>
               <a:extLst>
                 <a:ext uri="{91240B29-F687-4f45-9708-019B960494DF}">
-                  <a14:hiddenLine xmlns:a14="http://schemas.microsoft.com/office/drawing/2010/main" xmlns="" w="9525" cap="flat">
+                  <a14:hiddenLine xmlns="" xmlns:a14="http://schemas.microsoft.com/office/drawing/2010/main" w="9525" cap="flat">
                     <a:solidFill>
                       <a:srgbClr val="808080"/>
                     </a:solidFill>
@@ -18232,7 +18235,7 @@
                   </a14:hiddenLine>
                 </a:ext>
                 <a:ext uri="{AF507438-7753-43e0-B8FC-AC1667EBCBE1}">
-                  <a14:hiddenEffects xmlns:a14="http://schemas.microsoft.com/office/drawing/2010/main" xmlns="">
+                  <a14:hiddenEffects xmlns="" xmlns:a14="http://schemas.microsoft.com/office/drawing/2010/main">
                     <a:effectLst>
                       <a:outerShdw blurRad="63500" dist="38099" dir="2700000" algn="ctr" rotWithShape="0">
                         <a:srgbClr val="000000">
@@ -18332,7 +18335,7 @@
               <a:effectLst/>
               <a:extLst>
                 <a:ext uri="{91240B29-F687-4f45-9708-019B960494DF}">
-                  <a14:hiddenLine xmlns:a14="http://schemas.microsoft.com/office/drawing/2010/main" xmlns="" w="9525" cap="flat">
+                  <a14:hiddenLine xmlns="" xmlns:a14="http://schemas.microsoft.com/office/drawing/2010/main" w="9525" cap="flat">
                     <a:solidFill>
                       <a:srgbClr val="808080"/>
                     </a:solidFill>
@@ -18342,7 +18345,7 @@
                   </a14:hiddenLine>
                 </a:ext>
                 <a:ext uri="{AF507438-7753-43e0-B8FC-AC1667EBCBE1}">
-                  <a14:hiddenEffects xmlns:a14="http://schemas.microsoft.com/office/drawing/2010/main" xmlns="">
+                  <a14:hiddenEffects xmlns="" xmlns:a14="http://schemas.microsoft.com/office/drawing/2010/main">
                     <a:effectLst>
                       <a:outerShdw blurRad="63500" dist="38099" dir="2700000" algn="ctr" rotWithShape="0">
                         <a:srgbClr val="000000">
@@ -18442,7 +18445,7 @@
               <a:effectLst/>
               <a:extLst>
                 <a:ext uri="{91240B29-F687-4f45-9708-019B960494DF}">
-                  <a14:hiddenLine xmlns:a14="http://schemas.microsoft.com/office/drawing/2010/main" xmlns="" w="9525" cap="flat">
+                  <a14:hiddenLine xmlns="" xmlns:a14="http://schemas.microsoft.com/office/drawing/2010/main" w="9525" cap="flat">
                     <a:solidFill>
                       <a:srgbClr val="808080"/>
                     </a:solidFill>
@@ -18452,7 +18455,7 @@
                   </a14:hiddenLine>
                 </a:ext>
                 <a:ext uri="{AF507438-7753-43e0-B8FC-AC1667EBCBE1}">
-                  <a14:hiddenEffects xmlns:a14="http://schemas.microsoft.com/office/drawing/2010/main" xmlns="">
+                  <a14:hiddenEffects xmlns="" xmlns:a14="http://schemas.microsoft.com/office/drawing/2010/main">
                     <a:effectLst>
                       <a:outerShdw blurRad="63500" dist="38099" dir="2700000" algn="ctr" rotWithShape="0">
                         <a:srgbClr val="000000">
@@ -18589,7 +18592,7 @@
               <a:effectLst/>
               <a:extLst>
                 <a:ext uri="{91240B29-F687-4f45-9708-019B960494DF}">
-                  <a14:hiddenLine xmlns:a14="http://schemas.microsoft.com/office/drawing/2010/main" xmlns="" w="9525" cap="flat">
+                  <a14:hiddenLine xmlns="" xmlns:a14="http://schemas.microsoft.com/office/drawing/2010/main" w="9525" cap="flat">
                     <a:solidFill>
                       <a:srgbClr val="808080"/>
                     </a:solidFill>
@@ -18599,7 +18602,7 @@
                   </a14:hiddenLine>
                 </a:ext>
                 <a:ext uri="{AF507438-7753-43e0-B8FC-AC1667EBCBE1}">
-                  <a14:hiddenEffects xmlns:a14="http://schemas.microsoft.com/office/drawing/2010/main" xmlns="">
+                  <a14:hiddenEffects xmlns="" xmlns:a14="http://schemas.microsoft.com/office/drawing/2010/main">
                     <a:effectLst>
                       <a:outerShdw blurRad="63500" dist="38099" dir="2700000" algn="ctr" rotWithShape="0">
                         <a:srgbClr val="000000">
@@ -18736,7 +18739,7 @@
               <a:effectLst/>
               <a:extLst>
                 <a:ext uri="{91240B29-F687-4f45-9708-019B960494DF}">
-                  <a14:hiddenLine xmlns:a14="http://schemas.microsoft.com/office/drawing/2010/main" xmlns="" w="9525" cap="flat">
+                  <a14:hiddenLine xmlns="" xmlns:a14="http://schemas.microsoft.com/office/drawing/2010/main" w="9525" cap="flat">
                     <a:solidFill>
                       <a:srgbClr val="808080"/>
                     </a:solidFill>
@@ -18746,7 +18749,7 @@
                   </a14:hiddenLine>
                 </a:ext>
                 <a:ext uri="{AF507438-7753-43e0-B8FC-AC1667EBCBE1}">
-                  <a14:hiddenEffects xmlns:a14="http://schemas.microsoft.com/office/drawing/2010/main" xmlns="">
+                  <a14:hiddenEffects xmlns="" xmlns:a14="http://schemas.microsoft.com/office/drawing/2010/main">
                     <a:effectLst>
                       <a:outerShdw blurRad="63500" dist="38099" dir="2700000" algn="ctr" rotWithShape="0">
                         <a:srgbClr val="000000">
@@ -18852,7 +18855,7 @@
               <a:effectLst/>
               <a:extLst>
                 <a:ext uri="{91240B29-F687-4f45-9708-019B960494DF}">
-                  <a14:hiddenLine xmlns:a14="http://schemas.microsoft.com/office/drawing/2010/main" xmlns="" w="9525" cap="flat">
+                  <a14:hiddenLine xmlns="" xmlns:a14="http://schemas.microsoft.com/office/drawing/2010/main" w="9525" cap="flat">
                     <a:solidFill>
                       <a:srgbClr val="808080"/>
                     </a:solidFill>
@@ -18862,7 +18865,7 @@
                   </a14:hiddenLine>
                 </a:ext>
                 <a:ext uri="{AF507438-7753-43e0-B8FC-AC1667EBCBE1}">
-                  <a14:hiddenEffects xmlns:a14="http://schemas.microsoft.com/office/drawing/2010/main" xmlns="">
+                  <a14:hiddenEffects xmlns="" xmlns:a14="http://schemas.microsoft.com/office/drawing/2010/main">
                     <a:effectLst>
                       <a:outerShdw blurRad="63500" dist="38099" dir="2700000" algn="ctr" rotWithShape="0">
                         <a:srgbClr val="000000">
@@ -19329,7 +19332,7 @@
               <a:effectLst/>
               <a:extLst>
                 <a:ext uri="{91240B29-F687-4f45-9708-019B960494DF}">
-                  <a14:hiddenLine xmlns:a14="http://schemas.microsoft.com/office/drawing/2010/main" xmlns="" w="9525" cap="flat">
+                  <a14:hiddenLine xmlns="" xmlns:a14="http://schemas.microsoft.com/office/drawing/2010/main" w="9525" cap="flat">
                     <a:solidFill>
                       <a:srgbClr val="808080"/>
                     </a:solidFill>
@@ -19339,7 +19342,7 @@
                   </a14:hiddenLine>
                 </a:ext>
                 <a:ext uri="{AF507438-7753-43e0-B8FC-AC1667EBCBE1}">
-                  <a14:hiddenEffects xmlns:a14="http://schemas.microsoft.com/office/drawing/2010/main" xmlns="">
+                  <a14:hiddenEffects xmlns="" xmlns:a14="http://schemas.microsoft.com/office/drawing/2010/main">
                     <a:effectLst>
                       <a:outerShdw blurRad="63500" dist="38099" dir="2700000" algn="ctr" rotWithShape="0">
                         <a:srgbClr val="000000">
@@ -19445,7 +19448,7 @@
               <a:effectLst/>
               <a:extLst>
                 <a:ext uri="{91240B29-F687-4f45-9708-019B960494DF}">
-                  <a14:hiddenLine xmlns:a14="http://schemas.microsoft.com/office/drawing/2010/main" xmlns="" w="9525" cap="flat">
+                  <a14:hiddenLine xmlns="" xmlns:a14="http://schemas.microsoft.com/office/drawing/2010/main" w="9525" cap="flat">
                     <a:solidFill>
                       <a:srgbClr val="808080"/>
                     </a:solidFill>
@@ -19455,7 +19458,7 @@
                   </a14:hiddenLine>
                 </a:ext>
                 <a:ext uri="{AF507438-7753-43e0-B8FC-AC1667EBCBE1}">
-                  <a14:hiddenEffects xmlns:a14="http://schemas.microsoft.com/office/drawing/2010/main" xmlns="">
+                  <a14:hiddenEffects xmlns="" xmlns:a14="http://schemas.microsoft.com/office/drawing/2010/main">
                     <a:effectLst>
                       <a:outerShdw blurRad="63500" dist="38099" dir="2700000" algn="ctr" rotWithShape="0">
                         <a:srgbClr val="000000">
@@ -19555,7 +19558,7 @@
               <a:effectLst/>
               <a:extLst>
                 <a:ext uri="{91240B29-F687-4f45-9708-019B960494DF}">
-                  <a14:hiddenLine xmlns:a14="http://schemas.microsoft.com/office/drawing/2010/main" xmlns="" w="9525" cap="flat">
+                  <a14:hiddenLine xmlns="" xmlns:a14="http://schemas.microsoft.com/office/drawing/2010/main" w="9525" cap="flat">
                     <a:solidFill>
                       <a:srgbClr val="808080"/>
                     </a:solidFill>
@@ -19565,7 +19568,7 @@
                   </a14:hiddenLine>
                 </a:ext>
                 <a:ext uri="{AF507438-7753-43e0-B8FC-AC1667EBCBE1}">
-                  <a14:hiddenEffects xmlns:a14="http://schemas.microsoft.com/office/drawing/2010/main" xmlns="">
+                  <a14:hiddenEffects xmlns="" xmlns:a14="http://schemas.microsoft.com/office/drawing/2010/main">
                     <a:effectLst>
                       <a:outerShdw blurRad="63500" dist="38099" dir="2700000" algn="ctr" rotWithShape="0">
                         <a:srgbClr val="000000">
@@ -19726,7 +19729,7 @@
               <a:effectLst/>
               <a:extLst>
                 <a:ext uri="{91240B29-F687-4f45-9708-019B960494DF}">
-                  <a14:hiddenLine xmlns:a14="http://schemas.microsoft.com/office/drawing/2010/main" xmlns="" w="9525" cap="flat">
+                  <a14:hiddenLine xmlns="" xmlns:a14="http://schemas.microsoft.com/office/drawing/2010/main" w="9525" cap="flat">
                     <a:solidFill>
                       <a:srgbClr val="808080"/>
                     </a:solidFill>
@@ -19736,7 +19739,7 @@
                   </a14:hiddenLine>
                 </a:ext>
                 <a:ext uri="{AF507438-7753-43e0-B8FC-AC1667EBCBE1}">
-                  <a14:hiddenEffects xmlns:a14="http://schemas.microsoft.com/office/drawing/2010/main" xmlns="">
+                  <a14:hiddenEffects xmlns="" xmlns:a14="http://schemas.microsoft.com/office/drawing/2010/main">
                     <a:effectLst>
                       <a:outerShdw blurRad="63500" dist="38099" dir="2700000" algn="ctr" rotWithShape="0">
                         <a:srgbClr val="000000">
@@ -19897,7 +19900,7 @@
               <a:effectLst/>
               <a:extLst>
                 <a:ext uri="{91240B29-F687-4f45-9708-019B960494DF}">
-                  <a14:hiddenLine xmlns:a14="http://schemas.microsoft.com/office/drawing/2010/main" xmlns="" w="9525" cap="flat">
+                  <a14:hiddenLine xmlns="" xmlns:a14="http://schemas.microsoft.com/office/drawing/2010/main" w="9525" cap="flat">
                     <a:solidFill>
                       <a:srgbClr val="808080"/>
                     </a:solidFill>
@@ -19907,7 +19910,7 @@
                   </a14:hiddenLine>
                 </a:ext>
                 <a:ext uri="{AF507438-7753-43e0-B8FC-AC1667EBCBE1}">
-                  <a14:hiddenEffects xmlns:a14="http://schemas.microsoft.com/office/drawing/2010/main" xmlns="">
+                  <a14:hiddenEffects xmlns="" xmlns:a14="http://schemas.microsoft.com/office/drawing/2010/main">
                     <a:effectLst>
                       <a:outerShdw blurRad="63500" dist="38099" dir="2700000" algn="ctr" rotWithShape="0">
                         <a:srgbClr val="000000">
@@ -20024,7 +20027,7 @@
               <a:effectLst/>
               <a:extLst>
                 <a:ext uri="{91240B29-F687-4f45-9708-019B960494DF}">
-                  <a14:hiddenLine xmlns:a14="http://schemas.microsoft.com/office/drawing/2010/main" xmlns="" w="9525" cap="flat">
+                  <a14:hiddenLine xmlns="" xmlns:a14="http://schemas.microsoft.com/office/drawing/2010/main" w="9525" cap="flat">
                     <a:solidFill>
                       <a:srgbClr val="808080"/>
                     </a:solidFill>
@@ -20034,7 +20037,7 @@
                   </a14:hiddenLine>
                 </a:ext>
                 <a:ext uri="{AF507438-7753-43e0-B8FC-AC1667EBCBE1}">
-                  <a14:hiddenEffects xmlns:a14="http://schemas.microsoft.com/office/drawing/2010/main" xmlns="">
+                  <a14:hiddenEffects xmlns="" xmlns:a14="http://schemas.microsoft.com/office/drawing/2010/main">
                     <a:effectLst>
                       <a:outerShdw blurRad="63500" dist="38099" dir="2700000" algn="ctr" rotWithShape="0">
                         <a:srgbClr val="000000">
@@ -20151,7 +20154,7 @@
               <a:effectLst/>
               <a:extLst>
                 <a:ext uri="{91240B29-F687-4f45-9708-019B960494DF}">
-                  <a14:hiddenLine xmlns:a14="http://schemas.microsoft.com/office/drawing/2010/main" xmlns="" w="9525" cap="flat">
+                  <a14:hiddenLine xmlns="" xmlns:a14="http://schemas.microsoft.com/office/drawing/2010/main" w="9525" cap="flat">
                     <a:solidFill>
                       <a:srgbClr val="808080"/>
                     </a:solidFill>
@@ -20161,7 +20164,7 @@
                   </a14:hiddenLine>
                 </a:ext>
                 <a:ext uri="{AF507438-7753-43e0-B8FC-AC1667EBCBE1}">
-                  <a14:hiddenEffects xmlns:a14="http://schemas.microsoft.com/office/drawing/2010/main" xmlns="">
+                  <a14:hiddenEffects xmlns="" xmlns:a14="http://schemas.microsoft.com/office/drawing/2010/main">
                     <a:effectLst>
                       <a:outerShdw blurRad="63500" dist="38099" dir="2700000" algn="ctr" rotWithShape="0">
                         <a:srgbClr val="000000">
@@ -20278,7 +20281,7 @@
               <a:effectLst/>
               <a:extLst>
                 <a:ext uri="{91240B29-F687-4f45-9708-019B960494DF}">
-                  <a14:hiddenLine xmlns:a14="http://schemas.microsoft.com/office/drawing/2010/main" xmlns="" w="9525" cap="flat">
+                  <a14:hiddenLine xmlns="" xmlns:a14="http://schemas.microsoft.com/office/drawing/2010/main" w="9525" cap="flat">
                     <a:solidFill>
                       <a:srgbClr val="808080"/>
                     </a:solidFill>
@@ -20288,7 +20291,7 @@
                   </a14:hiddenLine>
                 </a:ext>
                 <a:ext uri="{AF507438-7753-43e0-B8FC-AC1667EBCBE1}">
-                  <a14:hiddenEffects xmlns:a14="http://schemas.microsoft.com/office/drawing/2010/main" xmlns="">
+                  <a14:hiddenEffects xmlns="" xmlns:a14="http://schemas.microsoft.com/office/drawing/2010/main">
                     <a:effectLst>
                       <a:outerShdw blurRad="63500" dist="38099" dir="2700000" algn="ctr" rotWithShape="0">
                         <a:srgbClr val="000000">
@@ -20405,7 +20408,7 @@
               <a:effectLst/>
               <a:extLst>
                 <a:ext uri="{91240B29-F687-4f45-9708-019B960494DF}">
-                  <a14:hiddenLine xmlns:a14="http://schemas.microsoft.com/office/drawing/2010/main" xmlns="" w="9525" cap="flat">
+                  <a14:hiddenLine xmlns="" xmlns:a14="http://schemas.microsoft.com/office/drawing/2010/main" w="9525" cap="flat">
                     <a:solidFill>
                       <a:srgbClr val="808080"/>
                     </a:solidFill>
@@ -20415,7 +20418,7 @@
                   </a14:hiddenLine>
                 </a:ext>
                 <a:ext uri="{AF507438-7753-43e0-B8FC-AC1667EBCBE1}">
-                  <a14:hiddenEffects xmlns:a14="http://schemas.microsoft.com/office/drawing/2010/main" xmlns="">
+                  <a14:hiddenEffects xmlns="" xmlns:a14="http://schemas.microsoft.com/office/drawing/2010/main">
                     <a:effectLst>
                       <a:outerShdw blurRad="63500" dist="38099" dir="2700000" algn="ctr" rotWithShape="0">
                         <a:srgbClr val="000000">
@@ -20521,7 +20524,7 @@
               <a:effectLst/>
               <a:extLst>
                 <a:ext uri="{91240B29-F687-4f45-9708-019B960494DF}">
-                  <a14:hiddenLine xmlns:a14="http://schemas.microsoft.com/office/drawing/2010/main" xmlns="" w="9525" cap="flat">
+                  <a14:hiddenLine xmlns="" xmlns:a14="http://schemas.microsoft.com/office/drawing/2010/main" w="9525" cap="flat">
                     <a:solidFill>
                       <a:srgbClr val="808080"/>
                     </a:solidFill>
@@ -20531,7 +20534,7 @@
                   </a14:hiddenLine>
                 </a:ext>
                 <a:ext uri="{AF507438-7753-43e0-B8FC-AC1667EBCBE1}">
-                  <a14:hiddenEffects xmlns:a14="http://schemas.microsoft.com/office/drawing/2010/main" xmlns="">
+                  <a14:hiddenEffects xmlns="" xmlns:a14="http://schemas.microsoft.com/office/drawing/2010/main">
                     <a:effectLst>
                       <a:outerShdw blurRad="63500" dist="38099" dir="2700000" algn="ctr" rotWithShape="0">
                         <a:srgbClr val="000000">
@@ -20800,7 +20803,7 @@
               <a:effectLst/>
               <a:extLst>
                 <a:ext uri="{91240B29-F687-4f45-9708-019B960494DF}">
-                  <a14:hiddenLine xmlns:a14="http://schemas.microsoft.com/office/drawing/2010/main" xmlns="" w="9525" cap="flat">
+                  <a14:hiddenLine xmlns="" xmlns:a14="http://schemas.microsoft.com/office/drawing/2010/main" w="9525" cap="flat">
                     <a:solidFill>
                       <a:srgbClr val="808080"/>
                     </a:solidFill>
@@ -20810,7 +20813,7 @@
                   </a14:hiddenLine>
                 </a:ext>
                 <a:ext uri="{AF507438-7753-43e0-B8FC-AC1667EBCBE1}">
-                  <a14:hiddenEffects xmlns:a14="http://schemas.microsoft.com/office/drawing/2010/main" xmlns="">
+                  <a14:hiddenEffects xmlns="" xmlns:a14="http://schemas.microsoft.com/office/drawing/2010/main">
                     <a:effectLst>
                       <a:outerShdw blurRad="63500" dist="38099" dir="2700000" algn="ctr" rotWithShape="0">
                         <a:srgbClr val="000000">
@@ -20949,7 +20952,7 @@
               <a:effectLst/>
               <a:extLst>
                 <a:ext uri="{91240B29-F687-4f45-9708-019B960494DF}">
-                  <a14:hiddenLine xmlns:a14="http://schemas.microsoft.com/office/drawing/2010/main" xmlns="" w="9525" cap="flat">
+                  <a14:hiddenLine xmlns="" xmlns:a14="http://schemas.microsoft.com/office/drawing/2010/main" w="9525" cap="flat">
                     <a:solidFill>
                       <a:srgbClr val="808080"/>
                     </a:solidFill>
@@ -20959,7 +20962,7 @@
                   </a14:hiddenLine>
                 </a:ext>
                 <a:ext uri="{AF507438-7753-43e0-B8FC-AC1667EBCBE1}">
-                  <a14:hiddenEffects xmlns:a14="http://schemas.microsoft.com/office/drawing/2010/main" xmlns="">
+                  <a14:hiddenEffects xmlns="" xmlns:a14="http://schemas.microsoft.com/office/drawing/2010/main">
                     <a:effectLst>
                       <a:outerShdw blurRad="63500" dist="38099" dir="2700000" algn="ctr" rotWithShape="0">
                         <a:srgbClr val="000000">
@@ -21093,7 +21096,7 @@
               <a:effectLst/>
               <a:extLst>
                 <a:ext uri="{91240B29-F687-4f45-9708-019B960494DF}">
-                  <a14:hiddenLine xmlns:a14="http://schemas.microsoft.com/office/drawing/2010/main" xmlns="" w="9525" cap="flat">
+                  <a14:hiddenLine xmlns="" xmlns:a14="http://schemas.microsoft.com/office/drawing/2010/main" w="9525" cap="flat">
                     <a:solidFill>
                       <a:srgbClr val="808080"/>
                     </a:solidFill>
@@ -21103,7 +21106,7 @@
                   </a14:hiddenLine>
                 </a:ext>
                 <a:ext uri="{AF507438-7753-43e0-B8FC-AC1667EBCBE1}">
-                  <a14:hiddenEffects xmlns:a14="http://schemas.microsoft.com/office/drawing/2010/main" xmlns="">
+                  <a14:hiddenEffects xmlns="" xmlns:a14="http://schemas.microsoft.com/office/drawing/2010/main">
                     <a:effectLst>
                       <a:outerShdw blurRad="63500" dist="38099" dir="2700000" algn="ctr" rotWithShape="0">
                         <a:srgbClr val="000000">
@@ -21209,7 +21212,7 @@
               <a:effectLst/>
               <a:extLst>
                 <a:ext uri="{91240B29-F687-4f45-9708-019B960494DF}">
-                  <a14:hiddenLine xmlns:a14="http://schemas.microsoft.com/office/drawing/2010/main" xmlns="" w="9525" cap="flat">
+                  <a14:hiddenLine xmlns="" xmlns:a14="http://schemas.microsoft.com/office/drawing/2010/main" w="9525" cap="flat">
                     <a:solidFill>
                       <a:srgbClr val="808080"/>
                     </a:solidFill>
@@ -21219,7 +21222,7 @@
                   </a14:hiddenLine>
                 </a:ext>
                 <a:ext uri="{AF507438-7753-43e0-B8FC-AC1667EBCBE1}">
-                  <a14:hiddenEffects xmlns:a14="http://schemas.microsoft.com/office/drawing/2010/main" xmlns="">
+                  <a14:hiddenEffects xmlns="" xmlns:a14="http://schemas.microsoft.com/office/drawing/2010/main">
                     <a:effectLst>
                       <a:outerShdw blurRad="63500" dist="38099" dir="2700000" algn="ctr" rotWithShape="0">
                         <a:srgbClr val="000000">
@@ -21345,7 +21348,7 @@
               <a:effectLst/>
               <a:extLst>
                 <a:ext uri="{91240B29-F687-4f45-9708-019B960494DF}">
-                  <a14:hiddenLine xmlns:a14="http://schemas.microsoft.com/office/drawing/2010/main" xmlns="" w="9525" cap="flat">
+                  <a14:hiddenLine xmlns="" xmlns:a14="http://schemas.microsoft.com/office/drawing/2010/main" w="9525" cap="flat">
                     <a:solidFill>
                       <a:srgbClr val="808080"/>
                     </a:solidFill>
@@ -21355,7 +21358,7 @@
                   </a14:hiddenLine>
                 </a:ext>
                 <a:ext uri="{AF507438-7753-43e0-B8FC-AC1667EBCBE1}">
-                  <a14:hiddenEffects xmlns:a14="http://schemas.microsoft.com/office/drawing/2010/main" xmlns="">
+                  <a14:hiddenEffects xmlns="" xmlns:a14="http://schemas.microsoft.com/office/drawing/2010/main">
                     <a:effectLst>
                       <a:outerShdw blurRad="63500" dist="38099" dir="2700000" algn="ctr" rotWithShape="0">
                         <a:srgbClr val="000000">
@@ -21481,7 +21484,7 @@
               <a:effectLst/>
               <a:extLst>
                 <a:ext uri="{91240B29-F687-4f45-9708-019B960494DF}">
-                  <a14:hiddenLine xmlns:a14="http://schemas.microsoft.com/office/drawing/2010/main" xmlns="" w="9525" cap="flat">
+                  <a14:hiddenLine xmlns="" xmlns:a14="http://schemas.microsoft.com/office/drawing/2010/main" w="9525" cap="flat">
                     <a:solidFill>
                       <a:srgbClr val="808080"/>
                     </a:solidFill>
@@ -21491,7 +21494,7 @@
                   </a14:hiddenLine>
                 </a:ext>
                 <a:ext uri="{AF507438-7753-43e0-B8FC-AC1667EBCBE1}">
-                  <a14:hiddenEffects xmlns:a14="http://schemas.microsoft.com/office/drawing/2010/main" xmlns="">
+                  <a14:hiddenEffects xmlns="" xmlns:a14="http://schemas.microsoft.com/office/drawing/2010/main">
                     <a:effectLst>
                       <a:outerShdw blurRad="63500" dist="38099" dir="2700000" algn="ctr" rotWithShape="0">
                         <a:srgbClr val="000000">
@@ -21608,7 +21611,7 @@
               <a:effectLst/>
               <a:extLst>
                 <a:ext uri="{91240B29-F687-4f45-9708-019B960494DF}">
-                  <a14:hiddenLine xmlns:a14="http://schemas.microsoft.com/office/drawing/2010/main" xmlns="" w="9525" cap="flat">
+                  <a14:hiddenLine xmlns="" xmlns:a14="http://schemas.microsoft.com/office/drawing/2010/main" w="9525" cap="flat">
                     <a:solidFill>
                       <a:srgbClr val="808080"/>
                     </a:solidFill>
@@ -21618,7 +21621,7 @@
                   </a14:hiddenLine>
                 </a:ext>
                 <a:ext uri="{AF507438-7753-43e0-B8FC-AC1667EBCBE1}">
-                  <a14:hiddenEffects xmlns:a14="http://schemas.microsoft.com/office/drawing/2010/main" xmlns="">
+                  <a14:hiddenEffects xmlns="" xmlns:a14="http://schemas.microsoft.com/office/drawing/2010/main">
                     <a:effectLst>
                       <a:outerShdw blurRad="63500" dist="38099" dir="2700000" algn="ctr" rotWithShape="0">
                         <a:srgbClr val="000000">
@@ -21727,7 +21730,7 @@
               <a:effectLst/>
               <a:extLst>
                 <a:ext uri="{91240B29-F687-4f45-9708-019B960494DF}">
-                  <a14:hiddenLine xmlns:a14="http://schemas.microsoft.com/office/drawing/2010/main" xmlns="" w="9525" cap="flat">
+                  <a14:hiddenLine xmlns="" xmlns:a14="http://schemas.microsoft.com/office/drawing/2010/main" w="9525" cap="flat">
                     <a:solidFill>
                       <a:srgbClr val="808080"/>
                     </a:solidFill>
@@ -21737,7 +21740,7 @@
                   </a14:hiddenLine>
                 </a:ext>
                 <a:ext uri="{AF507438-7753-43e0-B8FC-AC1667EBCBE1}">
-                  <a14:hiddenEffects xmlns:a14="http://schemas.microsoft.com/office/drawing/2010/main" xmlns="">
+                  <a14:hiddenEffects xmlns="" xmlns:a14="http://schemas.microsoft.com/office/drawing/2010/main">
                     <a:effectLst>
                       <a:outerShdw blurRad="63500" dist="38099" dir="2700000" algn="ctr" rotWithShape="0">
                         <a:srgbClr val="000000">
@@ -21854,7 +21857,7 @@
               <a:effectLst/>
               <a:extLst>
                 <a:ext uri="{91240B29-F687-4f45-9708-019B960494DF}">
-                  <a14:hiddenLine xmlns:a14="http://schemas.microsoft.com/office/drawing/2010/main" xmlns="" w="9525" cap="flat">
+                  <a14:hiddenLine xmlns="" xmlns:a14="http://schemas.microsoft.com/office/drawing/2010/main" w="9525" cap="flat">
                     <a:solidFill>
                       <a:srgbClr val="808080"/>
                     </a:solidFill>
@@ -21864,7 +21867,7 @@
                   </a14:hiddenLine>
                 </a:ext>
                 <a:ext uri="{AF507438-7753-43e0-B8FC-AC1667EBCBE1}">
-                  <a14:hiddenEffects xmlns:a14="http://schemas.microsoft.com/office/drawing/2010/main" xmlns="">
+                  <a14:hiddenEffects xmlns="" xmlns:a14="http://schemas.microsoft.com/office/drawing/2010/main">
                     <a:effectLst>
                       <a:outerShdw blurRad="63500" dist="38099" dir="2700000" algn="ctr" rotWithShape="0">
                         <a:srgbClr val="000000">
@@ -21981,7 +21984,7 @@
               <a:effectLst/>
               <a:extLst>
                 <a:ext uri="{91240B29-F687-4f45-9708-019B960494DF}">
-                  <a14:hiddenLine xmlns:a14="http://schemas.microsoft.com/office/drawing/2010/main" xmlns="" w="9525" cap="flat">
+                  <a14:hiddenLine xmlns="" xmlns:a14="http://schemas.microsoft.com/office/drawing/2010/main" w="9525" cap="flat">
                     <a:solidFill>
                       <a:srgbClr val="808080"/>
                     </a:solidFill>
@@ -21991,7 +21994,7 @@
                   </a14:hiddenLine>
                 </a:ext>
                 <a:ext uri="{AF507438-7753-43e0-B8FC-AC1667EBCBE1}">
-                  <a14:hiddenEffects xmlns:a14="http://schemas.microsoft.com/office/drawing/2010/main" xmlns="">
+                  <a14:hiddenEffects xmlns="" xmlns:a14="http://schemas.microsoft.com/office/drawing/2010/main">
                     <a:effectLst>
                       <a:outerShdw blurRad="63500" dist="38099" dir="2700000" algn="ctr" rotWithShape="0">
                         <a:srgbClr val="000000">
@@ -22108,7 +22111,7 @@
               <a:effectLst/>
               <a:extLst>
                 <a:ext uri="{91240B29-F687-4f45-9708-019B960494DF}">
-                  <a14:hiddenLine xmlns:a14="http://schemas.microsoft.com/office/drawing/2010/main" xmlns="" w="9525" cap="flat">
+                  <a14:hiddenLine xmlns="" xmlns:a14="http://schemas.microsoft.com/office/drawing/2010/main" w="9525" cap="flat">
                     <a:solidFill>
                       <a:srgbClr val="808080"/>
                     </a:solidFill>
@@ -22118,7 +22121,7 @@
                   </a14:hiddenLine>
                 </a:ext>
                 <a:ext uri="{AF507438-7753-43e0-B8FC-AC1667EBCBE1}">
-                  <a14:hiddenEffects xmlns:a14="http://schemas.microsoft.com/office/drawing/2010/main" xmlns="">
+                  <a14:hiddenEffects xmlns="" xmlns:a14="http://schemas.microsoft.com/office/drawing/2010/main">
                     <a:effectLst>
                       <a:outerShdw blurRad="63500" dist="38099" dir="2700000" algn="ctr" rotWithShape="0">
                         <a:srgbClr val="000000">
@@ -22235,7 +22238,7 @@
               <a:effectLst/>
               <a:extLst>
                 <a:ext uri="{91240B29-F687-4f45-9708-019B960494DF}">
-                  <a14:hiddenLine xmlns:a14="http://schemas.microsoft.com/office/drawing/2010/main" xmlns="" w="9525" cap="flat">
+                  <a14:hiddenLine xmlns="" xmlns:a14="http://schemas.microsoft.com/office/drawing/2010/main" w="9525" cap="flat">
                     <a:solidFill>
                       <a:srgbClr val="808080"/>
                     </a:solidFill>
@@ -22245,7 +22248,7 @@
                   </a14:hiddenLine>
                 </a:ext>
                 <a:ext uri="{AF507438-7753-43e0-B8FC-AC1667EBCBE1}">
-                  <a14:hiddenEffects xmlns:a14="http://schemas.microsoft.com/office/drawing/2010/main" xmlns="">
+                  <a14:hiddenEffects xmlns="" xmlns:a14="http://schemas.microsoft.com/office/drawing/2010/main">
                     <a:effectLst>
                       <a:outerShdw blurRad="63500" dist="38099" dir="2700000" algn="ctr" rotWithShape="0">
                         <a:srgbClr val="000000">
@@ -22395,7 +22398,7 @@
               <a:effectLst/>
               <a:extLst>
                 <a:ext uri="{91240B29-F687-4f45-9708-019B960494DF}">
-                  <a14:hiddenLine xmlns:a14="http://schemas.microsoft.com/office/drawing/2010/main" xmlns="" w="9525" cap="flat">
+                  <a14:hiddenLine xmlns="" xmlns:a14="http://schemas.microsoft.com/office/drawing/2010/main" w="9525" cap="flat">
                     <a:solidFill>
                       <a:srgbClr val="808080"/>
                     </a:solidFill>
@@ -22405,7 +22408,7 @@
                   </a14:hiddenLine>
                 </a:ext>
                 <a:ext uri="{AF507438-7753-43e0-B8FC-AC1667EBCBE1}">
-                  <a14:hiddenEffects xmlns:a14="http://schemas.microsoft.com/office/drawing/2010/main" xmlns="">
+                  <a14:hiddenEffects xmlns="" xmlns:a14="http://schemas.microsoft.com/office/drawing/2010/main">
                     <a:effectLst>
                       <a:outerShdw blurRad="63500" dist="38099" dir="2700000" algn="ctr" rotWithShape="0">
                         <a:srgbClr val="000000">
@@ -22500,7 +22503,7 @@
               <a:effectLst/>
               <a:extLst>
                 <a:ext uri="{91240B29-F687-4f45-9708-019B960494DF}">
-                  <a14:hiddenLine xmlns:a14="http://schemas.microsoft.com/office/drawing/2010/main" xmlns="" w="9525" cap="flat">
+                  <a14:hiddenLine xmlns="" xmlns:a14="http://schemas.microsoft.com/office/drawing/2010/main" w="9525" cap="flat">
                     <a:solidFill>
                       <a:srgbClr val="808080"/>
                     </a:solidFill>
@@ -22510,7 +22513,7 @@
                   </a14:hiddenLine>
                 </a:ext>
                 <a:ext uri="{AF507438-7753-43e0-B8FC-AC1667EBCBE1}">
-                  <a14:hiddenEffects xmlns:a14="http://schemas.microsoft.com/office/drawing/2010/main" xmlns="">
+                  <a14:hiddenEffects xmlns="" xmlns:a14="http://schemas.microsoft.com/office/drawing/2010/main">
                     <a:effectLst>
                       <a:outerShdw blurRad="63500" dist="38099" dir="2700000" algn="ctr" rotWithShape="0">
                         <a:srgbClr val="000000">
@@ -22610,7 +22613,7 @@
               <a:effectLst/>
               <a:extLst>
                 <a:ext uri="{91240B29-F687-4f45-9708-019B960494DF}">
-                  <a14:hiddenLine xmlns:a14="http://schemas.microsoft.com/office/drawing/2010/main" xmlns="" w="9525" cap="flat">
+                  <a14:hiddenLine xmlns="" xmlns:a14="http://schemas.microsoft.com/office/drawing/2010/main" w="9525" cap="flat">
                     <a:solidFill>
                       <a:srgbClr val="808080"/>
                     </a:solidFill>
@@ -22620,7 +22623,7 @@
                   </a14:hiddenLine>
                 </a:ext>
                 <a:ext uri="{AF507438-7753-43e0-B8FC-AC1667EBCBE1}">
-                  <a14:hiddenEffects xmlns:a14="http://schemas.microsoft.com/office/drawing/2010/main" xmlns="">
+                  <a14:hiddenEffects xmlns="" xmlns:a14="http://schemas.microsoft.com/office/drawing/2010/main">
                     <a:effectLst>
                       <a:outerShdw blurRad="63500" dist="38099" dir="2700000" algn="ctr" rotWithShape="0">
                         <a:srgbClr val="000000">
@@ -22720,7 +22723,7 @@
               <a:effectLst/>
               <a:extLst>
                 <a:ext uri="{91240B29-F687-4f45-9708-019B960494DF}">
-                  <a14:hiddenLine xmlns:a14="http://schemas.microsoft.com/office/drawing/2010/main" xmlns="" w="9525" cap="flat">
+                  <a14:hiddenLine xmlns="" xmlns:a14="http://schemas.microsoft.com/office/drawing/2010/main" w="9525" cap="flat">
                     <a:solidFill>
                       <a:srgbClr val="808080"/>
                     </a:solidFill>
@@ -22730,7 +22733,7 @@
                   </a14:hiddenLine>
                 </a:ext>
                 <a:ext uri="{AF507438-7753-43e0-B8FC-AC1667EBCBE1}">
-                  <a14:hiddenEffects xmlns:a14="http://schemas.microsoft.com/office/drawing/2010/main" xmlns="">
+                  <a14:hiddenEffects xmlns="" xmlns:a14="http://schemas.microsoft.com/office/drawing/2010/main">
                     <a:effectLst>
                       <a:outerShdw blurRad="63500" dist="38099" dir="2700000" algn="ctr" rotWithShape="0">
                         <a:srgbClr val="000000">
@@ -22867,7 +22870,7 @@
               <a:effectLst/>
               <a:extLst>
                 <a:ext uri="{91240B29-F687-4f45-9708-019B960494DF}">
-                  <a14:hiddenLine xmlns:a14="http://schemas.microsoft.com/office/drawing/2010/main" xmlns="" w="9525" cap="flat">
+                  <a14:hiddenLine xmlns="" xmlns:a14="http://schemas.microsoft.com/office/drawing/2010/main" w="9525" cap="flat">
                     <a:solidFill>
                       <a:srgbClr val="808080"/>
                     </a:solidFill>
@@ -22877,7 +22880,7 @@
                   </a14:hiddenLine>
                 </a:ext>
                 <a:ext uri="{AF507438-7753-43e0-B8FC-AC1667EBCBE1}">
-                  <a14:hiddenEffects xmlns:a14="http://schemas.microsoft.com/office/drawing/2010/main" xmlns="">
+                  <a14:hiddenEffects xmlns="" xmlns:a14="http://schemas.microsoft.com/office/drawing/2010/main">
                     <a:effectLst>
                       <a:outerShdw blurRad="63500" dist="38099" dir="2700000" algn="ctr" rotWithShape="0">
                         <a:srgbClr val="000000">
@@ -23014,7 +23017,7 @@
               <a:effectLst/>
               <a:extLst>
                 <a:ext uri="{91240B29-F687-4f45-9708-019B960494DF}">
-                  <a14:hiddenLine xmlns:a14="http://schemas.microsoft.com/office/drawing/2010/main" xmlns="" w="9525" cap="flat">
+                  <a14:hiddenLine xmlns="" xmlns:a14="http://schemas.microsoft.com/office/drawing/2010/main" w="9525" cap="flat">
                     <a:solidFill>
                       <a:srgbClr val="808080"/>
                     </a:solidFill>
@@ -23024,7 +23027,7 @@
                   </a14:hiddenLine>
                 </a:ext>
                 <a:ext uri="{AF507438-7753-43e0-B8FC-AC1667EBCBE1}">
-                  <a14:hiddenEffects xmlns:a14="http://schemas.microsoft.com/office/drawing/2010/main" xmlns="">
+                  <a14:hiddenEffects xmlns="" xmlns:a14="http://schemas.microsoft.com/office/drawing/2010/main">
                     <a:effectLst>
                       <a:outerShdw blurRad="63500" dist="38099" dir="2700000" algn="ctr" rotWithShape="0">
                         <a:srgbClr val="000000">
@@ -23130,7 +23133,7 @@
               <a:effectLst/>
               <a:extLst>
                 <a:ext uri="{91240B29-F687-4f45-9708-019B960494DF}">
-                  <a14:hiddenLine xmlns:a14="http://schemas.microsoft.com/office/drawing/2010/main" xmlns="" w="9525" cap="flat">
+                  <a14:hiddenLine xmlns="" xmlns:a14="http://schemas.microsoft.com/office/drawing/2010/main" w="9525" cap="flat">
                     <a:solidFill>
                       <a:srgbClr val="808080"/>
                     </a:solidFill>
@@ -23140,7 +23143,7 @@
                   </a14:hiddenLine>
                 </a:ext>
                 <a:ext uri="{AF507438-7753-43e0-B8FC-AC1667EBCBE1}">
-                  <a14:hiddenEffects xmlns:a14="http://schemas.microsoft.com/office/drawing/2010/main" xmlns="">
+                  <a14:hiddenEffects xmlns="" xmlns:a14="http://schemas.microsoft.com/office/drawing/2010/main">
                     <a:effectLst>
                       <a:outerShdw blurRad="63500" dist="38099" dir="2700000" algn="ctr" rotWithShape="0">
                         <a:srgbClr val="000000">
@@ -28051,71 +28054,6 @@
 </file>
 
 <file path=customXml/item1.xml><?xml version="1.0" encoding="utf-8"?>
-<p:properties xmlns:p="http://schemas.microsoft.com/office/2006/metadata/properties" xmlns:xsi="http://www.w3.org/2001/XMLSchema-instance" xmlns:pc="http://schemas.microsoft.com/office/infopath/2007/PartnerControls">
-  <documentManagement>
-    <SpringIM_LegacyID xmlns="http://schemas.microsoft.com/sharepoint/v3/fields" xsi:nil="true"/>
-    <SpringIM_PartnerName xmlns="http://schemas.microsoft.com/sharepoint/v3">
-      <UserInfo>
-        <DisplayName/>
-        <AccountId xsi:nil="true"/>
-        <AccountType/>
-      </UserInfo>
-    </SpringIM_PartnerName>
-    <SpringIM_RetentionDate xmlns="http://schemas.microsoft.com/sharepoint/v3/fields" xsi:nil="true"/>
-    <SpringIM_ApprovalType xmlns="http://schemas.microsoft.com/sharepoint/v3/fields"/>
-    <SpringIM_TitleEn xmlns="http://schemas.microsoft.com/sharepoint/v3/fields" xsi:nil="true"/>
-    <SpringIM_TypeOfDocument xmlns="http://schemas.microsoft.com/sharepoint/v3/fields">Template</SpringIM_TypeOfDocument>
-    <SpringIM_MethodologyWorkStream xmlns="http://schemas.microsoft.com/sharepoint/v3/fields" xsi:nil="true"/>
-    <SpringIM_Confidentiality xmlns="http://schemas.microsoft.com/sharepoint/v3/fields">Internal</SpringIM_Confidentiality>
-    <SpringIM_Document_ContentType_Version xmlns="http://schemas.microsoft.com/sharepoint/v3/fields">1</SpringIM_Document_ContentType_Version>
-    <SpringIM_Keyword xmlns="http://schemas.microsoft.com/sharepoint/v3/fields" xsi:nil="true"/>
-    <SpringIM_URLOrigin xmlns="http://schemas.microsoft.com/sharepoint/v3/fields" xsi:nil="true"/>
-    <SpringIM_Solution xmlns="http://schemas.microsoft.com/sharepoint/v3/fields" xsi:nil="true"/>
-    <SpringIM_ReusabilityRating xmlns="http://schemas.microsoft.com/sharepoint/v3/fields">3</SpringIM_ReusabilityRating>
-    <SpringIM_AllianceProduct xmlns="http://schemas.microsoft.com/sharepoint/v3/fields"/>
-    <SpringIM_ProjectManager xmlns="http://schemas.microsoft.com/sharepoint/v3">
-      <UserInfo>
-        <DisplayName/>
-        <AccountId xsi:nil="true"/>
-        <AccountType/>
-      </UserInfo>
-    </SpringIM_ProjectManager>
-    <SpringIM_Description xmlns="http://schemas.microsoft.com/sharepoint/v3/fields" xsi:nil="true"/>
-    <SpringIM_Comment xmlns="http://schemas.microsoft.com/sharepoint/v3/fields" xsi:nil="true"/>
-    <SpringIM_MethodologyPhase xmlns="http://schemas.microsoft.com/sharepoint/v3/fields">5. Operate</SpringIM_MethodologyPhase>
-    <SpringIM_MigrationFlag xmlns="http://schemas.microsoft.com/sharepoint/v3/fields" xsi:nil="true"/>
-    <SpringIM_Language xmlns="http://schemas.microsoft.com/sharepoint/v3/fields"/>
-    <SpringIM_ReusabilityActivity xmlns="http://schemas.microsoft.com/sharepoint/v3/fields"/>
-    <SpringIM_Status xmlns="http://schemas.microsoft.com/sharepoint/v3/fields">Draft</SpringIM_Status>
-    <SpringIM_Client xmlns="http://schemas.microsoft.com/sharepoint/v3/fields" xsi:nil="true"/>
-    <SpringIM_Author xmlns="http://schemas.microsoft.com/sharepoint/v3">
-      <UserInfo>
-        <DisplayName/>
-        <AccountId xsi:nil="true"/>
-        <AccountType/>
-      </UserInfo>
-    </SpringIM_Author>
-    <SpringIM_DocumentYear xmlns="http://schemas.microsoft.com/sharepoint/v3/fields">2012</SpringIM_DocumentYear>
-    <SpringIM_Country xmlns="http://schemas.microsoft.com/sharepoint/v3/fields" xsi:nil="true"/>
-    <SpringIM_Industry xmlns="http://schemas.microsoft.com/sharepoint/v3/fields" xsi:nil="true"/>
-    <SpringIM_SourceSystem xmlns="http://schemas.microsoft.com/sharepoint/v3/fields" xsi:nil="true"/>
-    <SpringIM_DescriptionEn xmlns="http://schemas.microsoft.com/sharepoint/v3/fields" xsi:nil="true"/>
-    <SpringIM_SAPNo xmlns="http://schemas.microsoft.com/sharepoint/v3/fields" xsi:nil="true"/>
-    <SpringIM_SourceFolder xmlns="http://schemas.microsoft.com/sharepoint/v3/fields" xsi:nil="true"/>
-  </documentManagement>
-</p:properties>
-</file>
-
-<file path=customXml/item2.xml><?xml version="1.0" encoding="utf-8"?>
-<?mso-contentType ?>
-<FormTemplates xmlns="http://schemas.microsoft.com/sharepoint/v3/contenttype/forms">
-  <Display>DocumentLibraryForm</Display>
-  <Edit>DocumentLibraryForm</Edit>
-  <New>DocumentLibraryForm</New>
-</FormTemplates>
-</file>
-
-<file path=customXml/item3.xml><?xml version="1.0" encoding="utf-8"?>
 <ct:contentTypeSchema xmlns:ct="http://schemas.microsoft.com/office/2006/metadata/contentType" xmlns:ma="http://schemas.microsoft.com/office/2006/metadata/properties/metaAttributes" ct:_="" ma:_="" ma:contentTypeName="BE Document" ma:contentTypeID="0x0101005353CF7DFE784A6D90C5F6B6D11D3DC301006B596F5C59F0444EA16BB0A4AE1799F4" ma:contentTypeVersion="1" ma:contentTypeDescription="The document type for BE" ma:contentTypeScope="" ma:versionID="35b38393a7a4af8bc677612fc65243a4">
   <xsd:schema xmlns:xsd="http://www.w3.org/2001/XMLSchema" xmlns:xs="http://www.w3.org/2001/XMLSchema" xmlns:p="http://schemas.microsoft.com/office/2006/metadata/properties" xmlns:ns1="http://schemas.microsoft.com/sharepoint/v3" xmlns:ns2="http://schemas.microsoft.com/sharepoint/v3/fields" targetNamespace="http://schemas.microsoft.com/office/2006/metadata/properties" ma:root="true" ma:fieldsID="a699221419f778b0e411e14390e0d54c" ns1:_="" ns2:_="">
     <xsd:import namespace="http://schemas.microsoft.com/sharepoint/v3"/>
@@ -28846,32 +28784,72 @@
 </ct:contentTypeSchema>
 </file>
 
-<file path=customXml/itemProps1.xml><?xml version="1.0" encoding="utf-8"?>
-<ds:datastoreItem xmlns:ds="http://schemas.openxmlformats.org/officeDocument/2006/customXml" ds:itemID="{C3176E39-8037-48B0-B74B-447BD7D131F4}">
-  <ds:schemaRefs>
-    <ds:schemaRef ds:uri="http://www.w3.org/XML/1998/namespace"/>
-    <ds:schemaRef ds:uri="http://schemas.openxmlformats.org/package/2006/metadata/core-properties"/>
-    <ds:schemaRef ds:uri="http://schemas.microsoft.com/office/2006/documentManagement/types"/>
-    <ds:schemaRef ds:uri="http://purl.org/dc/elements/1.1/"/>
-    <ds:schemaRef ds:uri="http://purl.org/dc/dcmitype/"/>
-    <ds:schemaRef ds:uri="http://schemas.microsoft.com/office/2006/metadata/properties"/>
-    <ds:schemaRef ds:uri="http://schemas.microsoft.com/sharepoint/v3"/>
-    <ds:schemaRef ds:uri="http://schemas.microsoft.com/sharepoint/v3/fields"/>
-    <ds:schemaRef ds:uri="http://schemas.microsoft.com/office/infopath/2007/PartnerControls"/>
-    <ds:schemaRef ds:uri="http://purl.org/dc/terms/"/>
-  </ds:schemaRefs>
-</ds:datastoreItem>
+<file path=customXml/item2.xml><?xml version="1.0" encoding="utf-8"?>
+<?mso-contentType ?>
+<FormTemplates xmlns="http://schemas.microsoft.com/sharepoint/v3/contenttype/forms">
+  <Display>DocumentLibraryForm</Display>
+  <Edit>DocumentLibraryForm</Edit>
+  <New>DocumentLibraryForm</New>
+</FormTemplates>
 </file>
 
-<file path=customXml/itemProps2.xml><?xml version="1.0" encoding="utf-8"?>
-<ds:datastoreItem xmlns:ds="http://schemas.openxmlformats.org/officeDocument/2006/customXml" ds:itemID="{3D06BFAA-B61F-4F4A-81B4-62F8F67D3E09}">
-  <ds:schemaRefs>
-    <ds:schemaRef ds:uri="http://schemas.microsoft.com/sharepoint/v3/contenttype/forms"/>
-  </ds:schemaRefs>
-</ds:datastoreItem>
+<file path=customXml/item3.xml><?xml version="1.0" encoding="utf-8"?>
+<p:properties xmlns:p="http://schemas.microsoft.com/office/2006/metadata/properties" xmlns:xsi="http://www.w3.org/2001/XMLSchema-instance" xmlns:pc="http://schemas.microsoft.com/office/infopath/2007/PartnerControls">
+  <documentManagement>
+    <SpringIM_LegacyID xmlns="http://schemas.microsoft.com/sharepoint/v3/fields" xsi:nil="true"/>
+    <SpringIM_PartnerName xmlns="http://schemas.microsoft.com/sharepoint/v3">
+      <UserInfo>
+        <DisplayName/>
+        <AccountId xsi:nil="true"/>
+        <AccountType/>
+      </UserInfo>
+    </SpringIM_PartnerName>
+    <SpringIM_RetentionDate xmlns="http://schemas.microsoft.com/sharepoint/v3/fields" xsi:nil="true"/>
+    <SpringIM_ApprovalType xmlns="http://schemas.microsoft.com/sharepoint/v3/fields"/>
+    <SpringIM_TitleEn xmlns="http://schemas.microsoft.com/sharepoint/v3/fields" xsi:nil="true"/>
+    <SpringIM_TypeOfDocument xmlns="http://schemas.microsoft.com/sharepoint/v3/fields">Template</SpringIM_TypeOfDocument>
+    <SpringIM_MethodologyWorkStream xmlns="http://schemas.microsoft.com/sharepoint/v3/fields" xsi:nil="true"/>
+    <SpringIM_Confidentiality xmlns="http://schemas.microsoft.com/sharepoint/v3/fields">Internal</SpringIM_Confidentiality>
+    <SpringIM_Document_ContentType_Version xmlns="http://schemas.microsoft.com/sharepoint/v3/fields">1</SpringIM_Document_ContentType_Version>
+    <SpringIM_Keyword xmlns="http://schemas.microsoft.com/sharepoint/v3/fields" xsi:nil="true"/>
+    <SpringIM_URLOrigin xmlns="http://schemas.microsoft.com/sharepoint/v3/fields" xsi:nil="true"/>
+    <SpringIM_Solution xmlns="http://schemas.microsoft.com/sharepoint/v3/fields" xsi:nil="true"/>
+    <SpringIM_ReusabilityRating xmlns="http://schemas.microsoft.com/sharepoint/v3/fields">3</SpringIM_ReusabilityRating>
+    <SpringIM_AllianceProduct xmlns="http://schemas.microsoft.com/sharepoint/v3/fields"/>
+    <SpringIM_ProjectManager xmlns="http://schemas.microsoft.com/sharepoint/v3">
+      <UserInfo>
+        <DisplayName/>
+        <AccountId xsi:nil="true"/>
+        <AccountType/>
+      </UserInfo>
+    </SpringIM_ProjectManager>
+    <SpringIM_Description xmlns="http://schemas.microsoft.com/sharepoint/v3/fields" xsi:nil="true"/>
+    <SpringIM_Comment xmlns="http://schemas.microsoft.com/sharepoint/v3/fields" xsi:nil="true"/>
+    <SpringIM_MethodologyPhase xmlns="http://schemas.microsoft.com/sharepoint/v3/fields">5. Operate</SpringIM_MethodologyPhase>
+    <SpringIM_MigrationFlag xmlns="http://schemas.microsoft.com/sharepoint/v3/fields" xsi:nil="true"/>
+    <SpringIM_Language xmlns="http://schemas.microsoft.com/sharepoint/v3/fields"/>
+    <SpringIM_ReusabilityActivity xmlns="http://schemas.microsoft.com/sharepoint/v3/fields"/>
+    <SpringIM_Status xmlns="http://schemas.microsoft.com/sharepoint/v3/fields">Draft</SpringIM_Status>
+    <SpringIM_Client xmlns="http://schemas.microsoft.com/sharepoint/v3/fields" xsi:nil="true"/>
+    <SpringIM_Author xmlns="http://schemas.microsoft.com/sharepoint/v3">
+      <UserInfo>
+        <DisplayName/>
+        <AccountId xsi:nil="true"/>
+        <AccountType/>
+      </UserInfo>
+    </SpringIM_Author>
+    <SpringIM_DocumentYear xmlns="http://schemas.microsoft.com/sharepoint/v3/fields">2012</SpringIM_DocumentYear>
+    <SpringIM_Country xmlns="http://schemas.microsoft.com/sharepoint/v3/fields" xsi:nil="true"/>
+    <SpringIM_Industry xmlns="http://schemas.microsoft.com/sharepoint/v3/fields" xsi:nil="true"/>
+    <SpringIM_SourceSystem xmlns="http://schemas.microsoft.com/sharepoint/v3/fields" xsi:nil="true"/>
+    <SpringIM_DescriptionEn xmlns="http://schemas.microsoft.com/sharepoint/v3/fields" xsi:nil="true"/>
+    <SpringIM_SAPNo xmlns="http://schemas.microsoft.com/sharepoint/v3/fields" xsi:nil="true"/>
+    <SpringIM_SourceFolder xmlns="http://schemas.microsoft.com/sharepoint/v3/fields" xsi:nil="true"/>
+  </documentManagement>
+</p:properties>
 </file>
 
-<file path=customXml/itemProps3.xml><?xml version="1.0" encoding="utf-8"?>
+<file path=customXml/itemProps1.xml><?xml version="1.0" encoding="utf-8"?>
 <ds:datastoreItem xmlns:ds="http://schemas.openxmlformats.org/officeDocument/2006/customXml" ds:itemID="{0970F676-00E8-4C43-AED7-8667D8A37F84}">
   <ds:schemaRefs>
     <ds:schemaRef ds:uri="http://schemas.microsoft.com/office/2006/metadata/contentType"/>
@@ -28888,4 +28866,29 @@
     <ds:schemaRef ds:uri="http://schemas.microsoft.com/internal/obd"/>
   </ds:schemaRefs>
 </ds:datastoreItem>
+</file>
+
+<file path=customXml/itemProps2.xml><?xml version="1.0" encoding="utf-8"?>
+<ds:datastoreItem xmlns:ds="http://schemas.openxmlformats.org/officeDocument/2006/customXml" ds:itemID="{3D06BFAA-B61F-4F4A-81B4-62F8F67D3E09}">
+  <ds:schemaRefs>
+    <ds:schemaRef ds:uri="http://schemas.microsoft.com/sharepoint/v3/contenttype/forms"/>
+  </ds:schemaRefs>
+</ds:datastoreItem>
+</file>
+
+<file path=customXml/itemProps3.xml><?xml version="1.0" encoding="utf-8"?>
+<ds:datastoreItem xmlns:ds="http://schemas.openxmlformats.org/officeDocument/2006/customXml" ds:itemID="{C3176E39-8037-48B0-B74B-447BD7D131F4}">
+  <ds:schemaRefs>
+    <ds:schemaRef ds:uri="http://www.w3.org/XML/1998/namespace"/>
+    <ds:schemaRef ds:uri="http://schemas.openxmlformats.org/package/2006/metadata/core-properties"/>
+    <ds:schemaRef ds:uri="http://schemas.microsoft.com/office/2006/documentManagement/types"/>
+    <ds:schemaRef ds:uri="http://purl.org/dc/elements/1.1/"/>
+    <ds:schemaRef ds:uri="http://purl.org/dc/dcmitype/"/>
+    <ds:schemaRef ds:uri="http://schemas.microsoft.com/office/2006/metadata/properties"/>
+    <ds:schemaRef ds:uri="http://schemas.microsoft.com/sharepoint/v3"/>
+    <ds:schemaRef ds:uri="http://schemas.microsoft.com/sharepoint/v3/fields"/>
+    <ds:schemaRef ds:uri="http://schemas.microsoft.com/office/infopath/2007/PartnerControls"/>
+    <ds:schemaRef ds:uri="http://purl.org/dc/terms/"/>
+  </ds:schemaRefs>
+</ds:datastoreItem>
 </file>
</xml_diff>